<commit_message>
Work on defence presentation
</commit_message>
<xml_diff>
--- a/defence/obhajoba.pptx
+++ b/defence/obhajoba.pptx
@@ -12,24 +12,26 @@
     <p:sldMasterId id="2147484242" r:id="rId9"/>
   </p:sldMasterIdLst>
   <p:notesMasterIdLst>
-    <p:notesMasterId r:id="rId25"/>
+    <p:notesMasterId r:id="rId27"/>
   </p:notesMasterIdLst>
   <p:sldIdLst>
     <p:sldId id="256" r:id="rId10"/>
     <p:sldId id="257" r:id="rId11"/>
     <p:sldId id="258" r:id="rId12"/>
-    <p:sldId id="260" r:id="rId13"/>
+    <p:sldId id="277" r:id="rId13"/>
     <p:sldId id="276" r:id="rId14"/>
-    <p:sldId id="277" r:id="rId15"/>
-    <p:sldId id="259" r:id="rId16"/>
-    <p:sldId id="272" r:id="rId17"/>
-    <p:sldId id="261" r:id="rId18"/>
-    <p:sldId id="273" r:id="rId19"/>
-    <p:sldId id="275" r:id="rId20"/>
-    <p:sldId id="269" r:id="rId21"/>
+    <p:sldId id="259" r:id="rId15"/>
+    <p:sldId id="272" r:id="rId16"/>
+    <p:sldId id="261" r:id="rId17"/>
+    <p:sldId id="273" r:id="rId18"/>
+    <p:sldId id="275" r:id="rId19"/>
+    <p:sldId id="269" r:id="rId20"/>
+    <p:sldId id="279" r:id="rId21"/>
     <p:sldId id="270" r:id="rId22"/>
-    <p:sldId id="271" r:id="rId23"/>
-    <p:sldId id="274" r:id="rId24"/>
+    <p:sldId id="280" r:id="rId23"/>
+    <p:sldId id="281" r:id="rId24"/>
+    <p:sldId id="271" r:id="rId25"/>
+    <p:sldId id="274" r:id="rId26"/>
   </p:sldIdLst>
   <p:sldSz cx="9144000" cy="6858000" type="screen4x3"/>
   <p:notesSz cx="6858000" cy="9144000"/>
@@ -1829,6 +1831,13 @@
         </dgm:presLayoutVars>
       </dgm:prSet>
       <dgm:spPr/>
+      <dgm:t>
+        <a:bodyPr/>
+        <a:lstStyle/>
+        <a:p>
+          <a:endParaRPr lang="sk-SK"/>
+        </a:p>
+      </dgm:t>
     </dgm:pt>
     <dgm:pt modelId="{96F4067E-0150-48F6-A3E8-8D86B696A456}" type="pres">
       <dgm:prSet presAssocID="{01203027-F30D-47E4-AD68-9C688331EF99}" presName="node" presStyleLbl="node1" presStyleIdx="0" presStyleCnt="4">
@@ -1894,13 +1903,20 @@
         </dgm:presLayoutVars>
       </dgm:prSet>
       <dgm:spPr/>
+      <dgm:t>
+        <a:bodyPr/>
+        <a:lstStyle/>
+        <a:p>
+          <a:endParaRPr lang="sk-SK"/>
+        </a:p>
+      </dgm:t>
     </dgm:pt>
   </dgm:ptLst>
   <dgm:cxnLst>
     <dgm:cxn modelId="{8068848C-6E0D-4A52-9D10-06B0317C1277}" srcId="{EB3611A7-990E-490F-8DD7-A7A77B46CEAA}" destId="{4EC1AB97-00F2-4F2E-851C-336303AB65A0}" srcOrd="2" destOrd="0" parTransId="{7DD33D15-3ADF-484D-BEED-D993534E2EB6}" sibTransId="{1A057FFD-F3D4-4EA8-A0C8-02A7F710A22F}"/>
-    <dgm:cxn modelId="{BBADF063-082E-4D1A-8FD5-FCB5CC387A5C}" type="presOf" srcId="{C08251DB-A69A-4E5A-BC12-EFB793724E2E}" destId="{2BD9B417-8190-4FDF-A602-4F20EA803446}" srcOrd="0" destOrd="0" presId="urn:microsoft.com/office/officeart/2005/8/layout/default"/>
     <dgm:cxn modelId="{C4F11861-6AE3-4C09-92F3-F5C9C6E7DCC2}" srcId="{EB3611A7-990E-490F-8DD7-A7A77B46CEAA}" destId="{A1132169-5947-49E8-B310-8C2D0A112810}" srcOrd="1" destOrd="0" parTransId="{2A0E3B96-7945-40B0-B0BA-D88F91AF791C}" sibTransId="{E2125291-8643-4AFA-A1C6-2FA28FB4AEBC}"/>
     <dgm:cxn modelId="{E50A5493-2232-4491-BFAE-E59C2752F64F}" type="presOf" srcId="{4EC1AB97-00F2-4F2E-851C-336303AB65A0}" destId="{2F03052C-D805-43E0-AC3B-3692BD1F7973}" srcOrd="0" destOrd="0" presId="urn:microsoft.com/office/officeart/2005/8/layout/default"/>
+    <dgm:cxn modelId="{BBADF063-082E-4D1A-8FD5-FCB5CC387A5C}" type="presOf" srcId="{C08251DB-A69A-4E5A-BC12-EFB793724E2E}" destId="{2BD9B417-8190-4FDF-A602-4F20EA803446}" srcOrd="0" destOrd="0" presId="urn:microsoft.com/office/officeart/2005/8/layout/default"/>
     <dgm:cxn modelId="{95F26A59-2BC7-4870-9A5A-D6D2BA9E94D5}" srcId="{EB3611A7-990E-490F-8DD7-A7A77B46CEAA}" destId="{C08251DB-A69A-4E5A-BC12-EFB793724E2E}" srcOrd="3" destOrd="0" parTransId="{C992409A-CD0A-4A26-A9C3-A23EDB486E0D}" sibTransId="{FDD8FC97-609E-483E-94BB-EDD154CF4AD3}"/>
     <dgm:cxn modelId="{F8708A83-448D-4430-84C1-5B83CA6A2147}" srcId="{EB3611A7-990E-490F-8DD7-A7A77B46CEAA}" destId="{01203027-F30D-47E4-AD68-9C688331EF99}" srcOrd="0" destOrd="0" parTransId="{50CC0440-02F1-4347-B8C8-3E8200C66B2F}" sibTransId="{83374D7A-F8EC-43B7-8825-63974382453F}"/>
     <dgm:cxn modelId="{9FA66FFD-D3BD-468D-9EC4-5D1A26412B93}" type="presOf" srcId="{A1132169-5947-49E8-B310-8C2D0A112810}" destId="{66B559DE-FE5C-4E17-974D-97B503B5F2B1}" srcOrd="0" destOrd="0" presId="urn:microsoft.com/office/officeart/2005/8/layout/default"/>
@@ -2245,6 +2261,13 @@
         </dgm:presLayoutVars>
       </dgm:prSet>
       <dgm:spPr/>
+      <dgm:t>
+        <a:bodyPr/>
+        <a:lstStyle/>
+        <a:p>
+          <a:endParaRPr lang="sk-SK"/>
+        </a:p>
+      </dgm:t>
     </dgm:pt>
     <dgm:pt modelId="{22AFDF85-C1D1-45F0-B0FF-16EBF93E3872}" type="pres">
       <dgm:prSet presAssocID="{327E68EC-A088-45B4-9739-97CD7193E0F1}" presName="vertOne" presStyleCnt="0"/>
@@ -2257,6 +2280,13 @@
         </dgm:presLayoutVars>
       </dgm:prSet>
       <dgm:spPr/>
+      <dgm:t>
+        <a:bodyPr/>
+        <a:lstStyle/>
+        <a:p>
+          <a:endParaRPr lang="sk-SK"/>
+        </a:p>
+      </dgm:t>
     </dgm:pt>
     <dgm:pt modelId="{B6E6276D-A3E5-471D-A1C3-D95ACCDAE427}" type="pres">
       <dgm:prSet presAssocID="{327E68EC-A088-45B4-9739-97CD7193E0F1}" presName="parTransOne" presStyleCnt="0"/>
@@ -2277,6 +2307,13 @@
         </dgm:presLayoutVars>
       </dgm:prSet>
       <dgm:spPr/>
+      <dgm:t>
+        <a:bodyPr/>
+        <a:lstStyle/>
+        <a:p>
+          <a:endParaRPr lang="sk-SK"/>
+        </a:p>
+      </dgm:t>
     </dgm:pt>
     <dgm:pt modelId="{E9FB7D9D-BFCD-4C39-B439-78C23F693F4B}" type="pres">
       <dgm:prSet presAssocID="{3FFA5C95-8BA9-4D1B-B397-46A36071101C}" presName="parTransTwo" presStyleCnt="0"/>
@@ -2328,6 +2365,13 @@
         </dgm:presLayoutVars>
       </dgm:prSet>
       <dgm:spPr/>
+      <dgm:t>
+        <a:bodyPr/>
+        <a:lstStyle/>
+        <a:p>
+          <a:endParaRPr lang="sk-SK"/>
+        </a:p>
+      </dgm:t>
     </dgm:pt>
     <dgm:pt modelId="{B72D1DEB-C2AC-4C3C-935C-4166D332C07E}" type="pres">
       <dgm:prSet presAssocID="{8AD59D31-3A53-4D55-86B4-9FEFB29A123E}" presName="horzFour" presStyleCnt="0"/>
@@ -2348,6 +2392,13 @@
         </dgm:presLayoutVars>
       </dgm:prSet>
       <dgm:spPr/>
+      <dgm:t>
+        <a:bodyPr/>
+        <a:lstStyle/>
+        <a:p>
+          <a:endParaRPr lang="sk-SK"/>
+        </a:p>
+      </dgm:t>
     </dgm:pt>
     <dgm:pt modelId="{07303455-DB5B-4D99-B6D4-5BECE1AF5994}" type="pres">
       <dgm:prSet presAssocID="{4F1F9EE0-E011-446D-9E29-CCA289D247F4}" presName="parTransThree" presStyleCnt="0"/>
@@ -2434,6 +2485,13 @@
         </dgm:presLayoutVars>
       </dgm:prSet>
       <dgm:spPr/>
+      <dgm:t>
+        <a:bodyPr/>
+        <a:lstStyle/>
+        <a:p>
+          <a:endParaRPr lang="sk-SK"/>
+        </a:p>
+      </dgm:t>
     </dgm:pt>
     <dgm:pt modelId="{A65065DF-E3AA-4B54-A34F-6C5FB431A96B}" type="pres">
       <dgm:prSet presAssocID="{71B2831E-60C9-4399-8F35-9C7BD1312D50}" presName="horzFour" presStyleCnt="0"/>
@@ -2442,8 +2500,8 @@
   </dgm:ptLst>
   <dgm:cxnLst>
     <dgm:cxn modelId="{3B721E86-6E4A-4F82-A7C0-01616CCC2549}" srcId="{3FFA5C95-8BA9-4D1B-B397-46A36071101C}" destId="{44B5E856-81C1-482D-9F50-3F5E6F4C4D2F}" srcOrd="0" destOrd="0" parTransId="{3750ECE0-6AD0-4094-BCDF-0274F10147CD}" sibTransId="{092D96D7-9754-4A7B-A7A2-1FD3DE1B79CF}"/>
+    <dgm:cxn modelId="{CB8458F0-8F6C-4838-A922-9FBB4FFA2035}" srcId="{956BB59B-8AFA-45BE-933D-29574149DA66}" destId="{327E68EC-A088-45B4-9739-97CD7193E0F1}" srcOrd="0" destOrd="0" parTransId="{54A98497-89B5-424C-B805-E58D32E03DC9}" sibTransId="{4EC0813E-EE6F-40E0-8087-F1AB1E21D0A6}"/>
     <dgm:cxn modelId="{9352A2AC-F438-411B-A20A-2B99FD85942F}" type="presOf" srcId="{71B2831E-60C9-4399-8F35-9C7BD1312D50}" destId="{47B7B474-90AC-4C55-A18B-FA40F6D3D1D9}" srcOrd="0" destOrd="0" presId="urn:microsoft.com/office/officeart/2005/8/layout/hierarchy4"/>
-    <dgm:cxn modelId="{CB8458F0-8F6C-4838-A922-9FBB4FFA2035}" srcId="{956BB59B-8AFA-45BE-933D-29574149DA66}" destId="{327E68EC-A088-45B4-9739-97CD7193E0F1}" srcOrd="0" destOrd="0" parTransId="{54A98497-89B5-424C-B805-E58D32E03DC9}" sibTransId="{4EC0813E-EE6F-40E0-8087-F1AB1E21D0A6}"/>
     <dgm:cxn modelId="{4C36548B-FDFA-43D0-AF03-A31423E1920A}" srcId="{4F1F9EE0-E011-446D-9E29-CCA289D247F4}" destId="{16C077B0-4283-4781-BC64-9A686ED205DF}" srcOrd="0" destOrd="0" parTransId="{5F35C39F-4C3B-4275-9873-07A2D03F83C5}" sibTransId="{CF6F2E36-4584-4222-96ED-F15395F48673}"/>
     <dgm:cxn modelId="{0673C85D-0C9E-4186-B341-D893ADFEC35A}" srcId="{44B5E856-81C1-482D-9F50-3F5E6F4C4D2F}" destId="{8AD59D31-3A53-4D55-86B4-9FEFB29A123E}" srcOrd="0" destOrd="0" parTransId="{C2E18BC0-2A71-4CFD-94BE-1E7E359A5E9B}" sibTransId="{DAFA307E-E0EA-4BB8-9911-03CF3881F0FA}"/>
     <dgm:cxn modelId="{F2C9DF8D-B2F2-42B7-95D3-27DC46722FB9}" type="presOf" srcId="{16C077B0-4283-4781-BC64-9A686ED205DF}" destId="{6CF29908-7946-47F1-96E4-CF8C52A0974F}" srcOrd="0" destOrd="0" presId="urn:microsoft.com/office/officeart/2005/8/layout/hierarchy4"/>
@@ -6313,7 +6371,7 @@
             <a:fld id="{3618A891-9467-4CC7-A491-0A34A0A97538}" type="datetimeFigureOut">
               <a:rPr lang="en-US" smtClean="0"/>
               <a:pPr/>
-              <a:t>5/20/2015</a:t>
+              <a:t>5/22/2015</a:t>
             </a:fld>
             <a:endParaRPr lang="en-US"/>
           </a:p>
@@ -6748,7 +6806,7 @@
     </p:spTree>
     <p:extLst>
       <p:ext uri="{BB962C8B-B14F-4D97-AF65-F5344CB8AC3E}">
-        <p14:creationId xmlns:p14="http://schemas.microsoft.com/office/powerpoint/2010/main" val="2283735322"/>
+        <p14:creationId xmlns:p14="http://schemas.microsoft.com/office/powerpoint/2010/main" val="3851435212"/>
       </p:ext>
     </p:extLst>
   </p:cSld>
@@ -6922,6 +6980,180 @@
     </p:spTree>
     <p:extLst>
       <p:ext uri="{BB962C8B-B14F-4D97-AF65-F5344CB8AC3E}">
+        <p14:creationId xmlns:p14="http://schemas.microsoft.com/office/powerpoint/2010/main" val="3369660644"/>
+      </p:ext>
+    </p:extLst>
+  </p:cSld>
+  <p:clrMapOvr>
+    <a:masterClrMapping/>
+  </p:clrMapOvr>
+</p:notes>
+</file>
+
+<file path=ppt/notesSlides/notesSlide13.xml><?xml version="1.0" encoding="utf-8"?>
+<p:notes xmlns:a="http://schemas.openxmlformats.org/drawingml/2006/main" xmlns:r="http://schemas.openxmlformats.org/officeDocument/2006/relationships" xmlns:p="http://schemas.openxmlformats.org/presentationml/2006/main">
+  <p:cSld>
+    <p:spTree>
+      <p:nvGrpSpPr>
+        <p:cNvPr id="1" name=""/>
+        <p:cNvGrpSpPr/>
+        <p:nvPr/>
+      </p:nvGrpSpPr>
+      <p:grpSpPr>
+        <a:xfrm>
+          <a:off x="0" y="0"/>
+          <a:ext cx="0" cy="0"/>
+          <a:chOff x="0" y="0"/>
+          <a:chExt cx="0" cy="0"/>
+        </a:xfrm>
+      </p:grpSpPr>
+      <p:sp>
+        <p:nvSpPr>
+          <p:cNvPr id="2" name="Slide Image Placeholder 1"/>
+          <p:cNvSpPr>
+            <a:spLocks noGrp="1" noRot="1" noChangeAspect="1"/>
+          </p:cNvSpPr>
+          <p:nvPr>
+            <p:ph type="sldImg"/>
+          </p:nvPr>
+        </p:nvSpPr>
+        <p:spPr/>
+      </p:sp>
+      <p:sp>
+        <p:nvSpPr>
+          <p:cNvPr id="3" name="Notes Placeholder 2"/>
+          <p:cNvSpPr>
+            <a:spLocks noGrp="1"/>
+          </p:cNvSpPr>
+          <p:nvPr>
+            <p:ph type="body" idx="1"/>
+          </p:nvPr>
+        </p:nvSpPr>
+        <p:spPr/>
+        <p:txBody>
+          <a:bodyPr>
+            <a:normAutofit/>
+          </a:bodyPr>
+          <a:lstStyle/>
+          <a:p>
+            <a:endParaRPr lang="sk-SK" noProof="0" dirty="0"/>
+          </a:p>
+        </p:txBody>
+      </p:sp>
+      <p:sp>
+        <p:nvSpPr>
+          <p:cNvPr id="4" name="Slide Number Placeholder 3"/>
+          <p:cNvSpPr>
+            <a:spLocks noGrp="1"/>
+          </p:cNvSpPr>
+          <p:nvPr>
+            <p:ph type="sldNum" sz="quarter" idx="10"/>
+          </p:nvPr>
+        </p:nvSpPr>
+        <p:spPr/>
+        <p:txBody>
+          <a:bodyPr/>
+          <a:lstStyle/>
+          <a:p>
+            <a:fld id="{14F9460A-9E81-496F-91AC-92DE7ABF30C4}" type="slidenum">
+              <a:rPr lang="en-US" smtClean="0"/>
+              <a:pPr/>
+              <a:t>15</a:t>
+            </a:fld>
+            <a:endParaRPr lang="en-US"/>
+          </a:p>
+        </p:txBody>
+      </p:sp>
+    </p:spTree>
+    <p:extLst>
+      <p:ext uri="{BB962C8B-B14F-4D97-AF65-F5344CB8AC3E}">
+        <p14:creationId xmlns:p14="http://schemas.microsoft.com/office/powerpoint/2010/main" val="2448246446"/>
+      </p:ext>
+    </p:extLst>
+  </p:cSld>
+  <p:clrMapOvr>
+    <a:masterClrMapping/>
+  </p:clrMapOvr>
+</p:notes>
+</file>
+
+<file path=ppt/notesSlides/notesSlide14.xml><?xml version="1.0" encoding="utf-8"?>
+<p:notes xmlns:a="http://schemas.openxmlformats.org/drawingml/2006/main" xmlns:r="http://schemas.openxmlformats.org/officeDocument/2006/relationships" xmlns:p="http://schemas.openxmlformats.org/presentationml/2006/main">
+  <p:cSld>
+    <p:spTree>
+      <p:nvGrpSpPr>
+        <p:cNvPr id="1" name=""/>
+        <p:cNvGrpSpPr/>
+        <p:nvPr/>
+      </p:nvGrpSpPr>
+      <p:grpSpPr>
+        <a:xfrm>
+          <a:off x="0" y="0"/>
+          <a:ext cx="0" cy="0"/>
+          <a:chOff x="0" y="0"/>
+          <a:chExt cx="0" cy="0"/>
+        </a:xfrm>
+      </p:grpSpPr>
+      <p:sp>
+        <p:nvSpPr>
+          <p:cNvPr id="2" name="Slide Image Placeholder 1"/>
+          <p:cNvSpPr>
+            <a:spLocks noGrp="1" noRot="1" noChangeAspect="1"/>
+          </p:cNvSpPr>
+          <p:nvPr>
+            <p:ph type="sldImg"/>
+          </p:nvPr>
+        </p:nvSpPr>
+        <p:spPr/>
+      </p:sp>
+      <p:sp>
+        <p:nvSpPr>
+          <p:cNvPr id="3" name="Notes Placeholder 2"/>
+          <p:cNvSpPr>
+            <a:spLocks noGrp="1"/>
+          </p:cNvSpPr>
+          <p:nvPr>
+            <p:ph type="body" idx="1"/>
+          </p:nvPr>
+        </p:nvSpPr>
+        <p:spPr/>
+        <p:txBody>
+          <a:bodyPr>
+            <a:normAutofit/>
+          </a:bodyPr>
+          <a:lstStyle/>
+          <a:p>
+            <a:endParaRPr lang="sk-SK" noProof="0" dirty="0"/>
+          </a:p>
+        </p:txBody>
+      </p:sp>
+      <p:sp>
+        <p:nvSpPr>
+          <p:cNvPr id="4" name="Slide Number Placeholder 3"/>
+          <p:cNvSpPr>
+            <a:spLocks noGrp="1"/>
+          </p:cNvSpPr>
+          <p:nvPr>
+            <p:ph type="sldNum" sz="quarter" idx="10"/>
+          </p:nvPr>
+        </p:nvSpPr>
+        <p:spPr/>
+        <p:txBody>
+          <a:bodyPr/>
+          <a:lstStyle/>
+          <a:p>
+            <a:fld id="{14F9460A-9E81-496F-91AC-92DE7ABF30C4}" type="slidenum">
+              <a:rPr lang="en-US" smtClean="0"/>
+              <a:pPr/>
+              <a:t>16</a:t>
+            </a:fld>
+            <a:endParaRPr lang="en-US"/>
+          </a:p>
+        </p:txBody>
+      </p:sp>
+    </p:spTree>
+    <p:extLst>
+      <p:ext uri="{BB962C8B-B14F-4D97-AF65-F5344CB8AC3E}">
         <p14:creationId xmlns:p14="http://schemas.microsoft.com/office/powerpoint/2010/main" val="1383423454"/>
       </p:ext>
     </p:extLst>
@@ -7183,7 +7415,7 @@
     </p:spTree>
     <p:extLst>
       <p:ext uri="{BB962C8B-B14F-4D97-AF65-F5344CB8AC3E}">
-        <p14:creationId xmlns:p14="http://schemas.microsoft.com/office/powerpoint/2010/main" val="2203610001"/>
+        <p14:creationId xmlns:p14="http://schemas.microsoft.com/office/powerpoint/2010/main" val="3325301931"/>
       </p:ext>
     </p:extLst>
   </p:cSld>
@@ -7357,7 +7589,7 @@
     </p:spTree>
     <p:extLst>
       <p:ext uri="{BB962C8B-B14F-4D97-AF65-F5344CB8AC3E}">
-        <p14:creationId xmlns:p14="http://schemas.microsoft.com/office/powerpoint/2010/main" val="3325301931"/>
+        <p14:creationId xmlns:p14="http://schemas.microsoft.com/office/powerpoint/2010/main" val="2184708795"/>
       </p:ext>
     </p:extLst>
   </p:cSld>
@@ -7413,6 +7645,26 @@
           </a:bodyPr>
           <a:lstStyle/>
           <a:p>
+            <a:r>
+              <a:rPr lang="sk-SK" noProof="0" dirty="0" smtClean="0"/>
+              <a:t>Spomenúť,</a:t>
+            </a:r>
+            <a:r>
+              <a:rPr lang="sk-SK" baseline="0" noProof="0" dirty="0" smtClean="0"/>
+              <a:t> že triedy sa o to nemusia starať.</a:t>
+            </a:r>
+          </a:p>
+          <a:p>
+            <a:r>
+              <a:rPr lang="sk-SK" baseline="0" noProof="0" dirty="0" smtClean="0"/>
+              <a:t>Nutné na každom novom pc.</a:t>
+            </a:r>
+          </a:p>
+          <a:p>
+            <a:r>
+              <a:rPr lang="sk-SK" baseline="0" noProof="0" dirty="0" smtClean="0"/>
+              <a:t>Vhodné aj na testovanie.</a:t>
+            </a:r>
             <a:endParaRPr lang="sk-SK" noProof="0" dirty="0"/>
           </a:p>
         </p:txBody>
@@ -7444,7 +7696,7 @@
     </p:spTree>
     <p:extLst>
       <p:ext uri="{BB962C8B-B14F-4D97-AF65-F5344CB8AC3E}">
-        <p14:creationId xmlns:p14="http://schemas.microsoft.com/office/powerpoint/2010/main" val="2184708795"/>
+        <p14:creationId xmlns:p14="http://schemas.microsoft.com/office/powerpoint/2010/main" val="1847315681"/>
       </p:ext>
     </p:extLst>
   </p:cSld>
@@ -7500,26 +7752,6 @@
           </a:bodyPr>
           <a:lstStyle/>
           <a:p>
-            <a:r>
-              <a:rPr lang="sk-SK" noProof="0" dirty="0" smtClean="0"/>
-              <a:t>Spomenúť,</a:t>
-            </a:r>
-            <a:r>
-              <a:rPr lang="sk-SK" baseline="0" noProof="0" dirty="0" smtClean="0"/>
-              <a:t> že triedy sa o to nemusia starať.</a:t>
-            </a:r>
-          </a:p>
-          <a:p>
-            <a:r>
-              <a:rPr lang="sk-SK" baseline="0" noProof="0" dirty="0" smtClean="0"/>
-              <a:t>Nutné na každom novom pc.</a:t>
-            </a:r>
-          </a:p>
-          <a:p>
-            <a:r>
-              <a:rPr lang="sk-SK" baseline="0" noProof="0" dirty="0" smtClean="0"/>
-              <a:t>Vhodné aj na testovanie.</a:t>
-            </a:r>
             <a:endParaRPr lang="sk-SK" noProof="0" dirty="0"/>
           </a:p>
         </p:txBody>
@@ -7551,7 +7783,7 @@
     </p:spTree>
     <p:extLst>
       <p:ext uri="{BB962C8B-B14F-4D97-AF65-F5344CB8AC3E}">
-        <p14:creationId xmlns:p14="http://schemas.microsoft.com/office/powerpoint/2010/main" val="1847315681"/>
+        <p14:creationId xmlns:p14="http://schemas.microsoft.com/office/powerpoint/2010/main" val="1262724678"/>
       </p:ext>
     </p:extLst>
   </p:cSld>
@@ -7629,7 +7861,7 @@
             <a:fld id="{14F9460A-9E81-496F-91AC-92DE7ABF30C4}" type="slidenum">
               <a:rPr lang="en-US" smtClean="0"/>
               <a:pPr/>
-              <a:t>9</a:t>
+              <a:t>11</a:t>
             </a:fld>
             <a:endParaRPr lang="en-US"/>
           </a:p>
@@ -7638,7 +7870,7 @@
     </p:spTree>
     <p:extLst>
       <p:ext uri="{BB962C8B-B14F-4D97-AF65-F5344CB8AC3E}">
-        <p14:creationId xmlns:p14="http://schemas.microsoft.com/office/powerpoint/2010/main" val="1262724678"/>
+        <p14:creationId xmlns:p14="http://schemas.microsoft.com/office/powerpoint/2010/main" val="2283735322"/>
       </p:ext>
     </p:extLst>
   </p:cSld>
@@ -7791,7 +8023,7 @@
             <a:fld id="{EE625E72-7062-4D8E-BA99-F07B9DD1F028}" type="datetimeFigureOut">
               <a:rPr lang="en-US" smtClean="0"/>
               <a:pPr/>
-              <a:t>5/20/2015</a:t>
+              <a:t>5/22/2015</a:t>
             </a:fld>
             <a:endParaRPr lang="en-US"/>
           </a:p>
@@ -7963,7 +8195,7 @@
             <a:fld id="{EE625E72-7062-4D8E-BA99-F07B9DD1F028}" type="datetimeFigureOut">
               <a:rPr lang="en-US" smtClean="0"/>
               <a:pPr/>
-              <a:t>5/20/2015</a:t>
+              <a:t>5/22/2015</a:t>
             </a:fld>
             <a:endParaRPr lang="en-US"/>
           </a:p>
@@ -8145,7 +8377,7 @@
             <a:fld id="{EE625E72-7062-4D8E-BA99-F07B9DD1F028}" type="datetimeFigureOut">
               <a:rPr lang="en-US" smtClean="0"/>
               <a:pPr/>
-              <a:t>5/20/2015</a:t>
+              <a:t>5/22/2015</a:t>
             </a:fld>
             <a:endParaRPr lang="en-US"/>
           </a:p>
@@ -8350,7 +8582,7 @@
             <a:fld id="{EE625E72-7062-4D8E-BA99-F07B9DD1F028}" type="datetimeFigureOut">
               <a:rPr lang="en-US" smtClean="0"/>
               <a:pPr/>
-              <a:t>5/20/2015</a:t>
+              <a:t>5/22/2015</a:t>
             </a:fld>
             <a:endParaRPr lang="en-US"/>
           </a:p>
@@ -8522,7 +8754,7 @@
             <a:fld id="{EE625E72-7062-4D8E-BA99-F07B9DD1F028}" type="datetimeFigureOut">
               <a:rPr lang="en-US" smtClean="0"/>
               <a:pPr/>
-              <a:t>5/20/2015</a:t>
+              <a:t>5/22/2015</a:t>
             </a:fld>
             <a:endParaRPr lang="en-US"/>
           </a:p>
@@ -8775,7 +9007,7 @@
             <a:fld id="{EE625E72-7062-4D8E-BA99-F07B9DD1F028}" type="datetimeFigureOut">
               <a:rPr lang="en-US" smtClean="0"/>
               <a:pPr/>
-              <a:t>5/20/2015</a:t>
+              <a:t>5/22/2015</a:t>
             </a:fld>
             <a:endParaRPr lang="en-US"/>
           </a:p>
@@ -9009,7 +9241,7 @@
             <a:fld id="{EE625E72-7062-4D8E-BA99-F07B9DD1F028}" type="datetimeFigureOut">
               <a:rPr lang="en-US" smtClean="0"/>
               <a:pPr/>
-              <a:t>5/20/2015</a:t>
+              <a:t>5/22/2015</a:t>
             </a:fld>
             <a:endParaRPr lang="en-US"/>
           </a:p>
@@ -9358,7 +9590,7 @@
             <a:fld id="{EE625E72-7062-4D8E-BA99-F07B9DD1F028}" type="datetimeFigureOut">
               <a:rPr lang="en-US" smtClean="0"/>
               <a:pPr/>
-              <a:t>5/20/2015</a:t>
+              <a:t>5/22/2015</a:t>
             </a:fld>
             <a:endParaRPr lang="en-US"/>
           </a:p>
@@ -9478,7 +9710,7 @@
             <a:fld id="{EE625E72-7062-4D8E-BA99-F07B9DD1F028}" type="datetimeFigureOut">
               <a:rPr lang="en-US" smtClean="0"/>
               <a:pPr/>
-              <a:t>5/20/2015</a:t>
+              <a:t>5/22/2015</a:t>
             </a:fld>
             <a:endParaRPr lang="en-US"/>
           </a:p>
@@ -9598,7 +9830,7 @@
             <a:fld id="{EE625E72-7062-4D8E-BA99-F07B9DD1F028}" type="datetimeFigureOut">
               <a:rPr lang="en-US" smtClean="0"/>
               <a:pPr/>
-              <a:t>5/20/2015</a:t>
+              <a:t>5/22/2015</a:t>
             </a:fld>
             <a:endParaRPr lang="en-US"/>
           </a:p>
@@ -9884,7 +10116,7 @@
             <a:fld id="{EE625E72-7062-4D8E-BA99-F07B9DD1F028}" type="datetimeFigureOut">
               <a:rPr lang="en-US" smtClean="0"/>
               <a:pPr/>
-              <a:t>5/20/2015</a:t>
+              <a:t>5/22/2015</a:t>
             </a:fld>
             <a:endParaRPr lang="en-US"/>
           </a:p>
@@ -10056,7 +10288,7 @@
             <a:fld id="{EE625E72-7062-4D8E-BA99-F07B9DD1F028}" type="datetimeFigureOut">
               <a:rPr lang="en-US" smtClean="0"/>
               <a:pPr/>
-              <a:t>5/20/2015</a:t>
+              <a:t>5/22/2015</a:t>
             </a:fld>
             <a:endParaRPr lang="en-US"/>
           </a:p>
@@ -10322,7 +10554,7 @@
             <a:fld id="{EE625E72-7062-4D8E-BA99-F07B9DD1F028}" type="datetimeFigureOut">
               <a:rPr lang="en-US" smtClean="0"/>
               <a:pPr/>
-              <a:t>5/20/2015</a:t>
+              <a:t>5/22/2015</a:t>
             </a:fld>
             <a:endParaRPr lang="en-US"/>
           </a:p>
@@ -10494,7 +10726,7 @@
             <a:fld id="{EE625E72-7062-4D8E-BA99-F07B9DD1F028}" type="datetimeFigureOut">
               <a:rPr lang="en-US" smtClean="0"/>
               <a:pPr/>
-              <a:t>5/20/2015</a:t>
+              <a:t>5/22/2015</a:t>
             </a:fld>
             <a:endParaRPr lang="en-US"/>
           </a:p>
@@ -10676,7 +10908,7 @@
             <a:fld id="{EE625E72-7062-4D8E-BA99-F07B9DD1F028}" type="datetimeFigureOut">
               <a:rPr lang="en-US" smtClean="0"/>
               <a:pPr/>
-              <a:t>5/20/2015</a:t>
+              <a:t>5/22/2015</a:t>
             </a:fld>
             <a:endParaRPr lang="en-US"/>
           </a:p>
@@ -10881,7 +11113,7 @@
             <a:fld id="{EE625E72-7062-4D8E-BA99-F07B9DD1F028}" type="datetimeFigureOut">
               <a:rPr lang="en-US" smtClean="0"/>
               <a:pPr/>
-              <a:t>5/20/2015</a:t>
+              <a:t>5/22/2015</a:t>
             </a:fld>
             <a:endParaRPr lang="en-US"/>
           </a:p>
@@ -11053,7 +11285,7 @@
             <a:fld id="{EE625E72-7062-4D8E-BA99-F07B9DD1F028}" type="datetimeFigureOut">
               <a:rPr lang="en-US" smtClean="0"/>
               <a:pPr/>
-              <a:t>5/20/2015</a:t>
+              <a:t>5/22/2015</a:t>
             </a:fld>
             <a:endParaRPr lang="en-US"/>
           </a:p>
@@ -11306,7 +11538,7 @@
             <a:fld id="{EE625E72-7062-4D8E-BA99-F07B9DD1F028}" type="datetimeFigureOut">
               <a:rPr lang="en-US" smtClean="0"/>
               <a:pPr/>
-              <a:t>5/20/2015</a:t>
+              <a:t>5/22/2015</a:t>
             </a:fld>
             <a:endParaRPr lang="en-US"/>
           </a:p>
@@ -11540,7 +11772,7 @@
             <a:fld id="{EE625E72-7062-4D8E-BA99-F07B9DD1F028}" type="datetimeFigureOut">
               <a:rPr lang="en-US" smtClean="0"/>
               <a:pPr/>
-              <a:t>5/20/2015</a:t>
+              <a:t>5/22/2015</a:t>
             </a:fld>
             <a:endParaRPr lang="en-US"/>
           </a:p>
@@ -11889,7 +12121,7 @@
             <a:fld id="{EE625E72-7062-4D8E-BA99-F07B9DD1F028}" type="datetimeFigureOut">
               <a:rPr lang="en-US" smtClean="0"/>
               <a:pPr/>
-              <a:t>5/20/2015</a:t>
+              <a:t>5/22/2015</a:t>
             </a:fld>
             <a:endParaRPr lang="en-US"/>
           </a:p>
@@ -12009,7 +12241,7 @@
             <a:fld id="{EE625E72-7062-4D8E-BA99-F07B9DD1F028}" type="datetimeFigureOut">
               <a:rPr lang="en-US" smtClean="0"/>
               <a:pPr/>
-              <a:t>5/20/2015</a:t>
+              <a:t>5/22/2015</a:t>
             </a:fld>
             <a:endParaRPr lang="en-US"/>
           </a:p>
@@ -12129,7 +12361,7 @@
             <a:fld id="{EE625E72-7062-4D8E-BA99-F07B9DD1F028}" type="datetimeFigureOut">
               <a:rPr lang="en-US" smtClean="0"/>
               <a:pPr/>
-              <a:t>5/20/2015</a:t>
+              <a:t>5/22/2015</a:t>
             </a:fld>
             <a:endParaRPr lang="en-US"/>
           </a:p>
@@ -12382,7 +12614,7 @@
             <a:fld id="{EE625E72-7062-4D8E-BA99-F07B9DD1F028}" type="datetimeFigureOut">
               <a:rPr lang="en-US" smtClean="0"/>
               <a:pPr/>
-              <a:t>5/20/2015</a:t>
+              <a:t>5/22/2015</a:t>
             </a:fld>
             <a:endParaRPr lang="en-US"/>
           </a:p>
@@ -12668,7 +12900,7 @@
             <a:fld id="{EE625E72-7062-4D8E-BA99-F07B9DD1F028}" type="datetimeFigureOut">
               <a:rPr lang="en-US" smtClean="0"/>
               <a:pPr/>
-              <a:t>5/20/2015</a:t>
+              <a:t>5/22/2015</a:t>
             </a:fld>
             <a:endParaRPr lang="en-US"/>
           </a:p>
@@ -12934,7 +13166,7 @@
             <a:fld id="{EE625E72-7062-4D8E-BA99-F07B9DD1F028}" type="datetimeFigureOut">
               <a:rPr lang="en-US" smtClean="0"/>
               <a:pPr/>
-              <a:t>5/20/2015</a:t>
+              <a:t>5/22/2015</a:t>
             </a:fld>
             <a:endParaRPr lang="en-US"/>
           </a:p>
@@ -13106,7 +13338,7 @@
             <a:fld id="{EE625E72-7062-4D8E-BA99-F07B9DD1F028}" type="datetimeFigureOut">
               <a:rPr lang="en-US" smtClean="0"/>
               <a:pPr/>
-              <a:t>5/20/2015</a:t>
+              <a:t>5/22/2015</a:t>
             </a:fld>
             <a:endParaRPr lang="en-US"/>
           </a:p>
@@ -13288,7 +13520,7 @@
             <a:fld id="{EE625E72-7062-4D8E-BA99-F07B9DD1F028}" type="datetimeFigureOut">
               <a:rPr lang="en-US" smtClean="0"/>
               <a:pPr/>
-              <a:t>5/20/2015</a:t>
+              <a:t>5/22/2015</a:t>
             </a:fld>
             <a:endParaRPr lang="en-US"/>
           </a:p>
@@ -13493,7 +13725,7 @@
             <a:fld id="{EE625E72-7062-4D8E-BA99-F07B9DD1F028}" type="datetimeFigureOut">
               <a:rPr lang="en-US" smtClean="0"/>
               <a:pPr/>
-              <a:t>5/20/2015</a:t>
+              <a:t>5/22/2015</a:t>
             </a:fld>
             <a:endParaRPr lang="en-US"/>
           </a:p>
@@ -13665,7 +13897,7 @@
             <a:fld id="{EE625E72-7062-4D8E-BA99-F07B9DD1F028}" type="datetimeFigureOut">
               <a:rPr lang="en-US" smtClean="0"/>
               <a:pPr/>
-              <a:t>5/20/2015</a:t>
+              <a:t>5/22/2015</a:t>
             </a:fld>
             <a:endParaRPr lang="en-US"/>
           </a:p>
@@ -13918,7 +14150,7 @@
             <a:fld id="{EE625E72-7062-4D8E-BA99-F07B9DD1F028}" type="datetimeFigureOut">
               <a:rPr lang="en-US" smtClean="0"/>
               <a:pPr/>
-              <a:t>5/20/2015</a:t>
+              <a:t>5/22/2015</a:t>
             </a:fld>
             <a:endParaRPr lang="en-US"/>
           </a:p>
@@ -14152,7 +14384,7 @@
             <a:fld id="{EE625E72-7062-4D8E-BA99-F07B9DD1F028}" type="datetimeFigureOut">
               <a:rPr lang="en-US" smtClean="0"/>
               <a:pPr/>
-              <a:t>5/20/2015</a:t>
+              <a:t>5/22/2015</a:t>
             </a:fld>
             <a:endParaRPr lang="en-US"/>
           </a:p>
@@ -14501,7 +14733,7 @@
             <a:fld id="{EE625E72-7062-4D8E-BA99-F07B9DD1F028}" type="datetimeFigureOut">
               <a:rPr lang="en-US" smtClean="0"/>
               <a:pPr/>
-              <a:t>5/20/2015</a:t>
+              <a:t>5/22/2015</a:t>
             </a:fld>
             <a:endParaRPr lang="en-US"/>
           </a:p>
@@ -14621,7 +14853,7 @@
             <a:fld id="{EE625E72-7062-4D8E-BA99-F07B9DD1F028}" type="datetimeFigureOut">
               <a:rPr lang="en-US" smtClean="0"/>
               <a:pPr/>
-              <a:t>5/20/2015</a:t>
+              <a:t>5/22/2015</a:t>
             </a:fld>
             <a:endParaRPr lang="en-US"/>
           </a:p>
@@ -14878,7 +15110,7 @@
             <a:fld id="{EE625E72-7062-4D8E-BA99-F07B9DD1F028}" type="datetimeFigureOut">
               <a:rPr lang="en-US" smtClean="0"/>
               <a:pPr/>
-              <a:t>5/20/2015</a:t>
+              <a:t>5/22/2015</a:t>
             </a:fld>
             <a:endParaRPr lang="en-US"/>
           </a:p>
@@ -14975,7 +15207,7 @@
             <a:fld id="{EE625E72-7062-4D8E-BA99-F07B9DD1F028}" type="datetimeFigureOut">
               <a:rPr lang="en-US" smtClean="0"/>
               <a:pPr/>
-              <a:t>5/20/2015</a:t>
+              <a:t>5/22/2015</a:t>
             </a:fld>
             <a:endParaRPr lang="en-US"/>
           </a:p>
@@ -15261,7 +15493,7 @@
             <a:fld id="{EE625E72-7062-4D8E-BA99-F07B9DD1F028}" type="datetimeFigureOut">
               <a:rPr lang="en-US" smtClean="0"/>
               <a:pPr/>
-              <a:t>5/20/2015</a:t>
+              <a:t>5/22/2015</a:t>
             </a:fld>
             <a:endParaRPr lang="en-US"/>
           </a:p>
@@ -15527,7 +15759,7 @@
             <a:fld id="{EE625E72-7062-4D8E-BA99-F07B9DD1F028}" type="datetimeFigureOut">
               <a:rPr lang="en-US" smtClean="0"/>
               <a:pPr/>
-              <a:t>5/20/2015</a:t>
+              <a:t>5/22/2015</a:t>
             </a:fld>
             <a:endParaRPr lang="en-US"/>
           </a:p>
@@ -15699,7 +15931,7 @@
             <a:fld id="{EE625E72-7062-4D8E-BA99-F07B9DD1F028}" type="datetimeFigureOut">
               <a:rPr lang="en-US" smtClean="0"/>
               <a:pPr/>
-              <a:t>5/20/2015</a:t>
+              <a:t>5/22/2015</a:t>
             </a:fld>
             <a:endParaRPr lang="en-US"/>
           </a:p>
@@ -15881,7 +16113,7 @@
             <a:fld id="{EE625E72-7062-4D8E-BA99-F07B9DD1F028}" type="datetimeFigureOut">
               <a:rPr lang="en-US" smtClean="0"/>
               <a:pPr/>
-              <a:t>5/20/2015</a:t>
+              <a:t>5/22/2015</a:t>
             </a:fld>
             <a:endParaRPr lang="en-US"/>
           </a:p>
@@ -16086,7 +16318,7 @@
             <a:fld id="{EE625E72-7062-4D8E-BA99-F07B9DD1F028}" type="datetimeFigureOut">
               <a:rPr lang="en-US" smtClean="0"/>
               <a:pPr/>
-              <a:t>5/20/2015</a:t>
+              <a:t>5/22/2015</a:t>
             </a:fld>
             <a:endParaRPr lang="en-US"/>
           </a:p>
@@ -16258,7 +16490,7 @@
             <a:fld id="{EE625E72-7062-4D8E-BA99-F07B9DD1F028}" type="datetimeFigureOut">
               <a:rPr lang="en-US" smtClean="0"/>
               <a:pPr/>
-              <a:t>5/20/2015</a:t>
+              <a:t>5/22/2015</a:t>
             </a:fld>
             <a:endParaRPr lang="en-US"/>
           </a:p>
@@ -16511,7 +16743,7 @@
             <a:fld id="{EE625E72-7062-4D8E-BA99-F07B9DD1F028}" type="datetimeFigureOut">
               <a:rPr lang="en-US" smtClean="0"/>
               <a:pPr/>
-              <a:t>5/20/2015</a:t>
+              <a:t>5/22/2015</a:t>
             </a:fld>
             <a:endParaRPr lang="en-US"/>
           </a:p>
@@ -16745,7 +16977,7 @@
             <a:fld id="{EE625E72-7062-4D8E-BA99-F07B9DD1F028}" type="datetimeFigureOut">
               <a:rPr lang="en-US" smtClean="0"/>
               <a:pPr/>
-              <a:t>5/20/2015</a:t>
+              <a:t>5/22/2015</a:t>
             </a:fld>
             <a:endParaRPr lang="en-US"/>
           </a:p>
@@ -17094,7 +17326,7 @@
             <a:fld id="{EE625E72-7062-4D8E-BA99-F07B9DD1F028}" type="datetimeFigureOut">
               <a:rPr lang="en-US" smtClean="0"/>
               <a:pPr/>
-              <a:t>5/20/2015</a:t>
+              <a:t>5/22/2015</a:t>
             </a:fld>
             <a:endParaRPr lang="en-US"/>
           </a:p>
@@ -17466,7 +17698,7 @@
             <a:fld id="{EE625E72-7062-4D8E-BA99-F07B9DD1F028}" type="datetimeFigureOut">
               <a:rPr lang="en-US" smtClean="0"/>
               <a:pPr/>
-              <a:t>5/20/2015</a:t>
+              <a:t>5/22/2015</a:t>
             </a:fld>
             <a:endParaRPr lang="en-US"/>
           </a:p>
@@ -17586,7 +17818,7 @@
             <a:fld id="{EE625E72-7062-4D8E-BA99-F07B9DD1F028}" type="datetimeFigureOut">
               <a:rPr lang="en-US" smtClean="0"/>
               <a:pPr/>
-              <a:t>5/20/2015</a:t>
+              <a:t>5/22/2015</a:t>
             </a:fld>
             <a:endParaRPr lang="en-US"/>
           </a:p>
@@ -17706,7 +17938,7 @@
             <a:fld id="{EE625E72-7062-4D8E-BA99-F07B9DD1F028}" type="datetimeFigureOut">
               <a:rPr lang="en-US" smtClean="0"/>
               <a:pPr/>
-              <a:t>5/20/2015</a:t>
+              <a:t>5/22/2015</a:t>
             </a:fld>
             <a:endParaRPr lang="en-US"/>
           </a:p>
@@ -17992,7 +18224,7 @@
             <a:fld id="{EE625E72-7062-4D8E-BA99-F07B9DD1F028}" type="datetimeFigureOut">
               <a:rPr lang="en-US" smtClean="0"/>
               <a:pPr/>
-              <a:t>5/20/2015</a:t>
+              <a:t>5/22/2015</a:t>
             </a:fld>
             <a:endParaRPr lang="en-US"/>
           </a:p>
@@ -18258,7 +18490,7 @@
             <a:fld id="{EE625E72-7062-4D8E-BA99-F07B9DD1F028}" type="datetimeFigureOut">
               <a:rPr lang="en-US" smtClean="0"/>
               <a:pPr/>
-              <a:t>5/20/2015</a:t>
+              <a:t>5/22/2015</a:t>
             </a:fld>
             <a:endParaRPr lang="en-US"/>
           </a:p>
@@ -18430,7 +18662,7 @@
             <a:fld id="{EE625E72-7062-4D8E-BA99-F07B9DD1F028}" type="datetimeFigureOut">
               <a:rPr lang="en-US" smtClean="0"/>
               <a:pPr/>
-              <a:t>5/20/2015</a:t>
+              <a:t>5/22/2015</a:t>
             </a:fld>
             <a:endParaRPr lang="en-US"/>
           </a:p>
@@ -18612,7 +18844,7 @@
             <a:fld id="{EE625E72-7062-4D8E-BA99-F07B9DD1F028}" type="datetimeFigureOut">
               <a:rPr lang="en-US" smtClean="0"/>
               <a:pPr/>
-              <a:t>5/20/2015</a:t>
+              <a:t>5/22/2015</a:t>
             </a:fld>
             <a:endParaRPr lang="en-US"/>
           </a:p>
@@ -18817,7 +19049,7 @@
             <a:fld id="{EE625E72-7062-4D8E-BA99-F07B9DD1F028}" type="datetimeFigureOut">
               <a:rPr lang="en-US" smtClean="0"/>
               <a:pPr/>
-              <a:t>5/20/2015</a:t>
+              <a:t>5/22/2015</a:t>
             </a:fld>
             <a:endParaRPr lang="en-US"/>
           </a:p>
@@ -18989,7 +19221,7 @@
             <a:fld id="{EE625E72-7062-4D8E-BA99-F07B9DD1F028}" type="datetimeFigureOut">
               <a:rPr lang="en-US" smtClean="0"/>
               <a:pPr/>
-              <a:t>5/20/2015</a:t>
+              <a:t>5/22/2015</a:t>
             </a:fld>
             <a:endParaRPr lang="en-US"/>
           </a:p>
@@ -19242,7 +19474,7 @@
             <a:fld id="{EE625E72-7062-4D8E-BA99-F07B9DD1F028}" type="datetimeFigureOut">
               <a:rPr lang="en-US" smtClean="0"/>
               <a:pPr/>
-              <a:t>5/20/2015</a:t>
+              <a:t>5/22/2015</a:t>
             </a:fld>
             <a:endParaRPr lang="en-US"/>
           </a:p>
@@ -19476,7 +19708,7 @@
             <a:fld id="{EE625E72-7062-4D8E-BA99-F07B9DD1F028}" type="datetimeFigureOut">
               <a:rPr lang="en-US" smtClean="0"/>
               <a:pPr/>
-              <a:t>5/20/2015</a:t>
+              <a:t>5/22/2015</a:t>
             </a:fld>
             <a:endParaRPr lang="en-US"/>
           </a:p>
@@ -19573,7 +19805,7 @@
             <a:fld id="{EE625E72-7062-4D8E-BA99-F07B9DD1F028}" type="datetimeFigureOut">
               <a:rPr lang="en-US" smtClean="0"/>
               <a:pPr/>
-              <a:t>5/20/2015</a:t>
+              <a:t>5/22/2015</a:t>
             </a:fld>
             <a:endParaRPr lang="en-US"/>
           </a:p>
@@ -19945,7 +20177,7 @@
             <a:fld id="{EE625E72-7062-4D8E-BA99-F07B9DD1F028}" type="datetimeFigureOut">
               <a:rPr lang="en-US" smtClean="0"/>
               <a:pPr/>
-              <a:t>5/20/2015</a:t>
+              <a:t>5/22/2015</a:t>
             </a:fld>
             <a:endParaRPr lang="en-US"/>
           </a:p>
@@ -20065,7 +20297,7 @@
             <a:fld id="{EE625E72-7062-4D8E-BA99-F07B9DD1F028}" type="datetimeFigureOut">
               <a:rPr lang="en-US" smtClean="0"/>
               <a:pPr/>
-              <a:t>5/20/2015</a:t>
+              <a:t>5/22/2015</a:t>
             </a:fld>
             <a:endParaRPr lang="en-US"/>
           </a:p>
@@ -20185,7 +20417,7 @@
             <a:fld id="{EE625E72-7062-4D8E-BA99-F07B9DD1F028}" type="datetimeFigureOut">
               <a:rPr lang="en-US" smtClean="0"/>
               <a:pPr/>
-              <a:t>5/20/2015</a:t>
+              <a:t>5/22/2015</a:t>
             </a:fld>
             <a:endParaRPr lang="en-US"/>
           </a:p>
@@ -20471,7 +20703,7 @@
             <a:fld id="{EE625E72-7062-4D8E-BA99-F07B9DD1F028}" type="datetimeFigureOut">
               <a:rPr lang="en-US" smtClean="0"/>
               <a:pPr/>
-              <a:t>5/20/2015</a:t>
+              <a:t>5/22/2015</a:t>
             </a:fld>
             <a:endParaRPr lang="en-US"/>
           </a:p>
@@ -20737,7 +20969,7 @@
             <a:fld id="{EE625E72-7062-4D8E-BA99-F07B9DD1F028}" type="datetimeFigureOut">
               <a:rPr lang="en-US" smtClean="0"/>
               <a:pPr/>
-              <a:t>5/20/2015</a:t>
+              <a:t>5/22/2015</a:t>
             </a:fld>
             <a:endParaRPr lang="en-US"/>
           </a:p>
@@ -20909,7 +21141,7 @@
             <a:fld id="{EE625E72-7062-4D8E-BA99-F07B9DD1F028}" type="datetimeFigureOut">
               <a:rPr lang="en-US" smtClean="0"/>
               <a:pPr/>
-              <a:t>5/20/2015</a:t>
+              <a:t>5/22/2015</a:t>
             </a:fld>
             <a:endParaRPr lang="en-US"/>
           </a:p>
@@ -21091,7 +21323,7 @@
             <a:fld id="{EE625E72-7062-4D8E-BA99-F07B9DD1F028}" type="datetimeFigureOut">
               <a:rPr lang="en-US" smtClean="0"/>
               <a:pPr/>
-              <a:t>5/20/2015</a:t>
+              <a:t>5/22/2015</a:t>
             </a:fld>
             <a:endParaRPr lang="en-US"/>
           </a:p>
@@ -21296,7 +21528,7 @@
             <a:fld id="{EE625E72-7062-4D8E-BA99-F07B9DD1F028}" type="datetimeFigureOut">
               <a:rPr lang="en-US" smtClean="0"/>
               <a:pPr/>
-              <a:t>5/20/2015</a:t>
+              <a:t>5/22/2015</a:t>
             </a:fld>
             <a:endParaRPr lang="en-US"/>
           </a:p>
@@ -21468,7 +21700,7 @@
             <a:fld id="{EE625E72-7062-4D8E-BA99-F07B9DD1F028}" type="datetimeFigureOut">
               <a:rPr lang="en-US" smtClean="0"/>
               <a:pPr/>
-              <a:t>5/20/2015</a:t>
+              <a:t>5/22/2015</a:t>
             </a:fld>
             <a:endParaRPr lang="en-US"/>
           </a:p>
@@ -21721,7 +21953,7 @@
             <a:fld id="{EE625E72-7062-4D8E-BA99-F07B9DD1F028}" type="datetimeFigureOut">
               <a:rPr lang="en-US" smtClean="0"/>
               <a:pPr/>
-              <a:t>5/20/2015</a:t>
+              <a:t>5/22/2015</a:t>
             </a:fld>
             <a:endParaRPr lang="en-US"/>
           </a:p>
@@ -21818,7 +22050,7 @@
             <a:fld id="{EE625E72-7062-4D8E-BA99-F07B9DD1F028}" type="datetimeFigureOut">
               <a:rPr lang="en-US" smtClean="0"/>
               <a:pPr/>
-              <a:t>5/20/2015</a:t>
+              <a:t>5/22/2015</a:t>
             </a:fld>
             <a:endParaRPr lang="en-US"/>
           </a:p>
@@ -22052,7 +22284,7 @@
             <a:fld id="{EE625E72-7062-4D8E-BA99-F07B9DD1F028}" type="datetimeFigureOut">
               <a:rPr lang="en-US" smtClean="0"/>
               <a:pPr/>
-              <a:t>5/20/2015</a:t>
+              <a:t>5/22/2015</a:t>
             </a:fld>
             <a:endParaRPr lang="en-US"/>
           </a:p>
@@ -22401,7 +22633,7 @@
             <a:fld id="{EE625E72-7062-4D8E-BA99-F07B9DD1F028}" type="datetimeFigureOut">
               <a:rPr lang="en-US" smtClean="0"/>
               <a:pPr/>
-              <a:t>5/20/2015</a:t>
+              <a:t>5/22/2015</a:t>
             </a:fld>
             <a:endParaRPr lang="en-US"/>
           </a:p>
@@ -22521,7 +22753,7 @@
             <a:fld id="{EE625E72-7062-4D8E-BA99-F07B9DD1F028}" type="datetimeFigureOut">
               <a:rPr lang="en-US" smtClean="0"/>
               <a:pPr/>
-              <a:t>5/20/2015</a:t>
+              <a:t>5/22/2015</a:t>
             </a:fld>
             <a:endParaRPr lang="en-US"/>
           </a:p>
@@ -22641,7 +22873,7 @@
             <a:fld id="{EE625E72-7062-4D8E-BA99-F07B9DD1F028}" type="datetimeFigureOut">
               <a:rPr lang="en-US" smtClean="0"/>
               <a:pPr/>
-              <a:t>5/20/2015</a:t>
+              <a:t>5/22/2015</a:t>
             </a:fld>
             <a:endParaRPr lang="en-US"/>
           </a:p>
@@ -22927,7 +23159,7 @@
             <a:fld id="{EE625E72-7062-4D8E-BA99-F07B9DD1F028}" type="datetimeFigureOut">
               <a:rPr lang="en-US" smtClean="0"/>
               <a:pPr/>
-              <a:t>5/20/2015</a:t>
+              <a:t>5/22/2015</a:t>
             </a:fld>
             <a:endParaRPr lang="en-US"/>
           </a:p>
@@ -23193,7 +23425,7 @@
             <a:fld id="{EE625E72-7062-4D8E-BA99-F07B9DD1F028}" type="datetimeFigureOut">
               <a:rPr lang="en-US" smtClean="0"/>
               <a:pPr/>
-              <a:t>5/20/2015</a:t>
+              <a:t>5/22/2015</a:t>
             </a:fld>
             <a:endParaRPr lang="en-US"/>
           </a:p>
@@ -23365,7 +23597,7 @@
             <a:fld id="{EE625E72-7062-4D8E-BA99-F07B9DD1F028}" type="datetimeFigureOut">
               <a:rPr lang="en-US" smtClean="0"/>
               <a:pPr/>
-              <a:t>5/20/2015</a:t>
+              <a:t>5/22/2015</a:t>
             </a:fld>
             <a:endParaRPr lang="en-US"/>
           </a:p>
@@ -23547,7 +23779,7 @@
             <a:fld id="{EE625E72-7062-4D8E-BA99-F07B9DD1F028}" type="datetimeFigureOut">
               <a:rPr lang="en-US" smtClean="0"/>
               <a:pPr/>
-              <a:t>5/20/2015</a:t>
+              <a:t>5/22/2015</a:t>
             </a:fld>
             <a:endParaRPr lang="en-US"/>
           </a:p>
@@ -24405,7 +24637,7 @@
             <a:fld id="{EE625E72-7062-4D8E-BA99-F07B9DD1F028}" type="datetimeFigureOut">
               <a:rPr lang="en-US" smtClean="0"/>
               <a:pPr/>
-              <a:t>5/20/2015</a:t>
+              <a:t>5/22/2015</a:t>
             </a:fld>
             <a:endParaRPr lang="en-US"/>
           </a:p>
@@ -24583,7 +24815,7 @@
             <a:fld id="{EE625E72-7062-4D8E-BA99-F07B9DD1F028}" type="datetimeFigureOut">
               <a:rPr lang="en-US" smtClean="0"/>
               <a:pPr/>
-              <a:t>5/20/2015</a:t>
+              <a:t>5/22/2015</a:t>
             </a:fld>
             <a:endParaRPr lang="en-US"/>
           </a:p>
@@ -24869,7 +25101,7 @@
             <a:fld id="{EE625E72-7062-4D8E-BA99-F07B9DD1F028}" type="datetimeFigureOut">
               <a:rPr lang="en-US" smtClean="0"/>
               <a:pPr/>
-              <a:t>5/20/2015</a:t>
+              <a:t>5/22/2015</a:t>
             </a:fld>
             <a:endParaRPr lang="en-US"/>
           </a:p>
@@ -25118,7 +25350,7 @@
             <a:fld id="{EE625E72-7062-4D8E-BA99-F07B9DD1F028}" type="datetimeFigureOut">
               <a:rPr lang="en-US" smtClean="0"/>
               <a:pPr/>
-              <a:t>5/20/2015</a:t>
+              <a:t>5/22/2015</a:t>
             </a:fld>
             <a:endParaRPr lang="en-US"/>
           </a:p>
@@ -25417,7 +25649,7 @@
             <a:fld id="{EE625E72-7062-4D8E-BA99-F07B9DD1F028}" type="datetimeFigureOut">
               <a:rPr lang="en-US" smtClean="0"/>
               <a:pPr/>
-              <a:t>5/20/2015</a:t>
+              <a:t>5/22/2015</a:t>
             </a:fld>
             <a:endParaRPr lang="en-US"/>
           </a:p>
@@ -25798,7 +26030,7 @@
             <a:fld id="{EE625E72-7062-4D8E-BA99-F07B9DD1F028}" type="datetimeFigureOut">
               <a:rPr lang="en-US" smtClean="0"/>
               <a:pPr/>
-              <a:t>5/20/2015</a:t>
+              <a:t>5/22/2015</a:t>
             </a:fld>
             <a:endParaRPr lang="en-US"/>
           </a:p>
@@ -25923,7 +26155,7 @@
             <a:fld id="{EE625E72-7062-4D8E-BA99-F07B9DD1F028}" type="datetimeFigureOut">
               <a:rPr lang="en-US" smtClean="0"/>
               <a:pPr/>
-              <a:t>5/20/2015</a:t>
+              <a:t>5/22/2015</a:t>
             </a:fld>
             <a:endParaRPr lang="en-US"/>
           </a:p>
@@ -26020,7 +26252,7 @@
             <a:fld id="{EE625E72-7062-4D8E-BA99-F07B9DD1F028}" type="datetimeFigureOut">
               <a:rPr lang="en-US" smtClean="0"/>
               <a:pPr/>
-              <a:t>5/20/2015</a:t>
+              <a:t>5/22/2015</a:t>
             </a:fld>
             <a:endParaRPr lang="en-US"/>
           </a:p>
@@ -26277,7 +26509,7 @@
             <a:fld id="{EE625E72-7062-4D8E-BA99-F07B9DD1F028}" type="datetimeFigureOut">
               <a:rPr lang="en-US" smtClean="0"/>
               <a:pPr/>
-              <a:t>5/20/2015</a:t>
+              <a:t>5/22/2015</a:t>
             </a:fld>
             <a:endParaRPr lang="en-US"/>
           </a:p>
@@ -26542,7 +26774,7 @@
             <a:fld id="{EE625E72-7062-4D8E-BA99-F07B9DD1F028}" type="datetimeFigureOut">
               <a:rPr lang="en-US" smtClean="0"/>
               <a:pPr/>
-              <a:t>5/20/2015</a:t>
+              <a:t>5/22/2015</a:t>
             </a:fld>
             <a:endParaRPr lang="en-US"/>
           </a:p>
@@ -26795,7 +27027,7 @@
             <a:fld id="{EE625E72-7062-4D8E-BA99-F07B9DD1F028}" type="datetimeFigureOut">
               <a:rPr lang="en-US" smtClean="0"/>
               <a:pPr/>
-              <a:t>5/20/2015</a:t>
+              <a:t>5/22/2015</a:t>
             </a:fld>
             <a:endParaRPr lang="en-US"/>
           </a:p>
@@ -27111,7 +27343,7 @@
             <a:fld id="{EE625E72-7062-4D8E-BA99-F07B9DD1F028}" type="datetimeFigureOut">
               <a:rPr lang="en-US" smtClean="0"/>
               <a:pPr/>
-              <a:t>5/20/2015</a:t>
+              <a:t>5/22/2015</a:t>
             </a:fld>
             <a:endParaRPr lang="en-US"/>
           </a:p>
@@ -27446,7 +27678,7 @@
             <a:fld id="{EE625E72-7062-4D8E-BA99-F07B9DD1F028}" type="datetimeFigureOut">
               <a:rPr lang="en-US" smtClean="0"/>
               <a:pPr/>
-              <a:t>5/20/2015</a:t>
+              <a:t>5/22/2015</a:t>
             </a:fld>
             <a:endParaRPr lang="en-US"/>
           </a:p>
@@ -27712,7 +27944,7 @@
             <a:fld id="{EE625E72-7062-4D8E-BA99-F07B9DD1F028}" type="datetimeFigureOut">
               <a:rPr lang="en-US" smtClean="0"/>
               <a:pPr/>
-              <a:t>5/20/2015</a:t>
+              <a:t>5/22/2015</a:t>
             </a:fld>
             <a:endParaRPr lang="en-US"/>
           </a:p>
@@ -28028,7 +28260,7 @@
             <a:fld id="{EE625E72-7062-4D8E-BA99-F07B9DD1F028}" type="datetimeFigureOut">
               <a:rPr lang="en-US" smtClean="0"/>
               <a:pPr/>
-              <a:t>5/20/2015</a:t>
+              <a:t>5/22/2015</a:t>
             </a:fld>
             <a:endParaRPr lang="en-US"/>
           </a:p>
@@ -28423,7 +28655,7 @@
             <a:fld id="{EE625E72-7062-4D8E-BA99-F07B9DD1F028}" type="datetimeFigureOut">
               <a:rPr lang="en-US" smtClean="0"/>
               <a:pPr/>
-              <a:t>5/20/2015</a:t>
+              <a:t>5/22/2015</a:t>
             </a:fld>
             <a:endParaRPr lang="en-US"/>
           </a:p>
@@ -28595,7 +28827,7 @@
             <a:fld id="{EE625E72-7062-4D8E-BA99-F07B9DD1F028}" type="datetimeFigureOut">
               <a:rPr lang="en-US" smtClean="0"/>
               <a:pPr/>
-              <a:t>5/20/2015</a:t>
+              <a:t>5/22/2015</a:t>
             </a:fld>
             <a:endParaRPr lang="en-US"/>
           </a:p>
@@ -28777,7 +29009,7 @@
             <a:fld id="{EE625E72-7062-4D8E-BA99-F07B9DD1F028}" type="datetimeFigureOut">
               <a:rPr lang="en-US" smtClean="0"/>
               <a:pPr/>
-              <a:t>5/20/2015</a:t>
+              <a:t>5/22/2015</a:t>
             </a:fld>
             <a:endParaRPr lang="en-US"/>
           </a:p>
@@ -28993,7 +29225,7 @@
             <a:fld id="{EE625E72-7062-4D8E-BA99-F07B9DD1F028}" type="datetimeFigureOut">
               <a:rPr lang="en-US" smtClean="0"/>
               <a:pPr/>
-              <a:t>5/20/2015</a:t>
+              <a:t>5/22/2015</a:t>
             </a:fld>
             <a:endParaRPr lang="en-US"/>
           </a:p>
@@ -29525,7 +29757,7 @@
             <a:fld id="{EE625E72-7062-4D8E-BA99-F07B9DD1F028}" type="datetimeFigureOut">
               <a:rPr lang="en-US" smtClean="0"/>
               <a:pPr/>
-              <a:t>5/20/2015</a:t>
+              <a:t>5/22/2015</a:t>
             </a:fld>
             <a:endParaRPr lang="en-US"/>
           </a:p>
@@ -30057,7 +30289,7 @@
             <a:fld id="{EE625E72-7062-4D8E-BA99-F07B9DD1F028}" type="datetimeFigureOut">
               <a:rPr lang="en-US" smtClean="0"/>
               <a:pPr/>
-              <a:t>5/20/2015</a:t>
+              <a:t>5/22/2015</a:t>
             </a:fld>
             <a:endParaRPr lang="en-US"/>
           </a:p>
@@ -30589,7 +30821,7 @@
             <a:fld id="{EE625E72-7062-4D8E-BA99-F07B9DD1F028}" type="datetimeFigureOut">
               <a:rPr lang="en-US" smtClean="0"/>
               <a:pPr/>
-              <a:t>5/20/2015</a:t>
+              <a:t>5/22/2015</a:t>
             </a:fld>
             <a:endParaRPr lang="en-US"/>
           </a:p>
@@ -31121,7 +31353,7 @@
             <a:fld id="{EE625E72-7062-4D8E-BA99-F07B9DD1F028}" type="datetimeFigureOut">
               <a:rPr lang="en-US" smtClean="0"/>
               <a:pPr/>
-              <a:t>5/20/2015</a:t>
+              <a:t>5/22/2015</a:t>
             </a:fld>
             <a:endParaRPr lang="en-US"/>
           </a:p>
@@ -31653,7 +31885,7 @@
             <a:fld id="{EE625E72-7062-4D8E-BA99-F07B9DD1F028}" type="datetimeFigureOut">
               <a:rPr lang="en-US" smtClean="0"/>
               <a:pPr/>
-              <a:t>5/20/2015</a:t>
+              <a:t>5/22/2015</a:t>
             </a:fld>
             <a:endParaRPr lang="en-US"/>
           </a:p>
@@ -32185,7 +32417,7 @@
             <a:fld id="{EE625E72-7062-4D8E-BA99-F07B9DD1F028}" type="datetimeFigureOut">
               <a:rPr lang="en-US" smtClean="0"/>
               <a:pPr/>
-              <a:t>5/20/2015</a:t>
+              <a:t>5/22/2015</a:t>
             </a:fld>
             <a:endParaRPr lang="en-US"/>
           </a:p>
@@ -33318,7 +33550,7 @@
             <a:fld id="{EE625E72-7062-4D8E-BA99-F07B9DD1F028}" type="datetimeFigureOut">
               <a:rPr lang="en-US" smtClean="0"/>
               <a:pPr/>
-              <a:t>5/20/2015</a:t>
+              <a:t>5/22/2015</a:t>
             </a:fld>
             <a:endParaRPr lang="en-US"/>
           </a:p>
@@ -34032,8 +34264,12 @@
           <a:lstStyle/>
           <a:p>
             <a:r>
+              <a:rPr lang="sk-SK" dirty="0" smtClean="0"/>
+              <a:t>Profile </a:t>
+            </a:r>
+            <a:r>
               <a:rPr lang="en-US" dirty="0" smtClean="0"/>
-              <a:t>Edit page</a:t>
+              <a:t>page</a:t>
             </a:r>
             <a:endParaRPr lang="sk-SK" dirty="0"/>
           </a:p>
@@ -34063,8 +34299,8 @@
         </p:blipFill>
         <p:spPr>
           <a:xfrm>
-            <a:off x="5934973" y="0"/>
-            <a:ext cx="3209027" cy="6858000"/>
+            <a:off x="1115616" y="3324161"/>
+            <a:ext cx="6768752" cy="3211631"/>
           </a:xfrm>
         </p:spPr>
       </p:pic>
@@ -34081,77 +34317,32 @@
         <p:spPr>
           <a:xfrm>
             <a:off x="609600" y="1772816"/>
-            <a:ext cx="3088110" cy="3880773"/>
+            <a:ext cx="6194648" cy="3880773"/>
           </a:xfrm>
         </p:spPr>
         <p:txBody>
           <a:bodyPr/>
           <a:lstStyle/>
           <a:p>
-            <a:r>
-              <a:rPr lang="en-US" dirty="0" smtClean="0"/>
-              <a:t>AngularJS framework</a:t>
-            </a:r>
-          </a:p>
-          <a:p>
             <a:pPr lvl="1"/>
             <a:r>
-              <a:rPr lang="en-US" dirty="0" err="1" smtClean="0"/>
-              <a:t>Dynamick</a:t>
-            </a:r>
-            <a:r>
               <a:rPr lang="sk-SK" dirty="0" smtClean="0"/>
-              <a:t>ý obsah</a:t>
+              <a:t>Prehľad základný informácií</a:t>
             </a:r>
           </a:p>
           <a:p>
             <a:pPr lvl="1"/>
             <a:r>
-              <a:rPr lang="sk-SK" dirty="0"/>
-              <a:t>Jednoduché načítanie existujúceho </a:t>
-            </a:r>
-            <a:r>
               <a:rPr lang="sk-SK" dirty="0" smtClean="0"/>
-              <a:t>životopisu</a:t>
-            </a:r>
-          </a:p>
-          <a:p>
-            <a:pPr lvl="1"/>
+              <a:t>Stiahnutie PDF súboru</a:t>
+            </a:r>
+          </a:p>
+          <a:p>
+            <a:pPr lvl="2"/>
             <a:r>
               <a:rPr lang="sk-SK" dirty="0" smtClean="0"/>
-              <a:t>Validácia údajov HTML5 atribútmi a </a:t>
-            </a:r>
-            <a:r>
-              <a:rPr lang="sk-SK" dirty="0" err="1" smtClean="0"/>
-              <a:t>JavaScriptom</a:t>
-            </a:r>
-            <a:endParaRPr lang="sk-SK" dirty="0" smtClean="0"/>
-          </a:p>
-          <a:p>
-            <a:pPr lvl="1"/>
-            <a:r>
-              <a:rPr lang="sk-SK" dirty="0" err="1" smtClean="0"/>
-              <a:t>Inline</a:t>
-            </a:r>
-            <a:r>
-              <a:rPr lang="sk-SK" dirty="0" smtClean="0"/>
-              <a:t> </a:t>
-            </a:r>
-            <a:r>
-              <a:rPr lang="sk-SK" dirty="0" err="1" smtClean="0"/>
-              <a:t>nápoveda</a:t>
-            </a:r>
-            <a:endParaRPr lang="sk-SK" dirty="0" smtClean="0"/>
-          </a:p>
-          <a:p>
-            <a:pPr lvl="1"/>
-            <a:r>
-              <a:rPr lang="sk-SK" dirty="0" smtClean="0"/>
-              <a:t>Odosielanie JSON objektu na server</a:t>
-            </a:r>
-          </a:p>
-          <a:p>
-            <a:pPr lvl="1"/>
+              <a:t>Užívateľ volí jazyk, ktorý má byť použitý pri generovaní</a:t>
+            </a:r>
             <a:endParaRPr lang="sk-SK" dirty="0"/>
           </a:p>
         </p:txBody>
@@ -34159,7 +34350,7 @@
     </p:spTree>
     <p:extLst>
       <p:ext uri="{BB962C8B-B14F-4D97-AF65-F5344CB8AC3E}">
-        <p14:creationId xmlns:p14="http://schemas.microsoft.com/office/powerpoint/2010/main" val="1565969837"/>
+        <p14:creationId xmlns:p14="http://schemas.microsoft.com/office/powerpoint/2010/main" val="3505071981"/>
       </p:ext>
     </p:extLst>
   </p:cSld>
@@ -34195,7 +34386,7 @@
       </p:grpSpPr>
       <p:sp>
         <p:nvSpPr>
-          <p:cNvPr id="2" name="Nadpis 1"/>
+          <p:cNvPr id="5" name="Title 4"/>
           <p:cNvSpPr>
             <a:spLocks noGrp="1"/>
           </p:cNvSpPr>
@@ -34209,93 +34400,198 @@
           <a:lstStyle/>
           <a:p>
             <a:r>
+              <a:rPr kumimoji="0" lang="sk-SK" sz="3300" kern="1200" noProof="0" dirty="0" smtClean="0">
+                <a:solidFill>
+                  <a:schemeClr val="accent3">
+                    <a:shade val="75000"/>
+                  </a:schemeClr>
+                </a:solidFill>
+                <a:latin typeface="+mj-lt"/>
+                <a:ea typeface="+mj-ea"/>
+                <a:cs typeface="+mj-cs"/>
+              </a:rPr>
+              <a:t>Servisná vrstva</a:t>
+            </a:r>
+            <a:br>
+              <a:rPr kumimoji="0" lang="sk-SK" sz="3300" kern="1200" noProof="0" dirty="0" smtClean="0">
+                <a:solidFill>
+                  <a:schemeClr val="accent3">
+                    <a:shade val="75000"/>
+                  </a:schemeClr>
+                </a:solidFill>
+                <a:latin typeface="+mj-lt"/>
+                <a:ea typeface="+mj-ea"/>
+                <a:cs typeface="+mj-cs"/>
+              </a:rPr>
+            </a:br>
+            <a:r>
+              <a:rPr lang="sk-SK" sz="3300" noProof="0" dirty="0" smtClean="0">
+                <a:solidFill>
+                  <a:schemeClr val="accent3">
+                    <a:shade val="75000"/>
+                  </a:schemeClr>
+                </a:solidFill>
+              </a:rPr>
+              <a:t>[Patrik </a:t>
+            </a:r>
+            <a:r>
+              <a:rPr lang="sk-SK" sz="3300" noProof="0" dirty="0" err="1" smtClean="0">
+                <a:solidFill>
+                  <a:schemeClr val="accent3">
+                    <a:shade val="75000"/>
+                  </a:schemeClr>
+                </a:solidFill>
+              </a:rPr>
+              <a:t>Cyprian</a:t>
+            </a:r>
+            <a:r>
+              <a:rPr lang="sk-SK" sz="3300" dirty="0" smtClean="0">
+                <a:solidFill>
+                  <a:schemeClr val="accent3">
+                    <a:shade val="75000"/>
+                  </a:schemeClr>
+                </a:solidFill>
+              </a:rPr>
+              <a:t>]</a:t>
+            </a:r>
+            <a:endParaRPr lang="sk-SK" noProof="0" dirty="0"/>
+          </a:p>
+        </p:txBody>
+      </p:sp>
+      <p:sp>
+        <p:nvSpPr>
+          <p:cNvPr id="6" name="Content Placeholder 5"/>
+          <p:cNvSpPr>
+            <a:spLocks noGrp="1"/>
+          </p:cNvSpPr>
+          <p:nvPr>
+            <p:ph idx="1"/>
+          </p:nvPr>
+        </p:nvSpPr>
+        <p:spPr/>
+        <p:txBody>
+          <a:bodyPr/>
+          <a:lstStyle/>
+          <a:p>
+            <a:r>
+              <a:rPr kumimoji="0" lang="sk-SK" sz="2700" kern="1200" noProof="0" dirty="0" err="1" smtClean="0">
+                <a:solidFill>
+                  <a:schemeClr val="tx1"/>
+                </a:solidFill>
+                <a:latin typeface="+mn-lt"/>
+                <a:ea typeface="+mn-ea"/>
+                <a:cs typeface="+mn-cs"/>
+              </a:rPr>
+              <a:t>UserService</a:t>
+            </a:r>
+            <a:r>
+              <a:rPr kumimoji="0" lang="sk-SK" sz="2700" kern="1200" noProof="0" dirty="0" smtClean="0">
+                <a:solidFill>
+                  <a:schemeClr val="tx1"/>
+                </a:solidFill>
+                <a:latin typeface="+mn-lt"/>
+                <a:ea typeface="+mn-ea"/>
+                <a:cs typeface="+mn-cs"/>
+              </a:rPr>
+              <a:t> interface</a:t>
+            </a:r>
+          </a:p>
+          <a:p>
+            <a:pPr lvl="1"/>
+            <a:r>
+              <a:rPr lang="sk-SK" noProof="0" dirty="0" smtClean="0"/>
+              <a:t>Databáza užívateľov - XML súbor users.xml</a:t>
+            </a:r>
+          </a:p>
+          <a:p>
+            <a:pPr lvl="1"/>
+            <a:r>
+              <a:rPr lang="sk-SK" noProof="0" dirty="0" err="1" smtClean="0"/>
+              <a:t>XPath</a:t>
+            </a:r>
+            <a:r>
+              <a:rPr lang="sk-SK" noProof="0" dirty="0" smtClean="0"/>
+              <a:t> – získavanie </a:t>
+            </a:r>
+            <a:r>
+              <a:rPr lang="sk-SK" noProof="0" dirty="0" err="1" smtClean="0"/>
+              <a:t>loginu</a:t>
+            </a:r>
+            <a:r>
+              <a:rPr lang="sk-SK" noProof="0" dirty="0" smtClean="0"/>
+              <a:t> a hesla</a:t>
+            </a:r>
+          </a:p>
+          <a:p>
+            <a:pPr lvl="1"/>
+            <a:r>
               <a:rPr lang="sk-SK" dirty="0" smtClean="0"/>
-              <a:t>Profile </a:t>
-            </a:r>
-            <a:r>
-              <a:rPr lang="en-US" dirty="0" smtClean="0"/>
-              <a:t>page</a:t>
-            </a:r>
-            <a:endParaRPr lang="sk-SK" dirty="0"/>
+              <a:t>Unikátny </a:t>
+            </a:r>
+            <a:r>
+              <a:rPr lang="sk-SK" dirty="0" err="1" smtClean="0"/>
+              <a:t>login</a:t>
+            </a:r>
+            <a:endParaRPr lang="sk-SK" dirty="0" smtClean="0"/>
+          </a:p>
+          <a:p>
+            <a:pPr lvl="1"/>
+            <a:r>
+              <a:rPr lang="sk-SK" noProof="0" dirty="0" err="1" smtClean="0"/>
+              <a:t>Hashovanie</a:t>
+            </a:r>
+            <a:r>
+              <a:rPr lang="sk-SK" noProof="0" dirty="0" smtClean="0"/>
+              <a:t> hesla</a:t>
+            </a:r>
+          </a:p>
+          <a:p>
+            <a:pPr lvl="1"/>
+            <a:r>
+              <a:rPr lang="sk-SK" dirty="0" smtClean="0"/>
+              <a:t>Kontrola údajov</a:t>
+            </a:r>
+            <a:endParaRPr lang="sk-SK" noProof="0" dirty="0" smtClean="0"/>
+          </a:p>
+          <a:p>
+            <a:pPr lvl="1"/>
+            <a:endParaRPr lang="sk-SK" noProof="0" dirty="0"/>
           </a:p>
         </p:txBody>
       </p:sp>
       <p:pic>
         <p:nvPicPr>
-          <p:cNvPr id="7" name="Zástupný symbol obsahu 6"/>
+          <p:cNvPr id="2" name="Obrázok 1"/>
           <p:cNvPicPr>
-            <a:picLocks noGrp="1" noChangeAspect="1"/>
+            <a:picLocks noChangeAspect="1"/>
           </p:cNvPicPr>
-          <p:nvPr>
-            <p:ph sz="half" idx="1"/>
-          </p:nvPr>
+          <p:nvPr/>
         </p:nvPicPr>
-        <p:blipFill>
-          <a:blip r:embed="rId2" cstate="print">
+        <p:blipFill rotWithShape="1">
+          <a:blip r:embed="rId3">
             <a:extLst>
               <a:ext uri="{28A0092B-C50C-407E-A947-70E740481C1C}">
                 <a14:useLocalDpi xmlns:a14="http://schemas.microsoft.com/office/drawing/2010/main" val="0"/>
               </a:ext>
             </a:extLst>
           </a:blip>
-          <a:stretch>
-            <a:fillRect/>
-          </a:stretch>
+          <a:srcRect r="7519"/>
+          <a:stretch/>
         </p:blipFill>
         <p:spPr>
           <a:xfrm>
-            <a:off x="1115616" y="3324161"/>
-            <a:ext cx="6768752" cy="3211631"/>
+            <a:off x="3383360" y="3581488"/>
+            <a:ext cx="5760640" cy="3276512"/>
           </a:xfrm>
+          <a:prstGeom prst="rect">
+            <a:avLst/>
+          </a:prstGeom>
         </p:spPr>
       </p:pic>
-      <p:sp>
-        <p:nvSpPr>
-          <p:cNvPr id="9" name="Zástupný symbol obsahu 8"/>
-          <p:cNvSpPr>
-            <a:spLocks noGrp="1"/>
-          </p:cNvSpPr>
-          <p:nvPr>
-            <p:ph sz="half" idx="2"/>
-          </p:nvPr>
-        </p:nvSpPr>
-        <p:spPr>
-          <a:xfrm>
-            <a:off x="609600" y="1772816"/>
-            <a:ext cx="6194648" cy="3880773"/>
-          </a:xfrm>
-        </p:spPr>
-        <p:txBody>
-          <a:bodyPr/>
-          <a:lstStyle/>
-          <a:p>
-            <a:pPr lvl="1"/>
-            <a:r>
-              <a:rPr lang="sk-SK" dirty="0" smtClean="0"/>
-              <a:t>Prehľad základný informácií</a:t>
-            </a:r>
-          </a:p>
-          <a:p>
-            <a:pPr lvl="1"/>
-            <a:r>
-              <a:rPr lang="sk-SK" dirty="0" smtClean="0"/>
-              <a:t>Stiahnutie PDF súboru</a:t>
-            </a:r>
-          </a:p>
-          <a:p>
-            <a:pPr lvl="2"/>
-            <a:r>
-              <a:rPr lang="sk-SK" dirty="0" smtClean="0"/>
-              <a:t>Užívateľ volí jazyk, ktorý má byť použitý pri generovaní</a:t>
-            </a:r>
-            <a:endParaRPr lang="sk-SK" dirty="0"/>
-          </a:p>
-        </p:txBody>
-      </p:sp>
     </p:spTree>
     <p:extLst>
       <p:ext uri="{BB962C8B-B14F-4D97-AF65-F5344CB8AC3E}">
-        <p14:creationId xmlns:p14="http://schemas.microsoft.com/office/powerpoint/2010/main" val="3505071981"/>
+        <p14:creationId xmlns:p14="http://schemas.microsoft.com/office/powerpoint/2010/main" val="1816225994"/>
       </p:ext>
     </p:extLst>
   </p:cSld>
@@ -34419,6 +34715,17 @@
           <a:lstStyle/>
           <a:p>
             <a:r>
+              <a:rPr kumimoji="0" lang="sk-SK" sz="2700" kern="1200" noProof="0" dirty="0" err="1" smtClean="0">
+                <a:solidFill>
+                  <a:schemeClr val="tx1"/>
+                </a:solidFill>
+                <a:latin typeface="+mn-lt"/>
+                <a:ea typeface="+mn-ea"/>
+                <a:cs typeface="+mn-cs"/>
+              </a:rPr>
+              <a:t>CvService</a:t>
+            </a:r>
+            <a:r>
               <a:rPr kumimoji="0" lang="sk-SK" sz="2700" kern="1200" noProof="0" dirty="0" smtClean="0">
                 <a:solidFill>
                   <a:schemeClr val="tx1"/>
@@ -34427,7 +34734,127 @@
                 <a:ea typeface="+mn-ea"/>
                 <a:cs typeface="+mn-cs"/>
               </a:rPr>
-              <a:t>TODO</a:t>
+              <a:t> interface</a:t>
+            </a:r>
+          </a:p>
+          <a:p>
+            <a:pPr lvl="1"/>
+            <a:r>
+              <a:rPr lang="sk-SK" noProof="0" dirty="0" smtClean="0"/>
+              <a:t>Ukladanie a načítanie životopisov </a:t>
+            </a:r>
+          </a:p>
+          <a:p>
+            <a:pPr lvl="2"/>
+            <a:r>
+              <a:rPr lang="sk-SK" dirty="0" smtClean="0"/>
+              <a:t>Transformácia – XML </a:t>
+            </a:r>
+            <a:r>
+              <a:rPr lang="en-US" dirty="0" smtClean="0"/>
+              <a:t>&lt; - &gt; </a:t>
+            </a:r>
+            <a:r>
+              <a:rPr lang="en-US" dirty="0" err="1" smtClean="0"/>
+              <a:t>Json</a:t>
+            </a:r>
+            <a:endParaRPr lang="en-US" dirty="0" smtClean="0"/>
+          </a:p>
+          <a:p>
+            <a:pPr lvl="2"/>
+            <a:r>
+              <a:rPr lang="en-US" noProof="0" dirty="0" smtClean="0"/>
+              <a:t>Valid</a:t>
+            </a:r>
+            <a:r>
+              <a:rPr lang="sk-SK" noProof="0" dirty="0" err="1" smtClean="0"/>
+              <a:t>ácia</a:t>
+            </a:r>
+            <a:r>
+              <a:rPr lang="sk-SK" noProof="0" dirty="0" smtClean="0"/>
+              <a:t> pomocou XML </a:t>
+            </a:r>
+            <a:r>
+              <a:rPr lang="sk-SK" noProof="0" dirty="0" err="1" smtClean="0"/>
+              <a:t>Schema</a:t>
+            </a:r>
+            <a:endParaRPr lang="sk-SK" noProof="0" dirty="0" smtClean="0"/>
+          </a:p>
+          <a:p>
+            <a:pPr lvl="2"/>
+            <a:r>
+              <a:rPr lang="sk-SK" dirty="0" smtClean="0"/>
+              <a:t>Uloženie </a:t>
+            </a:r>
+            <a:r>
+              <a:rPr lang="en-US" dirty="0"/>
+              <a:t>&lt;</a:t>
+            </a:r>
+            <a:r>
+              <a:rPr lang="en-US" dirty="0" smtClean="0"/>
+              <a:t>login</a:t>
+            </a:r>
+            <a:r>
+              <a:rPr lang="en-US" dirty="0"/>
+              <a:t>&gt;</a:t>
+            </a:r>
+            <a:r>
+              <a:rPr lang="en-US" dirty="0" smtClean="0"/>
+              <a:t>.xml</a:t>
+            </a:r>
+          </a:p>
+          <a:p>
+            <a:pPr lvl="1"/>
+            <a:r>
+              <a:rPr lang="en-US" noProof="0" dirty="0" err="1" smtClean="0"/>
+              <a:t>Generovanie</a:t>
+            </a:r>
+            <a:r>
+              <a:rPr lang="en-US" noProof="0" dirty="0" smtClean="0"/>
+              <a:t> PDF </a:t>
+            </a:r>
+            <a:r>
+              <a:rPr lang="sk-SK" noProof="0" dirty="0" smtClean="0"/>
+              <a:t>životopisu</a:t>
+            </a:r>
+          </a:p>
+          <a:p>
+            <a:pPr lvl="2"/>
+            <a:r>
+              <a:rPr lang="sk-SK" dirty="0" smtClean="0"/>
+              <a:t>XSLT transformácia XML do Te</a:t>
+            </a:r>
+            <a:r>
+              <a:rPr lang="en-US" dirty="0" smtClean="0"/>
+              <a:t>X-u</a:t>
+            </a:r>
+            <a:endParaRPr lang="sk-SK" dirty="0" smtClean="0"/>
+          </a:p>
+          <a:p>
+            <a:pPr lvl="2"/>
+            <a:r>
+              <a:rPr lang="sk-SK" noProof="0" dirty="0" smtClean="0"/>
+              <a:t>Vytvorenie procesu na vygenerovanie PDF</a:t>
+            </a:r>
+            <a:r>
+              <a:rPr lang="en-US" noProof="0" dirty="0" smtClean="0"/>
+              <a:t> – 2 </a:t>
+            </a:r>
+            <a:r>
+              <a:rPr lang="en-US" noProof="0" dirty="0" err="1" smtClean="0"/>
+              <a:t>jazyky</a:t>
+            </a:r>
+            <a:endParaRPr lang="sk-SK" noProof="0" dirty="0" smtClean="0"/>
+          </a:p>
+          <a:p>
+            <a:pPr lvl="2"/>
+            <a:r>
+              <a:rPr lang="sk-SK" noProof="0" dirty="0" smtClean="0"/>
+              <a:t>Vymazanie nepotrebných súborov</a:t>
+            </a:r>
+            <a:r>
+              <a:rPr lang="en-US" noProof="0" dirty="0" smtClean="0"/>
+              <a:t>	</a:t>
             </a:r>
             <a:endParaRPr lang="sk-SK" noProof="0" dirty="0"/>
           </a:p>
@@ -34436,7 +34863,7 @@
     </p:spTree>
     <p:extLst>
       <p:ext uri="{BB962C8B-B14F-4D97-AF65-F5344CB8AC3E}">
-        <p14:creationId xmlns:p14="http://schemas.microsoft.com/office/powerpoint/2010/main" val="1816225994"/>
+        <p14:creationId xmlns:p14="http://schemas.microsoft.com/office/powerpoint/2010/main" val="2132640337"/>
       </p:ext>
     </p:extLst>
   </p:cSld>
@@ -34581,23 +35008,64 @@
             <p:ph idx="1"/>
           </p:nvPr>
         </p:nvSpPr>
-        <p:spPr/>
-        <p:txBody>
-          <a:bodyPr/>
-          <a:lstStyle/>
-          <a:p>
-            <a:r>
-              <a:rPr kumimoji="0" lang="sk-SK" sz="2700" kern="1200" noProof="0" dirty="0" smtClean="0">
-                <a:solidFill>
-                  <a:schemeClr val="tx1"/>
-                </a:solidFill>
-                <a:latin typeface="+mn-lt"/>
-                <a:ea typeface="+mn-ea"/>
-                <a:cs typeface="+mn-cs"/>
-              </a:rPr>
-              <a:t>TODO</a:t>
-            </a:r>
-            <a:endParaRPr lang="sk-SK" noProof="0" dirty="0"/>
+        <p:spPr>
+          <a:xfrm>
+            <a:off x="622770" y="2276872"/>
+            <a:ext cx="6347714" cy="3880773"/>
+          </a:xfrm>
+        </p:spPr>
+        <p:txBody>
+          <a:bodyPr>
+            <a:normAutofit/>
+          </a:bodyPr>
+          <a:lstStyle/>
+          <a:p>
+            <a:pPr lvl="1"/>
+            <a:r>
+              <a:rPr lang="sk-SK" sz="2800" b="1" dirty="0" smtClean="0"/>
+              <a:t>JSON</a:t>
+            </a:r>
+            <a:r>
+              <a:rPr lang="en-US" sz="2800" b="1" noProof="0" dirty="0" smtClean="0"/>
+              <a:t> </a:t>
+            </a:r>
+            <a:r>
+              <a:rPr lang="sk-SK" sz="2800" b="1" noProof="0" dirty="0" smtClean="0"/>
+              <a:t>-&gt; XML</a:t>
+            </a:r>
+          </a:p>
+          <a:p>
+            <a:pPr lvl="2"/>
+            <a:r>
+              <a:rPr lang="sk-SK" sz="2200" dirty="0" smtClean="0"/>
+              <a:t>Java Dom API</a:t>
+            </a:r>
+          </a:p>
+          <a:p>
+            <a:pPr lvl="2"/>
+            <a:r>
+              <a:rPr lang="sk-SK" sz="2200" dirty="0" smtClean="0"/>
+              <a:t>Ukladanie dát na disk</a:t>
+            </a:r>
+          </a:p>
+          <a:p>
+            <a:pPr lvl="2"/>
+            <a:r>
+              <a:rPr lang="sk-SK" sz="2200" dirty="0" smtClean="0"/>
+              <a:t>Napasovanie na preddefinovanú štruktúru</a:t>
+            </a:r>
+          </a:p>
+          <a:p>
+            <a:pPr lvl="2"/>
+            <a:endParaRPr lang="sk-SK" sz="2200" dirty="0"/>
+          </a:p>
+          <a:p>
+            <a:pPr lvl="2"/>
+            <a:endParaRPr lang="sk-SK" sz="2200" noProof="0" dirty="0" smtClean="0"/>
+          </a:p>
+          <a:p>
+            <a:pPr lvl="2"/>
+            <a:endParaRPr lang="sk-SK" sz="2200" noProof="0" dirty="0"/>
           </a:p>
         </p:txBody>
       </p:sp>
@@ -34650,6 +35118,444 @@
         </p:nvSpPr>
         <p:spPr/>
         <p:txBody>
+          <a:bodyPr>
+            <a:normAutofit fontScale="90000"/>
+          </a:bodyPr>
+          <a:lstStyle/>
+          <a:p>
+            <a:r>
+              <a:rPr kumimoji="0" lang="sk-SK" sz="3300" kern="1200" noProof="0" dirty="0" smtClean="0">
+                <a:solidFill>
+                  <a:schemeClr val="accent3">
+                    <a:shade val="75000"/>
+                  </a:schemeClr>
+                </a:solidFill>
+                <a:latin typeface="+mj-lt"/>
+                <a:ea typeface="+mj-ea"/>
+                <a:cs typeface="+mj-cs"/>
+              </a:rPr>
+              <a:t>JSON &amp; XML transformácie, </a:t>
+            </a:r>
+            <a:br>
+              <a:rPr kumimoji="0" lang="sk-SK" sz="3300" kern="1200" noProof="0" dirty="0" smtClean="0">
+                <a:solidFill>
+                  <a:schemeClr val="accent3">
+                    <a:shade val="75000"/>
+                  </a:schemeClr>
+                </a:solidFill>
+                <a:latin typeface="+mj-lt"/>
+                <a:ea typeface="+mj-ea"/>
+                <a:cs typeface="+mj-cs"/>
+              </a:rPr>
+            </a:br>
+            <a:r>
+              <a:rPr kumimoji="0" lang="sk-SK" sz="3300" kern="1200" noProof="0" dirty="0" smtClean="0">
+                <a:solidFill>
+                  <a:schemeClr val="accent3">
+                    <a:shade val="75000"/>
+                  </a:schemeClr>
+                </a:solidFill>
+                <a:latin typeface="+mj-lt"/>
+                <a:ea typeface="+mj-ea"/>
+                <a:cs typeface="+mj-cs"/>
+              </a:rPr>
+              <a:t>XML Schéma</a:t>
+            </a:r>
+            <a:br>
+              <a:rPr kumimoji="0" lang="sk-SK" sz="3300" kern="1200" noProof="0" dirty="0" smtClean="0">
+                <a:solidFill>
+                  <a:schemeClr val="accent3">
+                    <a:shade val="75000"/>
+                  </a:schemeClr>
+                </a:solidFill>
+                <a:latin typeface="+mj-lt"/>
+                <a:ea typeface="+mj-ea"/>
+                <a:cs typeface="+mj-cs"/>
+              </a:rPr>
+            </a:br>
+            <a:r>
+              <a:rPr lang="sk-SK" sz="3300" noProof="0" dirty="0" smtClean="0">
+                <a:solidFill>
+                  <a:schemeClr val="accent3">
+                    <a:shade val="75000"/>
+                  </a:schemeClr>
+                </a:solidFill>
+              </a:rPr>
+              <a:t>[Peter </a:t>
+            </a:r>
+            <a:r>
+              <a:rPr lang="sk-SK" sz="3300" noProof="0" dirty="0" err="1" smtClean="0">
+                <a:solidFill>
+                  <a:schemeClr val="accent3">
+                    <a:shade val="75000"/>
+                  </a:schemeClr>
+                </a:solidFill>
+              </a:rPr>
+              <a:t>Köberling</a:t>
+            </a:r>
+            <a:r>
+              <a:rPr lang="sk-SK" sz="3300" noProof="0" dirty="0" smtClean="0">
+                <a:solidFill>
+                  <a:schemeClr val="accent3">
+                    <a:shade val="75000"/>
+                  </a:schemeClr>
+                </a:solidFill>
+              </a:rPr>
+              <a:t>]</a:t>
+            </a:r>
+            <a:endParaRPr lang="sk-SK" noProof="0" dirty="0"/>
+          </a:p>
+        </p:txBody>
+      </p:sp>
+      <p:sp>
+        <p:nvSpPr>
+          <p:cNvPr id="6" name="Content Placeholder 5"/>
+          <p:cNvSpPr>
+            <a:spLocks noGrp="1"/>
+          </p:cNvSpPr>
+          <p:nvPr>
+            <p:ph idx="1"/>
+          </p:nvPr>
+        </p:nvSpPr>
+        <p:spPr>
+          <a:xfrm>
+            <a:off x="622770" y="2276872"/>
+            <a:ext cx="6347714" cy="3880773"/>
+          </a:xfrm>
+        </p:spPr>
+        <p:txBody>
+          <a:bodyPr>
+            <a:normAutofit/>
+          </a:bodyPr>
+          <a:lstStyle/>
+          <a:p>
+            <a:pPr lvl="1"/>
+            <a:r>
+              <a:rPr lang="sk-SK" sz="2800" b="1" noProof="0" dirty="0" smtClean="0"/>
+              <a:t>XML</a:t>
+            </a:r>
+            <a:r>
+              <a:rPr lang="en-US" sz="2800" b="1" noProof="0" dirty="0" smtClean="0"/>
+              <a:t> </a:t>
+            </a:r>
+            <a:r>
+              <a:rPr lang="sk-SK" sz="2800" b="1" noProof="0" dirty="0" smtClean="0"/>
+              <a:t>-&gt; JSON</a:t>
+            </a:r>
+          </a:p>
+          <a:p>
+            <a:pPr lvl="2"/>
+            <a:r>
+              <a:rPr lang="sk-SK" sz="2200" dirty="0" smtClean="0"/>
+              <a:t>Poskytovanie uložených </a:t>
+            </a:r>
+            <a:r>
+              <a:rPr lang="sk-SK" sz="2200" dirty="0" err="1" smtClean="0"/>
+              <a:t>dat</a:t>
+            </a:r>
+            <a:r>
+              <a:rPr lang="sk-SK" sz="2200" dirty="0" smtClean="0"/>
+              <a:t> </a:t>
+            </a:r>
+            <a:r>
+              <a:rPr lang="sk-SK" sz="2200" dirty="0" err="1" smtClean="0"/>
+              <a:t>javascrptu</a:t>
+            </a:r>
+            <a:r>
+              <a:rPr lang="sk-SK" sz="2200" dirty="0" smtClean="0"/>
+              <a:t> (AngularJS)</a:t>
+            </a:r>
+          </a:p>
+          <a:p>
+            <a:pPr lvl="2"/>
+            <a:r>
+              <a:rPr lang="sk-SK" sz="2200" dirty="0" smtClean="0"/>
+              <a:t>Napasovanie na preddefinovanú </a:t>
+            </a:r>
+            <a:r>
+              <a:rPr lang="sk-SK" sz="2200" dirty="0" err="1" smtClean="0"/>
+              <a:t>json</a:t>
+            </a:r>
+            <a:r>
+              <a:rPr lang="sk-SK" sz="2200" dirty="0" smtClean="0"/>
+              <a:t> štruktúru </a:t>
+            </a:r>
+            <a:endParaRPr lang="sk-SK" sz="2200" dirty="0"/>
+          </a:p>
+          <a:p>
+            <a:pPr lvl="2"/>
+            <a:r>
+              <a:rPr lang="sk-SK" sz="2200" dirty="0" smtClean="0"/>
+              <a:t>Prispôsobenie existujúcej knižnice, kontrolovanie elementov</a:t>
+            </a:r>
+            <a:endParaRPr lang="sk-SK" sz="2200" noProof="0" dirty="0" smtClean="0"/>
+          </a:p>
+          <a:p>
+            <a:pPr lvl="2"/>
+            <a:endParaRPr lang="sk-SK" sz="2200" noProof="0" dirty="0"/>
+          </a:p>
+        </p:txBody>
+      </p:sp>
+    </p:spTree>
+    <p:extLst>
+      <p:ext uri="{BB962C8B-B14F-4D97-AF65-F5344CB8AC3E}">
+        <p14:creationId xmlns:p14="http://schemas.microsoft.com/office/powerpoint/2010/main" val="2039330068"/>
+      </p:ext>
+    </p:extLst>
+  </p:cSld>
+  <p:clrMapOvr>
+    <a:masterClrMapping/>
+  </p:clrMapOvr>
+  <p:timing>
+    <p:tnLst>
+      <p:par>
+        <p:cTn id="1" dur="indefinite" restart="never" nodeType="tmRoot"/>
+      </p:par>
+    </p:tnLst>
+  </p:timing>
+</p:sld>
+</file>
+
+<file path=ppt/slides/slide15.xml><?xml version="1.0" encoding="utf-8"?>
+<p:sld xmlns:a="http://schemas.openxmlformats.org/drawingml/2006/main" xmlns:r="http://schemas.openxmlformats.org/officeDocument/2006/relationships" xmlns:p="http://schemas.openxmlformats.org/presentationml/2006/main">
+  <p:cSld>
+    <p:spTree>
+      <p:nvGrpSpPr>
+        <p:cNvPr id="1" name=""/>
+        <p:cNvGrpSpPr/>
+        <p:nvPr/>
+      </p:nvGrpSpPr>
+      <p:grpSpPr>
+        <a:xfrm>
+          <a:off x="0" y="0"/>
+          <a:ext cx="0" cy="0"/>
+          <a:chOff x="0" y="0"/>
+          <a:chExt cx="0" cy="0"/>
+        </a:xfrm>
+      </p:grpSpPr>
+      <p:sp>
+        <p:nvSpPr>
+          <p:cNvPr id="5" name="Title 4"/>
+          <p:cNvSpPr>
+            <a:spLocks noGrp="1"/>
+          </p:cNvSpPr>
+          <p:nvPr>
+            <p:ph type="title"/>
+          </p:nvPr>
+        </p:nvSpPr>
+        <p:spPr/>
+        <p:txBody>
+          <a:bodyPr>
+            <a:normAutofit fontScale="90000"/>
+          </a:bodyPr>
+          <a:lstStyle/>
+          <a:p>
+            <a:r>
+              <a:rPr kumimoji="0" lang="sk-SK" sz="3300" kern="1200" noProof="0" dirty="0" smtClean="0">
+                <a:solidFill>
+                  <a:schemeClr val="accent3">
+                    <a:shade val="75000"/>
+                  </a:schemeClr>
+                </a:solidFill>
+                <a:latin typeface="+mj-lt"/>
+                <a:ea typeface="+mj-ea"/>
+                <a:cs typeface="+mj-cs"/>
+              </a:rPr>
+              <a:t>JSON &amp; XML transformácie, </a:t>
+            </a:r>
+            <a:br>
+              <a:rPr kumimoji="0" lang="sk-SK" sz="3300" kern="1200" noProof="0" dirty="0" smtClean="0">
+                <a:solidFill>
+                  <a:schemeClr val="accent3">
+                    <a:shade val="75000"/>
+                  </a:schemeClr>
+                </a:solidFill>
+                <a:latin typeface="+mj-lt"/>
+                <a:ea typeface="+mj-ea"/>
+                <a:cs typeface="+mj-cs"/>
+              </a:rPr>
+            </a:br>
+            <a:r>
+              <a:rPr kumimoji="0" lang="sk-SK" sz="3300" kern="1200" noProof="0" dirty="0" smtClean="0">
+                <a:solidFill>
+                  <a:schemeClr val="accent3">
+                    <a:shade val="75000"/>
+                  </a:schemeClr>
+                </a:solidFill>
+                <a:latin typeface="+mj-lt"/>
+                <a:ea typeface="+mj-ea"/>
+                <a:cs typeface="+mj-cs"/>
+              </a:rPr>
+              <a:t>XML Schéma</a:t>
+            </a:r>
+            <a:br>
+              <a:rPr kumimoji="0" lang="sk-SK" sz="3300" kern="1200" noProof="0" dirty="0" smtClean="0">
+                <a:solidFill>
+                  <a:schemeClr val="accent3">
+                    <a:shade val="75000"/>
+                  </a:schemeClr>
+                </a:solidFill>
+                <a:latin typeface="+mj-lt"/>
+                <a:ea typeface="+mj-ea"/>
+                <a:cs typeface="+mj-cs"/>
+              </a:rPr>
+            </a:br>
+            <a:r>
+              <a:rPr lang="sk-SK" sz="3300" noProof="0" dirty="0" smtClean="0">
+                <a:solidFill>
+                  <a:schemeClr val="accent3">
+                    <a:shade val="75000"/>
+                  </a:schemeClr>
+                </a:solidFill>
+              </a:rPr>
+              <a:t>[Peter </a:t>
+            </a:r>
+            <a:r>
+              <a:rPr lang="sk-SK" sz="3300" noProof="0" dirty="0" err="1" smtClean="0">
+                <a:solidFill>
+                  <a:schemeClr val="accent3">
+                    <a:shade val="75000"/>
+                  </a:schemeClr>
+                </a:solidFill>
+              </a:rPr>
+              <a:t>Köberling</a:t>
+            </a:r>
+            <a:r>
+              <a:rPr lang="sk-SK" sz="3300" noProof="0" dirty="0" smtClean="0">
+                <a:solidFill>
+                  <a:schemeClr val="accent3">
+                    <a:shade val="75000"/>
+                  </a:schemeClr>
+                </a:solidFill>
+              </a:rPr>
+              <a:t>]</a:t>
+            </a:r>
+            <a:endParaRPr lang="sk-SK" noProof="0" dirty="0"/>
+          </a:p>
+        </p:txBody>
+      </p:sp>
+      <p:sp>
+        <p:nvSpPr>
+          <p:cNvPr id="6" name="Content Placeholder 5"/>
+          <p:cNvSpPr>
+            <a:spLocks noGrp="1"/>
+          </p:cNvSpPr>
+          <p:nvPr>
+            <p:ph idx="1"/>
+          </p:nvPr>
+        </p:nvSpPr>
+        <p:spPr>
+          <a:xfrm>
+            <a:off x="622770" y="2276872"/>
+            <a:ext cx="6347714" cy="3880773"/>
+          </a:xfrm>
+        </p:spPr>
+        <p:txBody>
+          <a:bodyPr>
+            <a:normAutofit/>
+          </a:bodyPr>
+          <a:lstStyle/>
+          <a:p>
+            <a:pPr lvl="1"/>
+            <a:r>
+              <a:rPr lang="sk-SK" sz="2800" b="1" noProof="0" dirty="0" smtClean="0"/>
+              <a:t>XML Schéma</a:t>
+            </a:r>
+          </a:p>
+          <a:p>
+            <a:pPr lvl="2"/>
+            <a:r>
+              <a:rPr lang="sk-SK" sz="2200" dirty="0" smtClean="0"/>
+              <a:t>Validácia </a:t>
+            </a:r>
+            <a:r>
+              <a:rPr lang="sk-SK" sz="2200" dirty="0" err="1" smtClean="0"/>
+              <a:t>xml</a:t>
+            </a:r>
+            <a:r>
+              <a:rPr lang="sk-SK" sz="2200" dirty="0" smtClean="0"/>
+              <a:t> súborov</a:t>
+            </a:r>
+          </a:p>
+          <a:p>
+            <a:pPr lvl="2"/>
+            <a:r>
+              <a:rPr lang="sk-SK" sz="2200" dirty="0" smtClean="0"/>
+              <a:t>Zamedzenie nekonzistentným </a:t>
+            </a:r>
+            <a:r>
+              <a:rPr lang="sk-SK" sz="2200" dirty="0" err="1" smtClean="0"/>
+              <a:t>datám</a:t>
+            </a:r>
+            <a:endParaRPr lang="sk-SK" sz="2200" dirty="0"/>
+          </a:p>
+          <a:p>
+            <a:pPr lvl="2"/>
+            <a:r>
+              <a:rPr lang="sk-SK" sz="2200" noProof="0" dirty="0" smtClean="0"/>
+              <a:t>Kontrola atribútov, elementov, </a:t>
+            </a:r>
+            <a:r>
+              <a:rPr lang="sk-SK" sz="2200" noProof="0" dirty="0" err="1" smtClean="0"/>
+              <a:t>hodôt</a:t>
+            </a:r>
+            <a:endParaRPr lang="sk-SK" sz="2200" noProof="0" dirty="0" smtClean="0"/>
+          </a:p>
+          <a:p>
+            <a:pPr lvl="2"/>
+            <a:endParaRPr lang="sk-SK" sz="2200" noProof="0" dirty="0"/>
+          </a:p>
+        </p:txBody>
+      </p:sp>
+    </p:spTree>
+    <p:extLst>
+      <p:ext uri="{BB962C8B-B14F-4D97-AF65-F5344CB8AC3E}">
+        <p14:creationId xmlns:p14="http://schemas.microsoft.com/office/powerpoint/2010/main" val="2258496750"/>
+      </p:ext>
+    </p:extLst>
+  </p:cSld>
+  <p:clrMapOvr>
+    <a:masterClrMapping/>
+  </p:clrMapOvr>
+  <p:timing>
+    <p:tnLst>
+      <p:par>
+        <p:cTn id="1" dur="indefinite" restart="never" nodeType="tmRoot"/>
+      </p:par>
+    </p:tnLst>
+  </p:timing>
+</p:sld>
+</file>
+
+<file path=ppt/slides/slide16.xml><?xml version="1.0" encoding="utf-8"?>
+<p:sld xmlns:a="http://schemas.openxmlformats.org/drawingml/2006/main" xmlns:r="http://schemas.openxmlformats.org/officeDocument/2006/relationships" xmlns:p="http://schemas.openxmlformats.org/presentationml/2006/main">
+  <p:cSld>
+    <p:spTree>
+      <p:nvGrpSpPr>
+        <p:cNvPr id="1" name=""/>
+        <p:cNvGrpSpPr/>
+        <p:nvPr/>
+      </p:nvGrpSpPr>
+      <p:grpSpPr>
+        <a:xfrm>
+          <a:off x="0" y="0"/>
+          <a:ext cx="0" cy="0"/>
+          <a:chOff x="0" y="0"/>
+          <a:chExt cx="0" cy="0"/>
+        </a:xfrm>
+      </p:grpSpPr>
+      <p:sp>
+        <p:nvSpPr>
+          <p:cNvPr id="5" name="Title 4"/>
+          <p:cNvSpPr>
+            <a:spLocks noGrp="1"/>
+          </p:cNvSpPr>
+          <p:nvPr>
+            <p:ph type="title"/>
+          </p:nvPr>
+        </p:nvSpPr>
+        <p:spPr/>
+        <p:txBody>
           <a:bodyPr/>
           <a:lstStyle/>
           <a:p>
@@ -34762,7 +35668,7 @@
 </p:sld>
 </file>
 
-<file path=ppt/slides/slide15.xml><?xml version="1.0" encoding="utf-8"?>
+<file path=ppt/slides/slide17.xml><?xml version="1.0" encoding="utf-8"?>
 <p:sld xmlns:a="http://schemas.openxmlformats.org/drawingml/2006/main" xmlns:r="http://schemas.openxmlformats.org/officeDocument/2006/relationships" xmlns:p="http://schemas.openxmlformats.org/presentationml/2006/main">
   <p:cSld>
     <p:spTree>
@@ -35431,6 +36337,17 @@
           <a:lstStyle/>
           <a:p>
             <a:r>
+              <a:rPr kumimoji="0" lang="sk-SK" sz="2500" kern="1200" dirty="0" smtClean="0">
+                <a:solidFill>
+                  <a:schemeClr val="tx1"/>
+                </a:solidFill>
+                <a:latin typeface="+mn-lt"/>
+                <a:ea typeface="+mn-ea"/>
+                <a:cs typeface="+mn-cs"/>
+              </a:rPr>
+              <a:t>Java </a:t>
+            </a:r>
+            <a:r>
               <a:rPr kumimoji="0" lang="sk-SK" sz="2500" kern="1200" dirty="0" err="1" smtClean="0">
                 <a:solidFill>
                   <a:schemeClr val="tx1"/>
@@ -35439,6 +36356,43 @@
                 <a:ea typeface="+mn-ea"/>
                 <a:cs typeface="+mn-cs"/>
               </a:rPr>
+              <a:t>packages</a:t>
+            </a:r>
+            <a:endParaRPr kumimoji="0" lang="en-US" sz="2500" kern="1200" dirty="0" smtClean="0">
+              <a:solidFill>
+                <a:schemeClr val="tx1"/>
+              </a:solidFill>
+              <a:latin typeface="+mn-lt"/>
+              <a:ea typeface="+mn-ea"/>
+              <a:cs typeface="+mn-cs"/>
+            </a:endParaRPr>
+          </a:p>
+          <a:p>
+            <a:pPr lvl="1"/>
+            <a:r>
+              <a:rPr lang="en-US" sz="2300" dirty="0" smtClean="0">
+                <a:solidFill>
+                  <a:schemeClr val="tx1"/>
+                </a:solidFill>
+              </a:rPr>
+              <a:t>Interfaces</a:t>
+            </a:r>
+            <a:endParaRPr kumimoji="0" lang="en-US" sz="2300" kern="1200" dirty="0" smtClean="0">
+              <a:solidFill>
+                <a:schemeClr val="tx1"/>
+              </a:solidFill>
+              <a:latin typeface="+mn-lt"/>
+              <a:ea typeface="+mn-ea"/>
+              <a:cs typeface="+mn-cs"/>
+            </a:endParaRPr>
+          </a:p>
+          <a:p>
+            <a:r>
+              <a:rPr lang="sk-SK" sz="2500" dirty="0" err="1">
+                <a:solidFill>
+                  <a:schemeClr val="tx1"/>
+                </a:solidFill>
+              </a:rPr>
               <a:t>Github</a:t>
             </a:r>
             <a:endParaRPr lang="sk-SK" sz="2500" dirty="0">
@@ -35450,14 +36404,14 @@
           <a:p>
             <a:pPr lvl="1"/>
             <a:r>
-              <a:rPr lang="sk-SK" sz="2100" noProof="0" dirty="0" err="1" smtClean="0">
+              <a:rPr lang="sk-SK" sz="2100" dirty="0" err="1">
                 <a:solidFill>
                   <a:schemeClr val="tx1"/>
                 </a:solidFill>
               </a:rPr>
               <a:t>Branches</a:t>
             </a:r>
-            <a:endParaRPr lang="sk-SK" sz="2100" noProof="0" dirty="0" smtClean="0">
+            <a:endParaRPr lang="sk-SK" sz="2100" dirty="0">
               <a:solidFill>
                 <a:schemeClr val="tx1"/>
               </a:solidFill>
@@ -35466,24 +36420,27 @@
           <a:p>
             <a:pPr lvl="1"/>
             <a:r>
-              <a:rPr lang="sk-SK" dirty="0" err="1" smtClean="0"/>
+              <a:rPr lang="sk-SK" dirty="0" err="1"/>
               <a:t>Interfaces</a:t>
             </a:r>
+            <a:endParaRPr lang="sk-SK" dirty="0"/>
+          </a:p>
+          <a:p>
+            <a:pPr lvl="1"/>
+            <a:r>
+              <a:rPr lang="sk-SK" dirty="0" err="1"/>
+              <a:t>Issues</a:t>
+            </a:r>
+            <a:endParaRPr lang="sk-SK" dirty="0"/>
+          </a:p>
+          <a:p>
+            <a:r>
+              <a:rPr lang="sk-SK" dirty="0"/>
+              <a:t>Kontrolné body</a:t>
+            </a:r>
+          </a:p>
+          <a:p>
             <a:endParaRPr lang="sk-SK" noProof="0" dirty="0" smtClean="0"/>
-          </a:p>
-          <a:p>
-            <a:pPr lvl="1"/>
-            <a:r>
-              <a:rPr lang="sk-SK" noProof="0" dirty="0" err="1" smtClean="0"/>
-              <a:t>Issues</a:t>
-            </a:r>
-            <a:endParaRPr lang="sk-SK" dirty="0"/>
-          </a:p>
-          <a:p>
-            <a:r>
-              <a:rPr lang="sk-SK" noProof="0" dirty="0" smtClean="0"/>
-              <a:t>Kontrolné body</a:t>
-            </a:r>
           </a:p>
           <a:p>
             <a:pPr lvl="1"/>
@@ -35491,26 +36448,44 @@
           </a:p>
         </p:txBody>
       </p:sp>
-      <p:sp>
-        <p:nvSpPr>
-          <p:cNvPr id="7" name="Zástupný symbol obsahu 6"/>
-          <p:cNvSpPr>
-            <a:spLocks noGrp="1"/>
-          </p:cNvSpPr>
+      <p:pic>
+        <p:nvPicPr>
+          <p:cNvPr id="6" name="Zástupný symbol obsahu 5"/>
+          <p:cNvPicPr>
+            <a:picLocks noGrp="1" noChangeAspect="1"/>
+          </p:cNvPicPr>
           <p:nvPr>
             <p:ph sz="half" idx="2"/>
           </p:nvPr>
-        </p:nvSpPr>
-        <p:spPr/>
-        <p:txBody>
-          <a:bodyPr/>
-          <a:lstStyle/>
-          <a:p>
-            <a:endParaRPr lang="sk-SK"/>
-          </a:p>
-        </p:txBody>
-      </p:sp>
+        </p:nvPicPr>
+        <p:blipFill>
+          <a:blip r:embed="rId3">
+            <a:extLst>
+              <a:ext uri="{28A0092B-C50C-407E-A947-70E740481C1C}">
+                <a14:useLocalDpi xmlns:a14="http://schemas.microsoft.com/office/drawing/2010/main" val="0"/>
+              </a:ext>
+            </a:extLst>
+          </a:blip>
+          <a:stretch>
+            <a:fillRect/>
+          </a:stretch>
+        </p:blipFill>
+        <p:spPr>
+          <a:xfrm>
+            <a:off x="4860032" y="1590111"/>
+            <a:ext cx="2946635" cy="4608512"/>
+          </a:xfrm>
+          <a:prstGeom prst="rect">
+            <a:avLst/>
+          </a:prstGeom>
+        </p:spPr>
+      </p:pic>
     </p:spTree>
+    <p:extLst>
+      <p:ext uri="{BB962C8B-B14F-4D97-AF65-F5344CB8AC3E}">
+        <p14:creationId xmlns:p14="http://schemas.microsoft.com/office/powerpoint/2010/main" val="1709530544"/>
+      </p:ext>
+    </p:extLst>
   </p:cSld>
   <p:clrMapOvr>
     <a:masterClrMapping/>
@@ -35656,7 +36631,7 @@
           <a:lstStyle/>
           <a:p>
             <a:r>
-              <a:rPr kumimoji="0" lang="sk-SK" sz="3300" kern="1200" dirty="0" smtClean="0">
+              <a:rPr kumimoji="0" lang="sk-SK" sz="3300" kern="1200" noProof="0" dirty="0" smtClean="0">
                 <a:solidFill>
                   <a:schemeClr val="accent3">
                     <a:shade val="75000"/>
@@ -35666,100 +36641,35 @@
                 <a:ea typeface="+mj-ea"/>
                 <a:cs typeface="+mj-cs"/>
               </a:rPr>
-              <a:t>Organizácia</a:t>
+              <a:t>Architektúra</a:t>
             </a:r>
             <a:endParaRPr lang="sk-SK" noProof="0" dirty="0"/>
           </a:p>
         </p:txBody>
       </p:sp>
-      <p:sp>
-        <p:nvSpPr>
-          <p:cNvPr id="3" name="Content Placeholder 2"/>
-          <p:cNvSpPr>
-            <a:spLocks noGrp="1"/>
-          </p:cNvSpPr>
-          <p:nvPr>
-            <p:ph sz="half" idx="1"/>
-          </p:nvPr>
-        </p:nvSpPr>
-        <p:spPr>
-          <a:xfrm>
-            <a:off x="867705" y="1953981"/>
-            <a:ext cx="3088109" cy="3880772"/>
-          </a:xfrm>
-        </p:spPr>
-        <p:txBody>
-          <a:bodyPr/>
-          <a:lstStyle/>
-          <a:p>
-            <a:r>
-              <a:rPr kumimoji="0" lang="sk-SK" sz="2500" kern="1200" dirty="0" smtClean="0">
-                <a:solidFill>
-                  <a:schemeClr val="tx1"/>
-                </a:solidFill>
-                <a:latin typeface="+mn-lt"/>
-                <a:ea typeface="+mn-ea"/>
-                <a:cs typeface="+mn-cs"/>
-              </a:rPr>
-              <a:t>Java </a:t>
-            </a:r>
-            <a:r>
-              <a:rPr kumimoji="0" lang="sk-SK" sz="2500" kern="1200" dirty="0" err="1" smtClean="0">
-                <a:solidFill>
-                  <a:schemeClr val="tx1"/>
-                </a:solidFill>
-                <a:latin typeface="+mn-lt"/>
-                <a:ea typeface="+mn-ea"/>
-                <a:cs typeface="+mn-cs"/>
-              </a:rPr>
-              <a:t>packages</a:t>
-            </a:r>
-            <a:endParaRPr lang="sk-SK" noProof="0" dirty="0" smtClean="0"/>
-          </a:p>
-          <a:p>
-            <a:pPr lvl="1"/>
-            <a:endParaRPr lang="sk-SK" noProof="0" dirty="0" smtClean="0"/>
-          </a:p>
-        </p:txBody>
-      </p:sp>
-      <p:pic>
-        <p:nvPicPr>
-          <p:cNvPr id="6" name="Zástupný symbol obsahu 5"/>
-          <p:cNvPicPr>
-            <a:picLocks noGrp="1" noChangeAspect="1"/>
-          </p:cNvPicPr>
-          <p:nvPr>
-            <p:ph sz="half" idx="2"/>
-          </p:nvPr>
-        </p:nvPicPr>
-        <p:blipFill>
-          <a:blip r:embed="rId3">
-            <a:extLst>
-              <a:ext uri="{28A0092B-C50C-407E-A947-70E740481C1C}">
-                <a14:useLocalDpi xmlns:a14="http://schemas.microsoft.com/office/drawing/2010/main" val="0"/>
-              </a:ext>
-            </a:extLst>
-          </a:blip>
-          <a:stretch>
-            <a:fillRect/>
-          </a:stretch>
-        </p:blipFill>
-        <p:spPr>
-          <a:xfrm>
-            <a:off x="4860032" y="1590111"/>
-            <a:ext cx="2946635" cy="4608512"/>
-          </a:xfrm>
-          <a:prstGeom prst="rect">
-            <a:avLst/>
-          </a:prstGeom>
-        </p:spPr>
-      </p:pic>
+      <p:graphicFrame>
+        <p:nvGraphicFramePr>
+          <p:cNvPr id="5" name="Diagram 4"/>
+          <p:cNvGraphicFramePr/>
+          <p:nvPr>
+            <p:extLst>
+              <p:ext uri="{D42A27DB-BD31-4B8C-83A1-F6EECF244321}">
+                <p14:modId xmlns:p14="http://schemas.microsoft.com/office/powerpoint/2010/main" val="3269982063"/>
+              </p:ext>
+            </p:extLst>
+          </p:nvPr>
+        </p:nvGraphicFramePr>
+        <p:xfrm>
+          <a:off x="1547664" y="1904082"/>
+          <a:ext cx="5712296" cy="4120232"/>
+        </p:xfrm>
+        <a:graphic>
+          <a:graphicData uri="http://schemas.openxmlformats.org/drawingml/2006/diagram">
+            <dgm:relIds xmlns:dgm="http://schemas.openxmlformats.org/drawingml/2006/diagram" xmlns:r="http://schemas.openxmlformats.org/officeDocument/2006/relationships" r:dm="rId3" r:lo="rId4" r:qs="rId5" r:cs="rId6"/>
+          </a:graphicData>
+        </a:graphic>
+      </p:graphicFrame>
     </p:spTree>
-    <p:extLst>
-      <p:ext uri="{BB962C8B-B14F-4D97-AF65-F5344CB8AC3E}">
-        <p14:creationId xmlns:p14="http://schemas.microsoft.com/office/powerpoint/2010/main" val="1709530544"/>
-      </p:ext>
-    </p:extLst>
   </p:cSld>
   <p:clrMapOvr>
     <a:masterClrMapping/>
@@ -35807,45 +36717,76 @@
           <a:lstStyle/>
           <a:p>
             <a:r>
-              <a:rPr kumimoji="0" lang="sk-SK" sz="3300" kern="1200" noProof="0" dirty="0" smtClean="0">
+              <a:rPr lang="sk-SK" sz="3300" noProof="0" dirty="0" smtClean="0">
                 <a:solidFill>
                   <a:schemeClr val="accent3">
                     <a:shade val="75000"/>
                   </a:schemeClr>
                 </a:solidFill>
-                <a:latin typeface="+mj-lt"/>
-                <a:ea typeface="+mj-ea"/>
-                <a:cs typeface="+mj-cs"/>
               </a:rPr>
-              <a:t>Architektúra</a:t>
+              <a:t>Konfigurácia</a:t>
             </a:r>
             <a:endParaRPr lang="sk-SK" noProof="0" dirty="0"/>
           </a:p>
         </p:txBody>
       </p:sp>
-      <p:graphicFrame>
-        <p:nvGraphicFramePr>
-          <p:cNvPr id="5" name="Diagram 4"/>
-          <p:cNvGraphicFramePr/>
-          <p:nvPr>
-            <p:extLst>
-              <p:ext uri="{D42A27DB-BD31-4B8C-83A1-F6EECF244321}">
-                <p14:modId xmlns:p14="http://schemas.microsoft.com/office/powerpoint/2010/main" val="2350122009"/>
-              </p:ext>
-            </p:extLst>
-          </p:nvPr>
-        </p:nvGraphicFramePr>
-        <p:xfrm>
-          <a:off x="1524000" y="1397000"/>
-          <a:ext cx="5712296" cy="4120232"/>
-        </p:xfrm>
-        <a:graphic>
-          <a:graphicData uri="http://schemas.openxmlformats.org/drawingml/2006/diagram">
-            <dgm:relIds xmlns:dgm="http://schemas.openxmlformats.org/drawingml/2006/diagram" xmlns:r="http://schemas.openxmlformats.org/officeDocument/2006/relationships" r:dm="rId3" r:lo="rId4" r:qs="rId5" r:cs="rId6"/>
-          </a:graphicData>
-        </a:graphic>
-      </p:graphicFrame>
+      <p:sp>
+        <p:nvSpPr>
+          <p:cNvPr id="3" name="Zástupný symbol obsahu 2"/>
+          <p:cNvSpPr>
+            <a:spLocks noGrp="1"/>
+          </p:cNvSpPr>
+          <p:nvPr>
+            <p:ph idx="1"/>
+          </p:nvPr>
+        </p:nvSpPr>
+        <p:spPr/>
+        <p:txBody>
+          <a:bodyPr/>
+          <a:lstStyle/>
+          <a:p>
+            <a:r>
+              <a:rPr lang="sk-SK" dirty="0" err="1" smtClean="0"/>
+              <a:t>cvgenerator.properties</a:t>
+            </a:r>
+            <a:endParaRPr lang="sk-SK" dirty="0" smtClean="0"/>
+          </a:p>
+          <a:p>
+            <a:pPr lvl="1"/>
+            <a:r>
+              <a:rPr lang="sk-SK" dirty="0" err="1" smtClean="0"/>
+              <a:t>database.folder</a:t>
+            </a:r>
+            <a:endParaRPr lang="sk-SK" dirty="0" smtClean="0"/>
+          </a:p>
+          <a:p>
+            <a:pPr lvl="1"/>
+            <a:r>
+              <a:rPr lang="sk-SK" dirty="0" err="1" smtClean="0"/>
+              <a:t>latex.folder</a:t>
+            </a:r>
+            <a:endParaRPr lang="sk-SK" dirty="0" smtClean="0"/>
+          </a:p>
+          <a:p>
+            <a:r>
+              <a:rPr lang="sk-SK" dirty="0" smtClean="0"/>
+              <a:t>SpringConfig.java</a:t>
+            </a:r>
+          </a:p>
+          <a:p>
+            <a:r>
+              <a:rPr lang="sk-SK" dirty="0" smtClean="0"/>
+              <a:t>StartListener.java</a:t>
+            </a:r>
+          </a:p>
+        </p:txBody>
+      </p:sp>
     </p:spTree>
+    <p:extLst>
+      <p:ext uri="{BB962C8B-B14F-4D97-AF65-F5344CB8AC3E}">
+        <p14:creationId xmlns:p14="http://schemas.microsoft.com/office/powerpoint/2010/main" val="1720266877"/>
+      </p:ext>
+    </p:extLst>
   </p:cSld>
   <p:clrMapOvr>
     <a:masterClrMapping/>
@@ -35879,7 +36820,7 @@
       </p:grpSpPr>
       <p:sp>
         <p:nvSpPr>
-          <p:cNvPr id="2" name="Title 1"/>
+          <p:cNvPr id="5" name="Title 4"/>
           <p:cNvSpPr>
             <a:spLocks noGrp="1"/>
           </p:cNvSpPr>
@@ -35892,6 +36833,70 @@
           <a:bodyPr/>
           <a:lstStyle/>
           <a:p>
+            <a:r>
+              <a:rPr kumimoji="0" lang="sk-SK" sz="3300" kern="1200" noProof="0" dirty="0" err="1" smtClean="0">
+                <a:solidFill>
+                  <a:schemeClr val="accent3">
+                    <a:shade val="75000"/>
+                  </a:schemeClr>
+                </a:solidFill>
+                <a:latin typeface="+mj-lt"/>
+                <a:ea typeface="+mj-ea"/>
+                <a:cs typeface="+mj-cs"/>
+              </a:rPr>
+              <a:t>Frontend</a:t>
+            </a:r>
+            <a:r>
+              <a:rPr kumimoji="0" lang="sk-SK" sz="3300" kern="1200" noProof="0" dirty="0" smtClean="0">
+                <a:solidFill>
+                  <a:schemeClr val="accent3">
+                    <a:shade val="75000"/>
+                  </a:schemeClr>
+                </a:solidFill>
+                <a:latin typeface="+mj-lt"/>
+                <a:ea typeface="+mj-ea"/>
+                <a:cs typeface="+mj-cs"/>
+              </a:rPr>
+              <a:t> a </a:t>
+            </a:r>
+            <a:r>
+              <a:rPr kumimoji="0" lang="sk-SK" sz="3300" kern="1200" noProof="0" dirty="0" err="1" smtClean="0">
+                <a:solidFill>
+                  <a:schemeClr val="accent3">
+                    <a:shade val="75000"/>
+                  </a:schemeClr>
+                </a:solidFill>
+                <a:latin typeface="+mj-lt"/>
+                <a:ea typeface="+mj-ea"/>
+                <a:cs typeface="+mj-cs"/>
+              </a:rPr>
+              <a:t>servletová</a:t>
+            </a:r>
+            <a:r>
+              <a:rPr kumimoji="0" lang="sk-SK" sz="3300" kern="1200" noProof="0" dirty="0" smtClean="0">
+                <a:solidFill>
+                  <a:schemeClr val="accent3">
+                    <a:shade val="75000"/>
+                  </a:schemeClr>
+                </a:solidFill>
+                <a:latin typeface="+mj-lt"/>
+                <a:ea typeface="+mj-ea"/>
+                <a:cs typeface="+mj-cs"/>
+              </a:rPr>
+              <a:t> logika</a:t>
+            </a:r>
+            <a:br>
+              <a:rPr kumimoji="0" lang="sk-SK" sz="3300" kern="1200" noProof="0" dirty="0" smtClean="0">
+                <a:solidFill>
+                  <a:schemeClr val="accent3">
+                    <a:shade val="75000"/>
+                  </a:schemeClr>
+                </a:solidFill>
+                <a:latin typeface="+mj-lt"/>
+                <a:ea typeface="+mj-ea"/>
+                <a:cs typeface="+mj-cs"/>
+              </a:rPr>
+            </a:br>
             <a:r>
               <a:rPr lang="sk-SK" sz="3300" noProof="0" dirty="0" smtClean="0">
                 <a:solidFill>
@@ -35900,7 +36905,7 @@
                   </a:schemeClr>
                 </a:solidFill>
               </a:rPr>
-              <a:t>Konfigurácia</a:t>
+              <a:t>[Zuzana Dankovčíková]</a:t>
             </a:r>
             <a:endParaRPr lang="sk-SK" noProof="0" dirty="0"/>
           </a:p>
@@ -35908,61 +36913,154 @@
       </p:sp>
       <p:sp>
         <p:nvSpPr>
-          <p:cNvPr id="3" name="Zástupný symbol obsahu 2"/>
-          <p:cNvSpPr>
-            <a:spLocks noGrp="1"/>
-          </p:cNvSpPr>
-          <p:nvPr>
-            <p:ph idx="1"/>
-          </p:nvPr>
-        </p:nvSpPr>
-        <p:spPr/>
+          <p:cNvPr id="4" name="Zástupný symbol textu 3"/>
+          <p:cNvSpPr>
+            <a:spLocks noGrp="1"/>
+          </p:cNvSpPr>
+          <p:nvPr>
+            <p:ph type="body" idx="1"/>
+          </p:nvPr>
+        </p:nvSpPr>
+        <p:spPr>
+          <a:xfrm>
+            <a:off x="4860032" y="2045691"/>
+            <a:ext cx="3090672" cy="576262"/>
+          </a:xfrm>
+        </p:spPr>
         <p:txBody>
           <a:bodyPr/>
           <a:lstStyle/>
           <a:p>
             <a:r>
               <a:rPr lang="sk-SK" dirty="0" err="1" smtClean="0"/>
-              <a:t>cvgenerator.properties</a:t>
+              <a:t>Login</a:t>
+            </a:r>
+            <a:r>
+              <a:rPr lang="sk-SK" dirty="0" smtClean="0"/>
+              <a:t> </a:t>
+            </a:r>
+            <a:r>
+              <a:rPr lang="sk-SK" dirty="0" err="1" smtClean="0"/>
+              <a:t>page</a:t>
+            </a:r>
+            <a:endParaRPr lang="sk-SK" dirty="0"/>
+          </a:p>
+        </p:txBody>
+      </p:sp>
+      <p:pic>
+        <p:nvPicPr>
+          <p:cNvPr id="2" name="Zástupný symbol obsahu 1"/>
+          <p:cNvPicPr>
+            <a:picLocks noGrp="1" noChangeAspect="1"/>
+          </p:cNvPicPr>
+          <p:nvPr>
+            <p:ph sz="half" idx="2"/>
+          </p:nvPr>
+        </p:nvPicPr>
+        <p:blipFill>
+          <a:blip r:embed="rId3" cstate="print">
+            <a:extLst>
+              <a:ext uri="{28A0092B-C50C-407E-A947-70E740481C1C}">
+                <a14:useLocalDpi xmlns:a14="http://schemas.microsoft.com/office/drawing/2010/main" val="0"/>
+              </a:ext>
+            </a:extLst>
+          </a:blip>
+          <a:stretch>
+            <a:fillRect/>
+          </a:stretch>
+        </p:blipFill>
+        <p:spPr>
+          <a:xfrm>
+            <a:off x="4860032" y="2737245"/>
+            <a:ext cx="3914008" cy="3860107"/>
+          </a:xfrm>
+        </p:spPr>
+      </p:pic>
+      <p:sp>
+        <p:nvSpPr>
+          <p:cNvPr id="10" name="Zástupný symbol obsahu 9"/>
+          <p:cNvSpPr>
+            <a:spLocks noGrp="1"/>
+          </p:cNvSpPr>
+          <p:nvPr>
+            <p:ph sz="quarter" idx="4"/>
+          </p:nvPr>
+        </p:nvSpPr>
+        <p:spPr>
+          <a:xfrm>
+            <a:off x="479770" y="2276873"/>
+            <a:ext cx="3090672" cy="4574616"/>
+          </a:xfrm>
+        </p:spPr>
+        <p:txBody>
+          <a:bodyPr/>
+          <a:lstStyle/>
+          <a:p>
+            <a:r>
+              <a:rPr lang="sk-SK" dirty="0" smtClean="0"/>
+              <a:t>JSP </a:t>
+            </a:r>
+            <a:r>
+              <a:rPr lang="sk-SK" dirty="0" smtClean="0"/>
+              <a:t>stránky</a:t>
+            </a:r>
+            <a:endParaRPr lang="en-US" dirty="0" smtClean="0"/>
+          </a:p>
+          <a:p>
+            <a:pPr lvl="1"/>
+            <a:r>
+              <a:rPr lang="en-US" dirty="0" smtClean="0"/>
+              <a:t>HTML5 </a:t>
+            </a:r>
+            <a:r>
+              <a:rPr lang="sk-SK" dirty="0" err="1" smtClean="0"/>
+              <a:t>validné</a:t>
             </a:r>
             <a:endParaRPr lang="sk-SK" dirty="0" smtClean="0"/>
           </a:p>
           <a:p>
+            <a:r>
+              <a:rPr lang="sk-SK" dirty="0" err="1" smtClean="0"/>
+              <a:t>Bootstrap</a:t>
+            </a:r>
+            <a:r>
+              <a:rPr lang="sk-SK" dirty="0" smtClean="0"/>
+              <a:t> CSS</a:t>
+            </a:r>
+          </a:p>
+          <a:p>
             <a:pPr lvl="1"/>
             <a:r>
               <a:rPr lang="sk-SK" dirty="0" err="1" smtClean="0"/>
-              <a:t>database.folder</a:t>
-            </a:r>
-            <a:endParaRPr lang="sk-SK" dirty="0" smtClean="0"/>
+              <a:t>Responzívny</a:t>
+            </a:r>
+            <a:r>
+              <a:rPr lang="sk-SK" dirty="0" smtClean="0"/>
+              <a:t> dizajn</a:t>
+            </a:r>
+          </a:p>
+          <a:p>
+            <a:r>
+              <a:rPr lang="sk-SK" dirty="0" smtClean="0"/>
+              <a:t>AngularJS</a:t>
+            </a:r>
           </a:p>
           <a:p>
             <a:pPr lvl="1"/>
             <a:r>
-              <a:rPr lang="sk-SK" dirty="0" err="1" smtClean="0"/>
-              <a:t>latex.folder</a:t>
-            </a:r>
-            <a:endParaRPr lang="sk-SK" dirty="0" smtClean="0"/>
-          </a:p>
-          <a:p>
-            <a:r>
               <a:rPr lang="sk-SK" dirty="0" smtClean="0"/>
-              <a:t>SpringConfig.java</a:t>
+              <a:t>Dynamický obsah</a:t>
             </a:r>
           </a:p>
           <a:p>
             <a:r>
               <a:rPr lang="sk-SK" dirty="0" smtClean="0"/>
-              <a:t>StartListener.java</a:t>
+              <a:t>Prihlasovanie užívateľov</a:t>
             </a:r>
           </a:p>
         </p:txBody>
       </p:sp>
     </p:spTree>
-    <p:extLst>
-      <p:ext uri="{BB962C8B-B14F-4D97-AF65-F5344CB8AC3E}">
-        <p14:creationId xmlns:p14="http://schemas.microsoft.com/office/powerpoint/2010/main" val="1720266877"/>
-      </p:ext>
-    </p:extLst>
   </p:cSld>
   <p:clrMapOvr>
     <a:masterClrMapping/>
@@ -35996,7 +37094,7 @@
       </p:grpSpPr>
       <p:sp>
         <p:nvSpPr>
-          <p:cNvPr id="5" name="Title 4"/>
+          <p:cNvPr id="2" name="Nadpis 1"/>
           <p:cNvSpPr>
             <a:spLocks noGrp="1"/>
           </p:cNvSpPr>
@@ -36010,114 +37108,8 @@
           <a:lstStyle/>
           <a:p>
             <a:r>
-              <a:rPr kumimoji="0" lang="sk-SK" sz="3300" kern="1200" noProof="0" dirty="0" err="1" smtClean="0">
-                <a:solidFill>
-                  <a:schemeClr val="accent3">
-                    <a:shade val="75000"/>
-                  </a:schemeClr>
-                </a:solidFill>
-                <a:latin typeface="+mj-lt"/>
-                <a:ea typeface="+mj-ea"/>
-                <a:cs typeface="+mj-cs"/>
-              </a:rPr>
-              <a:t>Frontend</a:t>
-            </a:r>
-            <a:r>
-              <a:rPr kumimoji="0" lang="sk-SK" sz="3300" kern="1200" noProof="0" dirty="0" smtClean="0">
-                <a:solidFill>
-                  <a:schemeClr val="accent3">
-                    <a:shade val="75000"/>
-                  </a:schemeClr>
-                </a:solidFill>
-                <a:latin typeface="+mj-lt"/>
-                <a:ea typeface="+mj-ea"/>
-                <a:cs typeface="+mj-cs"/>
-              </a:rPr>
-              <a:t> a </a:t>
-            </a:r>
-            <a:r>
-              <a:rPr kumimoji="0" lang="sk-SK" sz="3300" kern="1200" noProof="0" dirty="0" err="1" smtClean="0">
-                <a:solidFill>
-                  <a:schemeClr val="accent3">
-                    <a:shade val="75000"/>
-                  </a:schemeClr>
-                </a:solidFill>
-                <a:latin typeface="+mj-lt"/>
-                <a:ea typeface="+mj-ea"/>
-                <a:cs typeface="+mj-cs"/>
-              </a:rPr>
-              <a:t>servletová</a:t>
-            </a:r>
-            <a:r>
-              <a:rPr kumimoji="0" lang="sk-SK" sz="3300" kern="1200" noProof="0" dirty="0" smtClean="0">
-                <a:solidFill>
-                  <a:schemeClr val="accent3">
-                    <a:shade val="75000"/>
-                  </a:schemeClr>
-                </a:solidFill>
-                <a:latin typeface="+mj-lt"/>
-                <a:ea typeface="+mj-ea"/>
-                <a:cs typeface="+mj-cs"/>
-              </a:rPr>
-              <a:t> logika</a:t>
-            </a:r>
-            <a:br>
-              <a:rPr kumimoji="0" lang="sk-SK" sz="3300" kern="1200" noProof="0" dirty="0" smtClean="0">
-                <a:solidFill>
-                  <a:schemeClr val="accent3">
-                    <a:shade val="75000"/>
-                  </a:schemeClr>
-                </a:solidFill>
-                <a:latin typeface="+mj-lt"/>
-                <a:ea typeface="+mj-ea"/>
-                <a:cs typeface="+mj-cs"/>
-              </a:rPr>
-            </a:br>
-            <a:r>
-              <a:rPr lang="sk-SK" sz="3300" noProof="0" dirty="0" smtClean="0">
-                <a:solidFill>
-                  <a:schemeClr val="accent3">
-                    <a:shade val="75000"/>
-                  </a:schemeClr>
-                </a:solidFill>
-              </a:rPr>
-              <a:t>[Zuzana Dankovčíková]</a:t>
-            </a:r>
-            <a:endParaRPr lang="sk-SK" noProof="0" dirty="0"/>
-          </a:p>
-        </p:txBody>
-      </p:sp>
-      <p:sp>
-        <p:nvSpPr>
-          <p:cNvPr id="4" name="Zástupný symbol textu 3"/>
-          <p:cNvSpPr>
-            <a:spLocks noGrp="1"/>
-          </p:cNvSpPr>
-          <p:nvPr>
-            <p:ph type="body" idx="1"/>
-          </p:nvPr>
-        </p:nvSpPr>
-        <p:spPr>
-          <a:xfrm>
-            <a:off x="4860032" y="2045691"/>
-            <a:ext cx="3090672" cy="576262"/>
-          </a:xfrm>
-        </p:spPr>
-        <p:txBody>
-          <a:bodyPr/>
-          <a:lstStyle/>
-          <a:p>
-            <a:r>
-              <a:rPr lang="sk-SK" dirty="0" err="1" smtClean="0"/>
-              <a:t>Login</a:t>
-            </a:r>
-            <a:r>
-              <a:rPr lang="sk-SK" dirty="0" smtClean="0"/>
-              <a:t> </a:t>
-            </a:r>
-            <a:r>
-              <a:rPr lang="sk-SK" dirty="0" err="1" smtClean="0"/>
-              <a:t>page</a:t>
+              <a:rPr lang="en-US" dirty="0" smtClean="0"/>
+              <a:t>Edit page</a:t>
             </a:r>
             <a:endParaRPr lang="sk-SK" dirty="0"/>
           </a:p>
@@ -36125,47 +37117,46 @@
       </p:sp>
       <p:pic>
         <p:nvPicPr>
-          <p:cNvPr id="2" name="Zástupný symbol obsahu 1"/>
+          <p:cNvPr id="7" name="Zástupný symbol obsahu 6"/>
           <p:cNvPicPr>
             <a:picLocks noGrp="1" noChangeAspect="1"/>
           </p:cNvPicPr>
           <p:nvPr>
-            <p:ph sz="half" idx="2"/>
+            <p:ph sz="half" idx="1"/>
           </p:nvPr>
         </p:nvPicPr>
-        <p:blipFill>
-          <a:blip r:embed="rId3" cstate="print">
+        <p:blipFill rotWithShape="1">
+          <a:blip r:embed="rId2" cstate="print">
             <a:extLst>
               <a:ext uri="{28A0092B-C50C-407E-A947-70E740481C1C}">
                 <a14:useLocalDpi xmlns:a14="http://schemas.microsoft.com/office/drawing/2010/main" val="0"/>
               </a:ext>
             </a:extLst>
           </a:blip>
-          <a:stretch>
-            <a:fillRect/>
-          </a:stretch>
+          <a:srcRect l="16675" r="16909" b="66800"/>
+          <a:stretch/>
         </p:blipFill>
         <p:spPr>
           <a:xfrm>
-            <a:off x="4860032" y="2737245"/>
-            <a:ext cx="3914008" cy="3860107"/>
+            <a:off x="4021257" y="836712"/>
+            <a:ext cx="5122743" cy="5472608"/>
           </a:xfrm>
         </p:spPr>
       </p:pic>
       <p:sp>
         <p:nvSpPr>
-          <p:cNvPr id="10" name="Zástupný symbol obsahu 9"/>
-          <p:cNvSpPr>
-            <a:spLocks noGrp="1"/>
-          </p:cNvSpPr>
-          <p:nvPr>
-            <p:ph sz="quarter" idx="4"/>
+          <p:cNvPr id="9" name="Zástupný symbol obsahu 8"/>
+          <p:cNvSpPr>
+            <a:spLocks noGrp="1"/>
+          </p:cNvSpPr>
+          <p:nvPr>
+            <p:ph sz="half" idx="2"/>
           </p:nvPr>
         </p:nvSpPr>
         <p:spPr>
           <a:xfrm>
-            <a:off x="479770" y="2276873"/>
-            <a:ext cx="3090672" cy="4574616"/>
+            <a:off x="609600" y="1772816"/>
+            <a:ext cx="3088110" cy="3880773"/>
           </a:xfrm>
         </p:spPr>
         <p:txBody>
@@ -36173,53 +37164,88 @@
           <a:lstStyle/>
           <a:p>
             <a:r>
+              <a:rPr lang="en-US" dirty="0" smtClean="0"/>
+              <a:t>AngularJS framework</a:t>
+            </a:r>
+          </a:p>
+          <a:p>
+            <a:pPr lvl="1"/>
+            <a:r>
+              <a:rPr lang="en-US" dirty="0" err="1" smtClean="0"/>
+              <a:t>Dynamick</a:t>
+            </a:r>
+            <a:r>
               <a:rPr lang="sk-SK" dirty="0" smtClean="0"/>
-              <a:t>JSP stránky</a:t>
-            </a:r>
-          </a:p>
-          <a:p>
+              <a:t>ý obsah</a:t>
+            </a:r>
+          </a:p>
+          <a:p>
+            <a:pPr lvl="1"/>
+            <a:r>
+              <a:rPr lang="sk-SK" dirty="0"/>
+              <a:t>Jednoduché načítanie existujúceho </a:t>
+            </a:r>
+            <a:r>
+              <a:rPr lang="sk-SK" dirty="0" smtClean="0"/>
+              <a:t>životopisu a </a:t>
+            </a:r>
             <a:r>
               <a:rPr lang="sk-SK" dirty="0" err="1" smtClean="0"/>
-              <a:t>Bootstrap</a:t>
+              <a:t>predvyplnenie</a:t>
             </a:r>
             <a:r>
               <a:rPr lang="sk-SK" dirty="0" smtClean="0"/>
-              <a:t> CSS</a:t>
-            </a:r>
+              <a:t> formulára</a:t>
+            </a:r>
+            <a:endParaRPr lang="sk-SK" dirty="0" smtClean="0"/>
           </a:p>
           <a:p>
             <a:pPr lvl="1"/>
             <a:r>
+              <a:rPr lang="sk-SK" dirty="0" smtClean="0"/>
+              <a:t>Validácia údajov HTML5 atribútmi a </a:t>
+            </a:r>
+            <a:r>
               <a:rPr lang="sk-SK" dirty="0" err="1" smtClean="0"/>
-              <a:t>Responzívny</a:t>
+              <a:t>JavaScriptom</a:t>
+            </a:r>
+            <a:endParaRPr lang="sk-SK" dirty="0" smtClean="0"/>
+          </a:p>
+          <a:p>
+            <a:pPr lvl="1"/>
+            <a:r>
+              <a:rPr lang="sk-SK" dirty="0" err="1" smtClean="0"/>
+              <a:t>Inline</a:t>
             </a:r>
             <a:r>
               <a:rPr lang="sk-SK" dirty="0" smtClean="0"/>
-              <a:t> dizajn</a:t>
-            </a:r>
-          </a:p>
-          <a:p>
+              <a:t> </a:t>
+            </a:r>
+            <a:r>
+              <a:rPr lang="sk-SK" dirty="0" err="1" smtClean="0"/>
+              <a:t>nápoveda</a:t>
+            </a:r>
+            <a:endParaRPr lang="sk-SK" dirty="0" smtClean="0"/>
+          </a:p>
+          <a:p>
+            <a:pPr lvl="1"/>
             <a:r>
               <a:rPr lang="sk-SK" dirty="0" smtClean="0"/>
-              <a:t>AngularJS</a:t>
+              <a:t>Odosielanie JSON objektu na server</a:t>
             </a:r>
           </a:p>
           <a:p>
             <a:pPr lvl="1"/>
-            <a:r>
-              <a:rPr lang="sk-SK" dirty="0" smtClean="0"/>
-              <a:t>Dynamický obsah</a:t>
-            </a:r>
-          </a:p>
-          <a:p>
-            <a:r>
-              <a:rPr lang="sk-SK" dirty="0" smtClean="0"/>
-              <a:t>Prihlasovanie užívateľov</a:t>
-            </a:r>
+            <a:endParaRPr lang="sk-SK" dirty="0"/>
           </a:p>
         </p:txBody>
       </p:sp>
     </p:spTree>
+    <p:extLst>
+      <p:ext uri="{BB962C8B-B14F-4D97-AF65-F5344CB8AC3E}">
+        <p14:creationId xmlns:p14="http://schemas.microsoft.com/office/powerpoint/2010/main" val="1565969837"/>
+      </p:ext>
+    </p:extLst>
   </p:cSld>
   <p:clrMapOvr>
     <a:masterClrMapping/>

</xml_diff>

<commit_message>
Added schema for texts.xml
</commit_message>
<xml_diff>
--- a/defence/obhajoba.pptx
+++ b/defence/obhajoba.pptx
@@ -12,7 +12,7 @@
     <p:sldMasterId id="2147484242" r:id="rId9"/>
   </p:sldMasterIdLst>
   <p:notesMasterIdLst>
-    <p:notesMasterId r:id="rId27"/>
+    <p:notesMasterId r:id="rId28"/>
   </p:notesMasterIdLst>
   <p:sldIdLst>
     <p:sldId id="256" r:id="rId10"/>
@@ -30,8 +30,9 @@
     <p:sldId id="280" r:id="rId22"/>
     <p:sldId id="281" r:id="rId23"/>
     <p:sldId id="271" r:id="rId24"/>
-    <p:sldId id="282" r:id="rId25"/>
-    <p:sldId id="274" r:id="rId26"/>
+    <p:sldId id="285" r:id="rId25"/>
+    <p:sldId id="282" r:id="rId26"/>
+    <p:sldId id="274" r:id="rId27"/>
   </p:sldIdLst>
   <p:sldSz cx="9144000" cy="6858000" type="screen4x3"/>
   <p:notesSz cx="6858000" cy="9144000"/>
@@ -1914,9 +1915,9 @@
   </dgm:ptLst>
   <dgm:cxnLst>
     <dgm:cxn modelId="{8068848C-6E0D-4A52-9D10-06B0317C1277}" srcId="{EB3611A7-990E-490F-8DD7-A7A77B46CEAA}" destId="{4EC1AB97-00F2-4F2E-851C-336303AB65A0}" srcOrd="2" destOrd="0" parTransId="{7DD33D15-3ADF-484D-BEED-D993534E2EB6}" sibTransId="{1A057FFD-F3D4-4EA8-A0C8-02A7F710A22F}"/>
+    <dgm:cxn modelId="{C4F11861-6AE3-4C09-92F3-F5C9C6E7DCC2}" srcId="{EB3611A7-990E-490F-8DD7-A7A77B46CEAA}" destId="{A1132169-5947-49E8-B310-8C2D0A112810}" srcOrd="1" destOrd="0" parTransId="{2A0E3B96-7945-40B0-B0BA-D88F91AF791C}" sibTransId="{E2125291-8643-4AFA-A1C6-2FA28FB4AEBC}"/>
+    <dgm:cxn modelId="{E50A5493-2232-4491-BFAE-E59C2752F64F}" type="presOf" srcId="{4EC1AB97-00F2-4F2E-851C-336303AB65A0}" destId="{2F03052C-D805-43E0-AC3B-3692BD1F7973}" srcOrd="0" destOrd="0" presId="urn:microsoft.com/office/officeart/2005/8/layout/default"/>
     <dgm:cxn modelId="{BBADF063-082E-4D1A-8FD5-FCB5CC387A5C}" type="presOf" srcId="{C08251DB-A69A-4E5A-BC12-EFB793724E2E}" destId="{2BD9B417-8190-4FDF-A602-4F20EA803446}" srcOrd="0" destOrd="0" presId="urn:microsoft.com/office/officeart/2005/8/layout/default"/>
-    <dgm:cxn modelId="{E50A5493-2232-4491-BFAE-E59C2752F64F}" type="presOf" srcId="{4EC1AB97-00F2-4F2E-851C-336303AB65A0}" destId="{2F03052C-D805-43E0-AC3B-3692BD1F7973}" srcOrd="0" destOrd="0" presId="urn:microsoft.com/office/officeart/2005/8/layout/default"/>
-    <dgm:cxn modelId="{C4F11861-6AE3-4C09-92F3-F5C9C6E7DCC2}" srcId="{EB3611A7-990E-490F-8DD7-A7A77B46CEAA}" destId="{A1132169-5947-49E8-B310-8C2D0A112810}" srcOrd="1" destOrd="0" parTransId="{2A0E3B96-7945-40B0-B0BA-D88F91AF791C}" sibTransId="{E2125291-8643-4AFA-A1C6-2FA28FB4AEBC}"/>
     <dgm:cxn modelId="{95F26A59-2BC7-4870-9A5A-D6D2BA9E94D5}" srcId="{EB3611A7-990E-490F-8DD7-A7A77B46CEAA}" destId="{C08251DB-A69A-4E5A-BC12-EFB793724E2E}" srcOrd="3" destOrd="0" parTransId="{C992409A-CD0A-4A26-A9C3-A23EDB486E0D}" sibTransId="{FDD8FC97-609E-483E-94BB-EDD154CF4AD3}"/>
     <dgm:cxn modelId="{F8708A83-448D-4430-84C1-5B83CA6A2147}" srcId="{EB3611A7-990E-490F-8DD7-A7A77B46CEAA}" destId="{01203027-F30D-47E4-AD68-9C688331EF99}" srcOrd="0" destOrd="0" parTransId="{50CC0440-02F1-4347-B8C8-3E8200C66B2F}" sibTransId="{83374D7A-F8EC-43B7-8825-63974382453F}"/>
     <dgm:cxn modelId="{9FA66FFD-D3BD-468D-9EC4-5D1A26412B93}" type="presOf" srcId="{A1132169-5947-49E8-B310-8C2D0A112810}" destId="{66B559DE-FE5C-4E17-974D-97B503B5F2B1}" srcOrd="0" destOrd="0" presId="urn:microsoft.com/office/officeart/2005/8/layout/default"/>
@@ -6371,7 +6372,7 @@
             <a:fld id="{3618A891-9467-4CC7-A491-0A34A0A97538}" type="datetimeFigureOut">
               <a:rPr lang="en-US" smtClean="0"/>
               <a:pPr/>
-              <a:t>5/22/2015</a:t>
+              <a:t>5/23/2015</a:t>
             </a:fld>
             <a:endParaRPr lang="en-US"/>
           </a:p>
@@ -7339,7 +7340,7 @@
             <a:fld id="{14F9460A-9E81-496F-91AC-92DE7ABF30C4}" type="slidenum">
               <a:rPr lang="en-US" smtClean="0"/>
               <a:pPr/>
-              <a:t>16</a:t>
+              <a:t>17</a:t>
             </a:fld>
             <a:endParaRPr lang="en-US"/>
           </a:p>
@@ -8197,7 +8198,7 @@
             <a:fld id="{EE625E72-7062-4D8E-BA99-F07B9DD1F028}" type="datetimeFigureOut">
               <a:rPr lang="en-US" smtClean="0"/>
               <a:pPr/>
-              <a:t>5/22/2015</a:t>
+              <a:t>5/23/2015</a:t>
             </a:fld>
             <a:endParaRPr lang="en-US"/>
           </a:p>
@@ -8369,7 +8370,7 @@
             <a:fld id="{EE625E72-7062-4D8E-BA99-F07B9DD1F028}" type="datetimeFigureOut">
               <a:rPr lang="en-US" smtClean="0"/>
               <a:pPr/>
-              <a:t>5/22/2015</a:t>
+              <a:t>5/23/2015</a:t>
             </a:fld>
             <a:endParaRPr lang="en-US"/>
           </a:p>
@@ -8551,7 +8552,7 @@
             <a:fld id="{EE625E72-7062-4D8E-BA99-F07B9DD1F028}" type="datetimeFigureOut">
               <a:rPr lang="en-US" smtClean="0"/>
               <a:pPr/>
-              <a:t>5/22/2015</a:t>
+              <a:t>5/23/2015</a:t>
             </a:fld>
             <a:endParaRPr lang="en-US"/>
           </a:p>
@@ -8756,7 +8757,7 @@
             <a:fld id="{EE625E72-7062-4D8E-BA99-F07B9DD1F028}" type="datetimeFigureOut">
               <a:rPr lang="en-US" smtClean="0"/>
               <a:pPr/>
-              <a:t>5/22/2015</a:t>
+              <a:t>5/23/2015</a:t>
             </a:fld>
             <a:endParaRPr lang="en-US"/>
           </a:p>
@@ -8928,7 +8929,7 @@
             <a:fld id="{EE625E72-7062-4D8E-BA99-F07B9DD1F028}" type="datetimeFigureOut">
               <a:rPr lang="en-US" smtClean="0"/>
               <a:pPr/>
-              <a:t>5/22/2015</a:t>
+              <a:t>5/23/2015</a:t>
             </a:fld>
             <a:endParaRPr lang="en-US"/>
           </a:p>
@@ -9181,7 +9182,7 @@
             <a:fld id="{EE625E72-7062-4D8E-BA99-F07B9DD1F028}" type="datetimeFigureOut">
               <a:rPr lang="en-US" smtClean="0"/>
               <a:pPr/>
-              <a:t>5/22/2015</a:t>
+              <a:t>5/23/2015</a:t>
             </a:fld>
             <a:endParaRPr lang="en-US"/>
           </a:p>
@@ -9415,7 +9416,7 @@
             <a:fld id="{EE625E72-7062-4D8E-BA99-F07B9DD1F028}" type="datetimeFigureOut">
               <a:rPr lang="en-US" smtClean="0"/>
               <a:pPr/>
-              <a:t>5/22/2015</a:t>
+              <a:t>5/23/2015</a:t>
             </a:fld>
             <a:endParaRPr lang="en-US"/>
           </a:p>
@@ -9764,7 +9765,7 @@
             <a:fld id="{EE625E72-7062-4D8E-BA99-F07B9DD1F028}" type="datetimeFigureOut">
               <a:rPr lang="en-US" smtClean="0"/>
               <a:pPr/>
-              <a:t>5/22/2015</a:t>
+              <a:t>5/23/2015</a:t>
             </a:fld>
             <a:endParaRPr lang="en-US"/>
           </a:p>
@@ -9884,7 +9885,7 @@
             <a:fld id="{EE625E72-7062-4D8E-BA99-F07B9DD1F028}" type="datetimeFigureOut">
               <a:rPr lang="en-US" smtClean="0"/>
               <a:pPr/>
-              <a:t>5/22/2015</a:t>
+              <a:t>5/23/2015</a:t>
             </a:fld>
             <a:endParaRPr lang="en-US"/>
           </a:p>
@@ -10004,7 +10005,7 @@
             <a:fld id="{EE625E72-7062-4D8E-BA99-F07B9DD1F028}" type="datetimeFigureOut">
               <a:rPr lang="en-US" smtClean="0"/>
               <a:pPr/>
-              <a:t>5/22/2015</a:t>
+              <a:t>5/23/2015</a:t>
             </a:fld>
             <a:endParaRPr lang="en-US"/>
           </a:p>
@@ -10290,7 +10291,7 @@
             <a:fld id="{EE625E72-7062-4D8E-BA99-F07B9DD1F028}" type="datetimeFigureOut">
               <a:rPr lang="en-US" smtClean="0"/>
               <a:pPr/>
-              <a:t>5/22/2015</a:t>
+              <a:t>5/23/2015</a:t>
             </a:fld>
             <a:endParaRPr lang="en-US"/>
           </a:p>
@@ -10462,7 +10463,7 @@
             <a:fld id="{EE625E72-7062-4D8E-BA99-F07B9DD1F028}" type="datetimeFigureOut">
               <a:rPr lang="en-US" smtClean="0"/>
               <a:pPr/>
-              <a:t>5/22/2015</a:t>
+              <a:t>5/23/2015</a:t>
             </a:fld>
             <a:endParaRPr lang="en-US"/>
           </a:p>
@@ -10728,7 +10729,7 @@
             <a:fld id="{EE625E72-7062-4D8E-BA99-F07B9DD1F028}" type="datetimeFigureOut">
               <a:rPr lang="en-US" smtClean="0"/>
               <a:pPr/>
-              <a:t>5/22/2015</a:t>
+              <a:t>5/23/2015</a:t>
             </a:fld>
             <a:endParaRPr lang="en-US"/>
           </a:p>
@@ -10900,7 +10901,7 @@
             <a:fld id="{EE625E72-7062-4D8E-BA99-F07B9DD1F028}" type="datetimeFigureOut">
               <a:rPr lang="en-US" smtClean="0"/>
               <a:pPr/>
-              <a:t>5/22/2015</a:t>
+              <a:t>5/23/2015</a:t>
             </a:fld>
             <a:endParaRPr lang="en-US"/>
           </a:p>
@@ -11082,7 +11083,7 @@
             <a:fld id="{EE625E72-7062-4D8E-BA99-F07B9DD1F028}" type="datetimeFigureOut">
               <a:rPr lang="en-US" smtClean="0"/>
               <a:pPr/>
-              <a:t>5/22/2015</a:t>
+              <a:t>5/23/2015</a:t>
             </a:fld>
             <a:endParaRPr lang="en-US"/>
           </a:p>
@@ -11287,7 +11288,7 @@
             <a:fld id="{EE625E72-7062-4D8E-BA99-F07B9DD1F028}" type="datetimeFigureOut">
               <a:rPr lang="en-US" smtClean="0"/>
               <a:pPr/>
-              <a:t>5/22/2015</a:t>
+              <a:t>5/23/2015</a:t>
             </a:fld>
             <a:endParaRPr lang="en-US"/>
           </a:p>
@@ -11459,7 +11460,7 @@
             <a:fld id="{EE625E72-7062-4D8E-BA99-F07B9DD1F028}" type="datetimeFigureOut">
               <a:rPr lang="en-US" smtClean="0"/>
               <a:pPr/>
-              <a:t>5/22/2015</a:t>
+              <a:t>5/23/2015</a:t>
             </a:fld>
             <a:endParaRPr lang="en-US"/>
           </a:p>
@@ -11712,7 +11713,7 @@
             <a:fld id="{EE625E72-7062-4D8E-BA99-F07B9DD1F028}" type="datetimeFigureOut">
               <a:rPr lang="en-US" smtClean="0"/>
               <a:pPr/>
-              <a:t>5/22/2015</a:t>
+              <a:t>5/23/2015</a:t>
             </a:fld>
             <a:endParaRPr lang="en-US"/>
           </a:p>
@@ -11946,7 +11947,7 @@
             <a:fld id="{EE625E72-7062-4D8E-BA99-F07B9DD1F028}" type="datetimeFigureOut">
               <a:rPr lang="en-US" smtClean="0"/>
               <a:pPr/>
-              <a:t>5/22/2015</a:t>
+              <a:t>5/23/2015</a:t>
             </a:fld>
             <a:endParaRPr lang="en-US"/>
           </a:p>
@@ -12295,7 +12296,7 @@
             <a:fld id="{EE625E72-7062-4D8E-BA99-F07B9DD1F028}" type="datetimeFigureOut">
               <a:rPr lang="en-US" smtClean="0"/>
               <a:pPr/>
-              <a:t>5/22/2015</a:t>
+              <a:t>5/23/2015</a:t>
             </a:fld>
             <a:endParaRPr lang="en-US"/>
           </a:p>
@@ -12415,7 +12416,7 @@
             <a:fld id="{EE625E72-7062-4D8E-BA99-F07B9DD1F028}" type="datetimeFigureOut">
               <a:rPr lang="en-US" smtClean="0"/>
               <a:pPr/>
-              <a:t>5/22/2015</a:t>
+              <a:t>5/23/2015</a:t>
             </a:fld>
             <a:endParaRPr lang="en-US"/>
           </a:p>
@@ -12535,7 +12536,7 @@
             <a:fld id="{EE625E72-7062-4D8E-BA99-F07B9DD1F028}" type="datetimeFigureOut">
               <a:rPr lang="en-US" smtClean="0"/>
               <a:pPr/>
-              <a:t>5/22/2015</a:t>
+              <a:t>5/23/2015</a:t>
             </a:fld>
             <a:endParaRPr lang="en-US"/>
           </a:p>
@@ -12788,7 +12789,7 @@
             <a:fld id="{EE625E72-7062-4D8E-BA99-F07B9DD1F028}" type="datetimeFigureOut">
               <a:rPr lang="en-US" smtClean="0"/>
               <a:pPr/>
-              <a:t>5/22/2015</a:t>
+              <a:t>5/23/2015</a:t>
             </a:fld>
             <a:endParaRPr lang="en-US"/>
           </a:p>
@@ -13074,7 +13075,7 @@
             <a:fld id="{EE625E72-7062-4D8E-BA99-F07B9DD1F028}" type="datetimeFigureOut">
               <a:rPr lang="en-US" smtClean="0"/>
               <a:pPr/>
-              <a:t>5/22/2015</a:t>
+              <a:t>5/23/2015</a:t>
             </a:fld>
             <a:endParaRPr lang="en-US"/>
           </a:p>
@@ -13340,7 +13341,7 @@
             <a:fld id="{EE625E72-7062-4D8E-BA99-F07B9DD1F028}" type="datetimeFigureOut">
               <a:rPr lang="en-US" smtClean="0"/>
               <a:pPr/>
-              <a:t>5/22/2015</a:t>
+              <a:t>5/23/2015</a:t>
             </a:fld>
             <a:endParaRPr lang="en-US"/>
           </a:p>
@@ -13512,7 +13513,7 @@
             <a:fld id="{EE625E72-7062-4D8E-BA99-F07B9DD1F028}" type="datetimeFigureOut">
               <a:rPr lang="en-US" smtClean="0"/>
               <a:pPr/>
-              <a:t>5/22/2015</a:t>
+              <a:t>5/23/2015</a:t>
             </a:fld>
             <a:endParaRPr lang="en-US"/>
           </a:p>
@@ -13694,7 +13695,7 @@
             <a:fld id="{EE625E72-7062-4D8E-BA99-F07B9DD1F028}" type="datetimeFigureOut">
               <a:rPr lang="en-US" smtClean="0"/>
               <a:pPr/>
-              <a:t>5/22/2015</a:t>
+              <a:t>5/23/2015</a:t>
             </a:fld>
             <a:endParaRPr lang="en-US"/>
           </a:p>
@@ -13899,7 +13900,7 @@
             <a:fld id="{EE625E72-7062-4D8E-BA99-F07B9DD1F028}" type="datetimeFigureOut">
               <a:rPr lang="en-US" smtClean="0"/>
               <a:pPr/>
-              <a:t>5/22/2015</a:t>
+              <a:t>5/23/2015</a:t>
             </a:fld>
             <a:endParaRPr lang="en-US"/>
           </a:p>
@@ -14071,7 +14072,7 @@
             <a:fld id="{EE625E72-7062-4D8E-BA99-F07B9DD1F028}" type="datetimeFigureOut">
               <a:rPr lang="en-US" smtClean="0"/>
               <a:pPr/>
-              <a:t>5/22/2015</a:t>
+              <a:t>5/23/2015</a:t>
             </a:fld>
             <a:endParaRPr lang="en-US"/>
           </a:p>
@@ -14324,7 +14325,7 @@
             <a:fld id="{EE625E72-7062-4D8E-BA99-F07B9DD1F028}" type="datetimeFigureOut">
               <a:rPr lang="en-US" smtClean="0"/>
               <a:pPr/>
-              <a:t>5/22/2015</a:t>
+              <a:t>5/23/2015</a:t>
             </a:fld>
             <a:endParaRPr lang="en-US"/>
           </a:p>
@@ -14558,7 +14559,7 @@
             <a:fld id="{EE625E72-7062-4D8E-BA99-F07B9DD1F028}" type="datetimeFigureOut">
               <a:rPr lang="en-US" smtClean="0"/>
               <a:pPr/>
-              <a:t>5/22/2015</a:t>
+              <a:t>5/23/2015</a:t>
             </a:fld>
             <a:endParaRPr lang="en-US"/>
           </a:p>
@@ -14907,7 +14908,7 @@
             <a:fld id="{EE625E72-7062-4D8E-BA99-F07B9DD1F028}" type="datetimeFigureOut">
               <a:rPr lang="en-US" smtClean="0"/>
               <a:pPr/>
-              <a:t>5/22/2015</a:t>
+              <a:t>5/23/2015</a:t>
             </a:fld>
             <a:endParaRPr lang="en-US"/>
           </a:p>
@@ -15027,7 +15028,7 @@
             <a:fld id="{EE625E72-7062-4D8E-BA99-F07B9DD1F028}" type="datetimeFigureOut">
               <a:rPr lang="en-US" smtClean="0"/>
               <a:pPr/>
-              <a:t>5/22/2015</a:t>
+              <a:t>5/23/2015</a:t>
             </a:fld>
             <a:endParaRPr lang="en-US"/>
           </a:p>
@@ -15284,7 +15285,7 @@
             <a:fld id="{EE625E72-7062-4D8E-BA99-F07B9DD1F028}" type="datetimeFigureOut">
               <a:rPr lang="en-US" smtClean="0"/>
               <a:pPr/>
-              <a:t>5/22/2015</a:t>
+              <a:t>5/23/2015</a:t>
             </a:fld>
             <a:endParaRPr lang="en-US"/>
           </a:p>
@@ -15381,7 +15382,7 @@
             <a:fld id="{EE625E72-7062-4D8E-BA99-F07B9DD1F028}" type="datetimeFigureOut">
               <a:rPr lang="en-US" smtClean="0"/>
               <a:pPr/>
-              <a:t>5/22/2015</a:t>
+              <a:t>5/23/2015</a:t>
             </a:fld>
             <a:endParaRPr lang="en-US"/>
           </a:p>
@@ -15667,7 +15668,7 @@
             <a:fld id="{EE625E72-7062-4D8E-BA99-F07B9DD1F028}" type="datetimeFigureOut">
               <a:rPr lang="en-US" smtClean="0"/>
               <a:pPr/>
-              <a:t>5/22/2015</a:t>
+              <a:t>5/23/2015</a:t>
             </a:fld>
             <a:endParaRPr lang="en-US"/>
           </a:p>
@@ -15933,7 +15934,7 @@
             <a:fld id="{EE625E72-7062-4D8E-BA99-F07B9DD1F028}" type="datetimeFigureOut">
               <a:rPr lang="en-US" smtClean="0"/>
               <a:pPr/>
-              <a:t>5/22/2015</a:t>
+              <a:t>5/23/2015</a:t>
             </a:fld>
             <a:endParaRPr lang="en-US"/>
           </a:p>
@@ -16105,7 +16106,7 @@
             <a:fld id="{EE625E72-7062-4D8E-BA99-F07B9DD1F028}" type="datetimeFigureOut">
               <a:rPr lang="en-US" smtClean="0"/>
               <a:pPr/>
-              <a:t>5/22/2015</a:t>
+              <a:t>5/23/2015</a:t>
             </a:fld>
             <a:endParaRPr lang="en-US"/>
           </a:p>
@@ -16287,7 +16288,7 @@
             <a:fld id="{EE625E72-7062-4D8E-BA99-F07B9DD1F028}" type="datetimeFigureOut">
               <a:rPr lang="en-US" smtClean="0"/>
               <a:pPr/>
-              <a:t>5/22/2015</a:t>
+              <a:t>5/23/2015</a:t>
             </a:fld>
             <a:endParaRPr lang="en-US"/>
           </a:p>
@@ -16492,7 +16493,7 @@
             <a:fld id="{EE625E72-7062-4D8E-BA99-F07B9DD1F028}" type="datetimeFigureOut">
               <a:rPr lang="en-US" smtClean="0"/>
               <a:pPr/>
-              <a:t>5/22/2015</a:t>
+              <a:t>5/23/2015</a:t>
             </a:fld>
             <a:endParaRPr lang="en-US"/>
           </a:p>
@@ -16664,7 +16665,7 @@
             <a:fld id="{EE625E72-7062-4D8E-BA99-F07B9DD1F028}" type="datetimeFigureOut">
               <a:rPr lang="en-US" smtClean="0"/>
               <a:pPr/>
-              <a:t>5/22/2015</a:t>
+              <a:t>5/23/2015</a:t>
             </a:fld>
             <a:endParaRPr lang="en-US"/>
           </a:p>
@@ -16917,7 +16918,7 @@
             <a:fld id="{EE625E72-7062-4D8E-BA99-F07B9DD1F028}" type="datetimeFigureOut">
               <a:rPr lang="en-US" smtClean="0"/>
               <a:pPr/>
-              <a:t>5/22/2015</a:t>
+              <a:t>5/23/2015</a:t>
             </a:fld>
             <a:endParaRPr lang="en-US"/>
           </a:p>
@@ -17151,7 +17152,7 @@
             <a:fld id="{EE625E72-7062-4D8E-BA99-F07B9DD1F028}" type="datetimeFigureOut">
               <a:rPr lang="en-US" smtClean="0"/>
               <a:pPr/>
-              <a:t>5/22/2015</a:t>
+              <a:t>5/23/2015</a:t>
             </a:fld>
             <a:endParaRPr lang="en-US"/>
           </a:p>
@@ -17500,7 +17501,7 @@
             <a:fld id="{EE625E72-7062-4D8E-BA99-F07B9DD1F028}" type="datetimeFigureOut">
               <a:rPr lang="en-US" smtClean="0"/>
               <a:pPr/>
-              <a:t>5/22/2015</a:t>
+              <a:t>5/23/2015</a:t>
             </a:fld>
             <a:endParaRPr lang="en-US"/>
           </a:p>
@@ -17872,7 +17873,7 @@
             <a:fld id="{EE625E72-7062-4D8E-BA99-F07B9DD1F028}" type="datetimeFigureOut">
               <a:rPr lang="en-US" smtClean="0"/>
               <a:pPr/>
-              <a:t>5/22/2015</a:t>
+              <a:t>5/23/2015</a:t>
             </a:fld>
             <a:endParaRPr lang="en-US"/>
           </a:p>
@@ -17992,7 +17993,7 @@
             <a:fld id="{EE625E72-7062-4D8E-BA99-F07B9DD1F028}" type="datetimeFigureOut">
               <a:rPr lang="en-US" smtClean="0"/>
               <a:pPr/>
-              <a:t>5/22/2015</a:t>
+              <a:t>5/23/2015</a:t>
             </a:fld>
             <a:endParaRPr lang="en-US"/>
           </a:p>
@@ -18112,7 +18113,7 @@
             <a:fld id="{EE625E72-7062-4D8E-BA99-F07B9DD1F028}" type="datetimeFigureOut">
               <a:rPr lang="en-US" smtClean="0"/>
               <a:pPr/>
-              <a:t>5/22/2015</a:t>
+              <a:t>5/23/2015</a:t>
             </a:fld>
             <a:endParaRPr lang="en-US"/>
           </a:p>
@@ -18398,7 +18399,7 @@
             <a:fld id="{EE625E72-7062-4D8E-BA99-F07B9DD1F028}" type="datetimeFigureOut">
               <a:rPr lang="en-US" smtClean="0"/>
               <a:pPr/>
-              <a:t>5/22/2015</a:t>
+              <a:t>5/23/2015</a:t>
             </a:fld>
             <a:endParaRPr lang="en-US"/>
           </a:p>
@@ -18664,7 +18665,7 @@
             <a:fld id="{EE625E72-7062-4D8E-BA99-F07B9DD1F028}" type="datetimeFigureOut">
               <a:rPr lang="en-US" smtClean="0"/>
               <a:pPr/>
-              <a:t>5/22/2015</a:t>
+              <a:t>5/23/2015</a:t>
             </a:fld>
             <a:endParaRPr lang="en-US"/>
           </a:p>
@@ -18836,7 +18837,7 @@
             <a:fld id="{EE625E72-7062-4D8E-BA99-F07B9DD1F028}" type="datetimeFigureOut">
               <a:rPr lang="en-US" smtClean="0"/>
               <a:pPr/>
-              <a:t>5/22/2015</a:t>
+              <a:t>5/23/2015</a:t>
             </a:fld>
             <a:endParaRPr lang="en-US"/>
           </a:p>
@@ -19018,7 +19019,7 @@
             <a:fld id="{EE625E72-7062-4D8E-BA99-F07B9DD1F028}" type="datetimeFigureOut">
               <a:rPr lang="en-US" smtClean="0"/>
               <a:pPr/>
-              <a:t>5/22/2015</a:t>
+              <a:t>5/23/2015</a:t>
             </a:fld>
             <a:endParaRPr lang="en-US"/>
           </a:p>
@@ -19223,7 +19224,7 @@
             <a:fld id="{EE625E72-7062-4D8E-BA99-F07B9DD1F028}" type="datetimeFigureOut">
               <a:rPr lang="en-US" smtClean="0"/>
               <a:pPr/>
-              <a:t>5/22/2015</a:t>
+              <a:t>5/23/2015</a:t>
             </a:fld>
             <a:endParaRPr lang="en-US"/>
           </a:p>
@@ -19395,7 +19396,7 @@
             <a:fld id="{EE625E72-7062-4D8E-BA99-F07B9DD1F028}" type="datetimeFigureOut">
               <a:rPr lang="en-US" smtClean="0"/>
               <a:pPr/>
-              <a:t>5/22/2015</a:t>
+              <a:t>5/23/2015</a:t>
             </a:fld>
             <a:endParaRPr lang="en-US"/>
           </a:p>
@@ -19648,7 +19649,7 @@
             <a:fld id="{EE625E72-7062-4D8E-BA99-F07B9DD1F028}" type="datetimeFigureOut">
               <a:rPr lang="en-US" smtClean="0"/>
               <a:pPr/>
-              <a:t>5/22/2015</a:t>
+              <a:t>5/23/2015</a:t>
             </a:fld>
             <a:endParaRPr lang="en-US"/>
           </a:p>
@@ -19882,7 +19883,7 @@
             <a:fld id="{EE625E72-7062-4D8E-BA99-F07B9DD1F028}" type="datetimeFigureOut">
               <a:rPr lang="en-US" smtClean="0"/>
               <a:pPr/>
-              <a:t>5/22/2015</a:t>
+              <a:t>5/23/2015</a:t>
             </a:fld>
             <a:endParaRPr lang="en-US"/>
           </a:p>
@@ -19979,7 +19980,7 @@
             <a:fld id="{EE625E72-7062-4D8E-BA99-F07B9DD1F028}" type="datetimeFigureOut">
               <a:rPr lang="en-US" smtClean="0"/>
               <a:pPr/>
-              <a:t>5/22/2015</a:t>
+              <a:t>5/23/2015</a:t>
             </a:fld>
             <a:endParaRPr lang="en-US"/>
           </a:p>
@@ -20351,7 +20352,7 @@
             <a:fld id="{EE625E72-7062-4D8E-BA99-F07B9DD1F028}" type="datetimeFigureOut">
               <a:rPr lang="en-US" smtClean="0"/>
               <a:pPr/>
-              <a:t>5/22/2015</a:t>
+              <a:t>5/23/2015</a:t>
             </a:fld>
             <a:endParaRPr lang="en-US"/>
           </a:p>
@@ -20471,7 +20472,7 @@
             <a:fld id="{EE625E72-7062-4D8E-BA99-F07B9DD1F028}" type="datetimeFigureOut">
               <a:rPr lang="en-US" smtClean="0"/>
               <a:pPr/>
-              <a:t>5/22/2015</a:t>
+              <a:t>5/23/2015</a:t>
             </a:fld>
             <a:endParaRPr lang="en-US"/>
           </a:p>
@@ -20591,7 +20592,7 @@
             <a:fld id="{EE625E72-7062-4D8E-BA99-F07B9DD1F028}" type="datetimeFigureOut">
               <a:rPr lang="en-US" smtClean="0"/>
               <a:pPr/>
-              <a:t>5/22/2015</a:t>
+              <a:t>5/23/2015</a:t>
             </a:fld>
             <a:endParaRPr lang="en-US"/>
           </a:p>
@@ -20877,7 +20878,7 @@
             <a:fld id="{EE625E72-7062-4D8E-BA99-F07B9DD1F028}" type="datetimeFigureOut">
               <a:rPr lang="en-US" smtClean="0"/>
               <a:pPr/>
-              <a:t>5/22/2015</a:t>
+              <a:t>5/23/2015</a:t>
             </a:fld>
             <a:endParaRPr lang="en-US"/>
           </a:p>
@@ -21143,7 +21144,7 @@
             <a:fld id="{EE625E72-7062-4D8E-BA99-F07B9DD1F028}" type="datetimeFigureOut">
               <a:rPr lang="en-US" smtClean="0"/>
               <a:pPr/>
-              <a:t>5/22/2015</a:t>
+              <a:t>5/23/2015</a:t>
             </a:fld>
             <a:endParaRPr lang="en-US"/>
           </a:p>
@@ -21315,7 +21316,7 @@
             <a:fld id="{EE625E72-7062-4D8E-BA99-F07B9DD1F028}" type="datetimeFigureOut">
               <a:rPr lang="en-US" smtClean="0"/>
               <a:pPr/>
-              <a:t>5/22/2015</a:t>
+              <a:t>5/23/2015</a:t>
             </a:fld>
             <a:endParaRPr lang="en-US"/>
           </a:p>
@@ -21497,7 +21498,7 @@
             <a:fld id="{EE625E72-7062-4D8E-BA99-F07B9DD1F028}" type="datetimeFigureOut">
               <a:rPr lang="en-US" smtClean="0"/>
               <a:pPr/>
-              <a:t>5/22/2015</a:t>
+              <a:t>5/23/2015</a:t>
             </a:fld>
             <a:endParaRPr lang="en-US"/>
           </a:p>
@@ -21702,7 +21703,7 @@
             <a:fld id="{EE625E72-7062-4D8E-BA99-F07B9DD1F028}" type="datetimeFigureOut">
               <a:rPr lang="en-US" smtClean="0"/>
               <a:pPr/>
-              <a:t>5/22/2015</a:t>
+              <a:t>5/23/2015</a:t>
             </a:fld>
             <a:endParaRPr lang="en-US"/>
           </a:p>
@@ -21874,7 +21875,7 @@
             <a:fld id="{EE625E72-7062-4D8E-BA99-F07B9DD1F028}" type="datetimeFigureOut">
               <a:rPr lang="en-US" smtClean="0"/>
               <a:pPr/>
-              <a:t>5/22/2015</a:t>
+              <a:t>5/23/2015</a:t>
             </a:fld>
             <a:endParaRPr lang="en-US"/>
           </a:p>
@@ -22127,7 +22128,7 @@
             <a:fld id="{EE625E72-7062-4D8E-BA99-F07B9DD1F028}" type="datetimeFigureOut">
               <a:rPr lang="en-US" smtClean="0"/>
               <a:pPr/>
-              <a:t>5/22/2015</a:t>
+              <a:t>5/23/2015</a:t>
             </a:fld>
             <a:endParaRPr lang="en-US"/>
           </a:p>
@@ -22224,7 +22225,7 @@
             <a:fld id="{EE625E72-7062-4D8E-BA99-F07B9DD1F028}" type="datetimeFigureOut">
               <a:rPr lang="en-US" smtClean="0"/>
               <a:pPr/>
-              <a:t>5/22/2015</a:t>
+              <a:t>5/23/2015</a:t>
             </a:fld>
             <a:endParaRPr lang="en-US"/>
           </a:p>
@@ -22458,7 +22459,7 @@
             <a:fld id="{EE625E72-7062-4D8E-BA99-F07B9DD1F028}" type="datetimeFigureOut">
               <a:rPr lang="en-US" smtClean="0"/>
               <a:pPr/>
-              <a:t>5/22/2015</a:t>
+              <a:t>5/23/2015</a:t>
             </a:fld>
             <a:endParaRPr lang="en-US"/>
           </a:p>
@@ -22807,7 +22808,7 @@
             <a:fld id="{EE625E72-7062-4D8E-BA99-F07B9DD1F028}" type="datetimeFigureOut">
               <a:rPr lang="en-US" smtClean="0"/>
               <a:pPr/>
-              <a:t>5/22/2015</a:t>
+              <a:t>5/23/2015</a:t>
             </a:fld>
             <a:endParaRPr lang="en-US"/>
           </a:p>
@@ -22927,7 +22928,7 @@
             <a:fld id="{EE625E72-7062-4D8E-BA99-F07B9DD1F028}" type="datetimeFigureOut">
               <a:rPr lang="en-US" smtClean="0"/>
               <a:pPr/>
-              <a:t>5/22/2015</a:t>
+              <a:t>5/23/2015</a:t>
             </a:fld>
             <a:endParaRPr lang="en-US"/>
           </a:p>
@@ -23047,7 +23048,7 @@
             <a:fld id="{EE625E72-7062-4D8E-BA99-F07B9DD1F028}" type="datetimeFigureOut">
               <a:rPr lang="en-US" smtClean="0"/>
               <a:pPr/>
-              <a:t>5/22/2015</a:t>
+              <a:t>5/23/2015</a:t>
             </a:fld>
             <a:endParaRPr lang="en-US"/>
           </a:p>
@@ -23333,7 +23334,7 @@
             <a:fld id="{EE625E72-7062-4D8E-BA99-F07B9DD1F028}" type="datetimeFigureOut">
               <a:rPr lang="en-US" smtClean="0"/>
               <a:pPr/>
-              <a:t>5/22/2015</a:t>
+              <a:t>5/23/2015</a:t>
             </a:fld>
             <a:endParaRPr lang="en-US"/>
           </a:p>
@@ -23599,7 +23600,7 @@
             <a:fld id="{EE625E72-7062-4D8E-BA99-F07B9DD1F028}" type="datetimeFigureOut">
               <a:rPr lang="en-US" smtClean="0"/>
               <a:pPr/>
-              <a:t>5/22/2015</a:t>
+              <a:t>5/23/2015</a:t>
             </a:fld>
             <a:endParaRPr lang="en-US"/>
           </a:p>
@@ -23771,7 +23772,7 @@
             <a:fld id="{EE625E72-7062-4D8E-BA99-F07B9DD1F028}" type="datetimeFigureOut">
               <a:rPr lang="en-US" smtClean="0"/>
               <a:pPr/>
-              <a:t>5/22/2015</a:t>
+              <a:t>5/23/2015</a:t>
             </a:fld>
             <a:endParaRPr lang="en-US"/>
           </a:p>
@@ -23953,7 +23954,7 @@
             <a:fld id="{EE625E72-7062-4D8E-BA99-F07B9DD1F028}" type="datetimeFigureOut">
               <a:rPr lang="en-US" smtClean="0"/>
               <a:pPr/>
-              <a:t>5/22/2015</a:t>
+              <a:t>5/23/2015</a:t>
             </a:fld>
             <a:endParaRPr lang="en-US"/>
           </a:p>
@@ -24811,7 +24812,7 @@
             <a:fld id="{EE625E72-7062-4D8E-BA99-F07B9DD1F028}" type="datetimeFigureOut">
               <a:rPr lang="en-US" smtClean="0"/>
               <a:pPr/>
-              <a:t>5/22/2015</a:t>
+              <a:t>5/23/2015</a:t>
             </a:fld>
             <a:endParaRPr lang="en-US"/>
           </a:p>
@@ -24989,7 +24990,7 @@
             <a:fld id="{EE625E72-7062-4D8E-BA99-F07B9DD1F028}" type="datetimeFigureOut">
               <a:rPr lang="en-US" smtClean="0"/>
               <a:pPr/>
-              <a:t>5/22/2015</a:t>
+              <a:t>5/23/2015</a:t>
             </a:fld>
             <a:endParaRPr lang="en-US"/>
           </a:p>
@@ -25275,7 +25276,7 @@
             <a:fld id="{EE625E72-7062-4D8E-BA99-F07B9DD1F028}" type="datetimeFigureOut">
               <a:rPr lang="en-US" smtClean="0"/>
               <a:pPr/>
-              <a:t>5/22/2015</a:t>
+              <a:t>5/23/2015</a:t>
             </a:fld>
             <a:endParaRPr lang="en-US"/>
           </a:p>
@@ -25524,7 +25525,7 @@
             <a:fld id="{EE625E72-7062-4D8E-BA99-F07B9DD1F028}" type="datetimeFigureOut">
               <a:rPr lang="en-US" smtClean="0"/>
               <a:pPr/>
-              <a:t>5/22/2015</a:t>
+              <a:t>5/23/2015</a:t>
             </a:fld>
             <a:endParaRPr lang="en-US"/>
           </a:p>
@@ -25823,7 +25824,7 @@
             <a:fld id="{EE625E72-7062-4D8E-BA99-F07B9DD1F028}" type="datetimeFigureOut">
               <a:rPr lang="en-US" smtClean="0"/>
               <a:pPr/>
-              <a:t>5/22/2015</a:t>
+              <a:t>5/23/2015</a:t>
             </a:fld>
             <a:endParaRPr lang="en-US"/>
           </a:p>
@@ -26204,7 +26205,7 @@
             <a:fld id="{EE625E72-7062-4D8E-BA99-F07B9DD1F028}" type="datetimeFigureOut">
               <a:rPr lang="en-US" smtClean="0"/>
               <a:pPr/>
-              <a:t>5/22/2015</a:t>
+              <a:t>5/23/2015</a:t>
             </a:fld>
             <a:endParaRPr lang="en-US"/>
           </a:p>
@@ -26329,7 +26330,7 @@
             <a:fld id="{EE625E72-7062-4D8E-BA99-F07B9DD1F028}" type="datetimeFigureOut">
               <a:rPr lang="en-US" smtClean="0"/>
               <a:pPr/>
-              <a:t>5/22/2015</a:t>
+              <a:t>5/23/2015</a:t>
             </a:fld>
             <a:endParaRPr lang="en-US"/>
           </a:p>
@@ -26426,7 +26427,7 @@
             <a:fld id="{EE625E72-7062-4D8E-BA99-F07B9DD1F028}" type="datetimeFigureOut">
               <a:rPr lang="en-US" smtClean="0"/>
               <a:pPr/>
-              <a:t>5/22/2015</a:t>
+              <a:t>5/23/2015</a:t>
             </a:fld>
             <a:endParaRPr lang="en-US"/>
           </a:p>
@@ -26683,7 +26684,7 @@
             <a:fld id="{EE625E72-7062-4D8E-BA99-F07B9DD1F028}" type="datetimeFigureOut">
               <a:rPr lang="en-US" smtClean="0"/>
               <a:pPr/>
-              <a:t>5/22/2015</a:t>
+              <a:t>5/23/2015</a:t>
             </a:fld>
             <a:endParaRPr lang="en-US"/>
           </a:p>
@@ -26948,7 +26949,7 @@
             <a:fld id="{EE625E72-7062-4D8E-BA99-F07B9DD1F028}" type="datetimeFigureOut">
               <a:rPr lang="en-US" smtClean="0"/>
               <a:pPr/>
-              <a:t>5/22/2015</a:t>
+              <a:t>5/23/2015</a:t>
             </a:fld>
             <a:endParaRPr lang="en-US"/>
           </a:p>
@@ -27201,7 +27202,7 @@
             <a:fld id="{EE625E72-7062-4D8E-BA99-F07B9DD1F028}" type="datetimeFigureOut">
               <a:rPr lang="en-US" smtClean="0"/>
               <a:pPr/>
-              <a:t>5/22/2015</a:t>
+              <a:t>5/23/2015</a:t>
             </a:fld>
             <a:endParaRPr lang="en-US"/>
           </a:p>
@@ -27517,7 +27518,7 @@
             <a:fld id="{EE625E72-7062-4D8E-BA99-F07B9DD1F028}" type="datetimeFigureOut">
               <a:rPr lang="en-US" smtClean="0"/>
               <a:pPr/>
-              <a:t>5/22/2015</a:t>
+              <a:t>5/23/2015</a:t>
             </a:fld>
             <a:endParaRPr lang="en-US"/>
           </a:p>
@@ -27852,7 +27853,7 @@
             <a:fld id="{EE625E72-7062-4D8E-BA99-F07B9DD1F028}" type="datetimeFigureOut">
               <a:rPr lang="en-US" smtClean="0"/>
               <a:pPr/>
-              <a:t>5/22/2015</a:t>
+              <a:t>5/23/2015</a:t>
             </a:fld>
             <a:endParaRPr lang="en-US"/>
           </a:p>
@@ -28118,7 +28119,7 @@
             <a:fld id="{EE625E72-7062-4D8E-BA99-F07B9DD1F028}" type="datetimeFigureOut">
               <a:rPr lang="en-US" smtClean="0"/>
               <a:pPr/>
-              <a:t>5/22/2015</a:t>
+              <a:t>5/23/2015</a:t>
             </a:fld>
             <a:endParaRPr lang="en-US"/>
           </a:p>
@@ -28434,7 +28435,7 @@
             <a:fld id="{EE625E72-7062-4D8E-BA99-F07B9DD1F028}" type="datetimeFigureOut">
               <a:rPr lang="en-US" smtClean="0"/>
               <a:pPr/>
-              <a:t>5/22/2015</a:t>
+              <a:t>5/23/2015</a:t>
             </a:fld>
             <a:endParaRPr lang="en-US"/>
           </a:p>
@@ -28829,7 +28830,7 @@
             <a:fld id="{EE625E72-7062-4D8E-BA99-F07B9DD1F028}" type="datetimeFigureOut">
               <a:rPr lang="en-US" smtClean="0"/>
               <a:pPr/>
-              <a:t>5/22/2015</a:t>
+              <a:t>5/23/2015</a:t>
             </a:fld>
             <a:endParaRPr lang="en-US"/>
           </a:p>
@@ -29001,7 +29002,7 @@
             <a:fld id="{EE625E72-7062-4D8E-BA99-F07B9DD1F028}" type="datetimeFigureOut">
               <a:rPr lang="en-US" smtClean="0"/>
               <a:pPr/>
-              <a:t>5/22/2015</a:t>
+              <a:t>5/23/2015</a:t>
             </a:fld>
             <a:endParaRPr lang="en-US"/>
           </a:p>
@@ -29183,7 +29184,7 @@
             <a:fld id="{EE625E72-7062-4D8E-BA99-F07B9DD1F028}" type="datetimeFigureOut">
               <a:rPr lang="en-US" smtClean="0"/>
               <a:pPr/>
-              <a:t>5/22/2015</a:t>
+              <a:t>5/23/2015</a:t>
             </a:fld>
             <a:endParaRPr lang="en-US"/>
           </a:p>
@@ -29399,7 +29400,7 @@
             <a:fld id="{EE625E72-7062-4D8E-BA99-F07B9DD1F028}" type="datetimeFigureOut">
               <a:rPr lang="en-US" smtClean="0"/>
               <a:pPr/>
-              <a:t>5/22/2015</a:t>
+              <a:t>5/23/2015</a:t>
             </a:fld>
             <a:endParaRPr lang="en-US"/>
           </a:p>
@@ -29931,7 +29932,7 @@
             <a:fld id="{EE625E72-7062-4D8E-BA99-F07B9DD1F028}" type="datetimeFigureOut">
               <a:rPr lang="en-US" smtClean="0"/>
               <a:pPr/>
-              <a:t>5/22/2015</a:t>
+              <a:t>5/23/2015</a:t>
             </a:fld>
             <a:endParaRPr lang="en-US"/>
           </a:p>
@@ -30463,7 +30464,7 @@
             <a:fld id="{EE625E72-7062-4D8E-BA99-F07B9DD1F028}" type="datetimeFigureOut">
               <a:rPr lang="en-US" smtClean="0"/>
               <a:pPr/>
-              <a:t>5/22/2015</a:t>
+              <a:t>5/23/2015</a:t>
             </a:fld>
             <a:endParaRPr lang="en-US"/>
           </a:p>
@@ -30995,7 +30996,7 @@
             <a:fld id="{EE625E72-7062-4D8E-BA99-F07B9DD1F028}" type="datetimeFigureOut">
               <a:rPr lang="en-US" smtClean="0"/>
               <a:pPr/>
-              <a:t>5/22/2015</a:t>
+              <a:t>5/23/2015</a:t>
             </a:fld>
             <a:endParaRPr lang="en-US"/>
           </a:p>
@@ -31527,7 +31528,7 @@
             <a:fld id="{EE625E72-7062-4D8E-BA99-F07B9DD1F028}" type="datetimeFigureOut">
               <a:rPr lang="en-US" smtClean="0"/>
               <a:pPr/>
-              <a:t>5/22/2015</a:t>
+              <a:t>5/23/2015</a:t>
             </a:fld>
             <a:endParaRPr lang="en-US"/>
           </a:p>
@@ -32059,7 +32060,7 @@
             <a:fld id="{EE625E72-7062-4D8E-BA99-F07B9DD1F028}" type="datetimeFigureOut">
               <a:rPr lang="en-US" smtClean="0"/>
               <a:pPr/>
-              <a:t>5/22/2015</a:t>
+              <a:t>5/23/2015</a:t>
             </a:fld>
             <a:endParaRPr lang="en-US"/>
           </a:p>
@@ -32591,7 +32592,7 @@
             <a:fld id="{EE625E72-7062-4D8E-BA99-F07B9DD1F028}" type="datetimeFigureOut">
               <a:rPr lang="en-US" smtClean="0"/>
               <a:pPr/>
-              <a:t>5/22/2015</a:t>
+              <a:t>5/23/2015</a:t>
             </a:fld>
             <a:endParaRPr lang="en-US"/>
           </a:p>
@@ -33724,7 +33725,7 @@
             <a:fld id="{EE625E72-7062-4D8E-BA99-F07B9DD1F028}" type="datetimeFigureOut">
               <a:rPr lang="en-US" smtClean="0"/>
               <a:pPr/>
-              <a:t>5/22/2015</a:t>
+              <a:t>5/23/2015</a:t>
             </a:fld>
             <a:endParaRPr lang="en-US"/>
           </a:p>
@@ -34874,28 +34875,19 @@
               <a:rPr lang="sk-SK" dirty="0" smtClean="0"/>
               <a:t>Nastavovanie parametru (internacionalizácia)</a:t>
             </a:r>
-            <a:endParaRPr lang="sk-SK" dirty="0" smtClean="0"/>
           </a:p>
           <a:p>
             <a:pPr lvl="2"/>
             <a:r>
               <a:rPr lang="sk-SK" noProof="0" dirty="0" smtClean="0"/>
-              <a:t>Vytvorenie procesu na vygenerovanie </a:t>
-            </a:r>
+              <a:t>Vytvorenie procesu na vygenerovanie PDF</a:t>
+            </a:r>
+          </a:p>
+          <a:p>
+            <a:pPr lvl="2"/>
             <a:r>
               <a:rPr lang="sk-SK" noProof="0" dirty="0" smtClean="0"/>
-              <a:t>PDF</a:t>
-            </a:r>
-          </a:p>
-          <a:p>
-            <a:pPr lvl="2"/>
-            <a:r>
-              <a:rPr lang="sk-SK" noProof="0" dirty="0" smtClean="0"/>
-              <a:t>Vymazanie </a:t>
-            </a:r>
-            <a:r>
-              <a:rPr lang="sk-SK" noProof="0" dirty="0" smtClean="0"/>
-              <a:t>nepotrebných súborov</a:t>
+              <a:t>Vymazanie nepotrebných súborov</a:t>
             </a:r>
             <a:r>
               <a:rPr lang="en-US" noProof="0" dirty="0" smtClean="0"/>
@@ -35292,11 +35284,7 @@
             <a:pPr lvl="2"/>
             <a:r>
               <a:rPr lang="sk-SK" sz="2200" dirty="0" smtClean="0"/>
-              <a:t>Poskytovanie uložených </a:t>
-            </a:r>
-            <a:r>
-              <a:rPr lang="sk-SK" sz="2200" dirty="0" smtClean="0"/>
-              <a:t>dát </a:t>
+              <a:t>Poskytovanie uložených dát </a:t>
             </a:r>
             <a:r>
               <a:rPr lang="sk-SK" sz="2200" dirty="0" err="1" smtClean="0"/>
@@ -35304,11 +35292,7 @@
             </a:r>
             <a:r>
               <a:rPr lang="sk-SK" sz="2200" dirty="0" smtClean="0"/>
-              <a:t> </a:t>
-            </a:r>
-            <a:r>
-              <a:rPr lang="sk-SK" sz="2200" dirty="0" smtClean="0"/>
-              <a:t>(AngularJS)</a:t>
+              <a:t> (AngularJS)</a:t>
             </a:r>
           </a:p>
           <a:p>
@@ -35503,37 +35487,23 @@
             <a:pPr lvl="2"/>
             <a:r>
               <a:rPr lang="sk-SK" sz="2200" dirty="0" smtClean="0"/>
-              <a:t>Validácia </a:t>
-            </a:r>
+              <a:t>Validácia XML súborov</a:t>
+            </a:r>
+          </a:p>
+          <a:p>
+            <a:pPr lvl="2"/>
             <a:r>
               <a:rPr lang="sk-SK" sz="2200" dirty="0" smtClean="0"/>
-              <a:t>XML súborov</a:t>
-            </a:r>
-            <a:endParaRPr lang="sk-SK" sz="2200" dirty="0" smtClean="0"/>
+              <a:t>Zamedzenie nekonzistentným dátam</a:t>
+            </a:r>
+            <a:endParaRPr lang="sk-SK" sz="2200" dirty="0"/>
           </a:p>
           <a:p>
             <a:pPr lvl="2"/>
             <a:r>
-              <a:rPr lang="sk-SK" sz="2200" dirty="0" smtClean="0"/>
-              <a:t>Zamedzenie nekonzistentným </a:t>
-            </a:r>
-            <a:r>
-              <a:rPr lang="sk-SK" sz="2200" dirty="0" smtClean="0"/>
-              <a:t>dátam</a:t>
-            </a:r>
-            <a:endParaRPr lang="sk-SK" sz="2200" dirty="0"/>
-          </a:p>
-          <a:p>
-            <a:pPr lvl="2"/>
-            <a:r>
               <a:rPr lang="sk-SK" sz="2200" noProof="0" dirty="0" smtClean="0"/>
-              <a:t>Kontrola atribútov, elementov, </a:t>
-            </a:r>
-            <a:r>
-              <a:rPr lang="sk-SK" sz="2200" noProof="0" dirty="0" smtClean="0"/>
-              <a:t>hodnôt</a:t>
-            </a:r>
-            <a:endParaRPr lang="sk-SK" sz="2200" noProof="0" dirty="0" smtClean="0"/>
+              <a:t>Kontrola atribútov, elementov, hodnôt</a:t>
+            </a:r>
           </a:p>
           <a:p>
             <a:pPr lvl="2"/>
@@ -35578,6 +35548,38 @@
           <a:chExt cx="0" cy="0"/>
         </a:xfrm>
       </p:grpSpPr>
+      <p:pic>
+        <p:nvPicPr>
+          <p:cNvPr id="2" name="Obrázok 1"/>
+          <p:cNvPicPr>
+            <a:picLocks noChangeAspect="1"/>
+          </p:cNvPicPr>
+          <p:nvPr/>
+        </p:nvPicPr>
+        <p:blipFill rotWithShape="1">
+          <a:blip r:embed="rId3">
+            <a:extLst>
+              <a:ext uri="{28A0092B-C50C-407E-A947-70E740481C1C}">
+                <a14:useLocalDpi xmlns:a14="http://schemas.microsoft.com/office/drawing/2010/main" val="0"/>
+              </a:ext>
+            </a:extLst>
+          </a:blip>
+          <a:srcRect l="1250"/>
+          <a:stretch/>
+        </p:blipFill>
+        <p:spPr>
+          <a:xfrm>
+            <a:off x="3347864" y="-531440"/>
+            <a:ext cx="5904656" cy="7120592"/>
+          </a:xfrm>
+          <a:prstGeom prst="rect">
+            <a:avLst/>
+          </a:prstGeom>
+          <a:effectLst>
+            <a:softEdge rad="254000"/>
+          </a:effectLst>
+        </p:spPr>
+      </p:pic>
       <p:sp>
         <p:nvSpPr>
           <p:cNvPr id="5" name="Title 4"/>
@@ -35662,23 +35664,58 @@
             <p:ph idx="1"/>
           </p:nvPr>
         </p:nvSpPr>
-        <p:spPr/>
-        <p:txBody>
-          <a:bodyPr/>
-          <a:lstStyle/>
-          <a:p>
-            <a:r>
-              <a:rPr kumimoji="0" lang="sk-SK" sz="2700" kern="1200" noProof="0" dirty="0" smtClean="0">
+        <p:spPr>
+          <a:xfrm>
+            <a:off x="609598" y="2204864"/>
+            <a:ext cx="6347714" cy="3880773"/>
+          </a:xfrm>
+        </p:spPr>
+        <p:txBody>
+          <a:bodyPr/>
+          <a:lstStyle/>
+          <a:p>
+            <a:r>
+              <a:rPr lang="sk-SK" sz="2700" noProof="0" dirty="0" err="1" smtClean="0">
                 <a:solidFill>
                   <a:schemeClr val="tx1"/>
                 </a:solidFill>
-                <a:latin typeface="+mn-lt"/>
-                <a:ea typeface="+mn-ea"/>
-                <a:cs typeface="+mn-cs"/>
               </a:rPr>
-              <a:t>TODO</a:t>
-            </a:r>
-            <a:endParaRPr lang="sk-SK" noProof="0" dirty="0"/>
+              <a:t>LaTeX</a:t>
+            </a:r>
+            <a:r>
+              <a:rPr lang="sk-SK" sz="2700" noProof="0" dirty="0" smtClean="0">
+                <a:solidFill>
+                  <a:schemeClr val="tx1"/>
+                </a:solidFill>
+              </a:rPr>
+              <a:t> súbor</a:t>
+            </a:r>
+          </a:p>
+          <a:p>
+            <a:r>
+              <a:rPr lang="sk-SK" sz="2700" dirty="0" smtClean="0">
+                <a:solidFill>
+                  <a:schemeClr val="tx1"/>
+                </a:solidFill>
+              </a:rPr>
+              <a:t>Transformácia</a:t>
+            </a:r>
+            <a:endParaRPr lang="sk-SK" sz="2700" dirty="0">
+              <a:solidFill>
+                <a:schemeClr val="tx1"/>
+              </a:solidFill>
+            </a:endParaRPr>
+          </a:p>
+          <a:p>
+            <a:pPr lvl="1"/>
+            <a:r>
+              <a:rPr lang="sk-SK" sz="2500" dirty="0" smtClean="0">
+                <a:solidFill>
+                  <a:schemeClr val="tx1"/>
+                </a:solidFill>
+              </a:rPr>
+              <a:t>výstup „text“</a:t>
+            </a:r>
           </a:p>
         </p:txBody>
       </p:sp>
@@ -35719,6 +35756,162 @@
           <a:chExt cx="0" cy="0"/>
         </a:xfrm>
       </p:grpSpPr>
+      <p:pic>
+        <p:nvPicPr>
+          <p:cNvPr id="4" name="Obrázok 3"/>
+          <p:cNvPicPr>
+            <a:picLocks noChangeAspect="1"/>
+          </p:cNvPicPr>
+          <p:nvPr/>
+        </p:nvPicPr>
+        <p:blipFill>
+          <a:blip r:embed="rId2">
+            <a:extLst>
+              <a:ext uri="{28A0092B-C50C-407E-A947-70E740481C1C}">
+                <a14:useLocalDpi xmlns:a14="http://schemas.microsoft.com/office/drawing/2010/main" val="0"/>
+              </a:ext>
+            </a:extLst>
+          </a:blip>
+          <a:stretch>
+            <a:fillRect/>
+          </a:stretch>
+        </p:blipFill>
+        <p:spPr>
+          <a:xfrm>
+            <a:off x="3707904" y="260648"/>
+            <a:ext cx="5349240" cy="6362700"/>
+          </a:xfrm>
+          <a:prstGeom prst="rect">
+            <a:avLst/>
+          </a:prstGeom>
+          <a:effectLst>
+            <a:softEdge rad="63500"/>
+          </a:effectLst>
+        </p:spPr>
+      </p:pic>
+      <p:sp>
+        <p:nvSpPr>
+          <p:cNvPr id="2" name="Nadpis 1"/>
+          <p:cNvSpPr>
+            <a:spLocks noGrp="1"/>
+          </p:cNvSpPr>
+          <p:nvPr>
+            <p:ph type="title"/>
+          </p:nvPr>
+        </p:nvSpPr>
+        <p:spPr/>
+        <p:txBody>
+          <a:bodyPr/>
+          <a:lstStyle/>
+          <a:p>
+            <a:r>
+              <a:rPr lang="sk-SK" dirty="0" smtClean="0">
+                <a:solidFill>
+                  <a:schemeClr val="accent3">
+                    <a:shade val="75000"/>
+                  </a:schemeClr>
+                </a:solidFill>
+              </a:rPr>
+              <a:t>Internacionalizácia</a:t>
+            </a:r>
+            <a:endParaRPr lang="sk-SK" dirty="0"/>
+          </a:p>
+        </p:txBody>
+      </p:sp>
+      <p:sp>
+        <p:nvSpPr>
+          <p:cNvPr id="3" name="Zástupný symbol obsahu 2"/>
+          <p:cNvSpPr>
+            <a:spLocks noGrp="1"/>
+          </p:cNvSpPr>
+          <p:nvPr>
+            <p:ph idx="1"/>
+          </p:nvPr>
+        </p:nvSpPr>
+        <p:spPr/>
+        <p:txBody>
+          <a:bodyPr>
+            <a:normAutofit/>
+          </a:bodyPr>
+          <a:lstStyle/>
+          <a:p>
+            <a:r>
+              <a:rPr lang="sk-SK" sz="2700" dirty="0" smtClean="0">
+                <a:solidFill>
+                  <a:schemeClr val="tx1"/>
+                </a:solidFill>
+              </a:rPr>
+              <a:t>Element </a:t>
+            </a:r>
+            <a:r>
+              <a:rPr lang="sk-SK" sz="2700" dirty="0" err="1" smtClean="0">
+                <a:solidFill>
+                  <a:schemeClr val="tx1"/>
+                </a:solidFill>
+              </a:rPr>
+              <a:t>param</a:t>
+            </a:r>
+            <a:endParaRPr lang="sk-SK" sz="2700" dirty="0">
+              <a:solidFill>
+                <a:schemeClr val="tx1"/>
+              </a:solidFill>
+            </a:endParaRPr>
+          </a:p>
+          <a:p>
+            <a:r>
+              <a:rPr lang="sk-SK" sz="2700" dirty="0" smtClean="0"/>
+              <a:t>Textové konštanty v </a:t>
+            </a:r>
+          </a:p>
+          <a:p>
+            <a:pPr marL="0" indent="0">
+              <a:buNone/>
+            </a:pPr>
+            <a:r>
+              <a:rPr lang="sk-SK" sz="2700" dirty="0" smtClean="0"/>
+              <a:t>      separátnom súbore</a:t>
+            </a:r>
+            <a:endParaRPr lang="sk-SK" sz="2700" dirty="0"/>
+          </a:p>
+        </p:txBody>
+      </p:sp>
+    </p:spTree>
+    <p:extLst>
+      <p:ext uri="{BB962C8B-B14F-4D97-AF65-F5344CB8AC3E}">
+        <p14:creationId xmlns:p14="http://schemas.microsoft.com/office/powerpoint/2010/main" val="3435698154"/>
+      </p:ext>
+    </p:extLst>
+  </p:cSld>
+  <p:clrMapOvr>
+    <a:masterClrMapping/>
+  </p:clrMapOvr>
+  <p:timing>
+    <p:tnLst>
+      <p:par>
+        <p:cTn id="1" dur="indefinite" restart="never" nodeType="tmRoot"/>
+      </p:par>
+    </p:tnLst>
+  </p:timing>
+</p:sld>
+</file>
+
+<file path=ppt/slides/slide17.xml><?xml version="1.0" encoding="utf-8"?>
+<p:sld xmlns:a="http://schemas.openxmlformats.org/drawingml/2006/main" xmlns:r="http://schemas.openxmlformats.org/officeDocument/2006/relationships" xmlns:p="http://schemas.openxmlformats.org/presentationml/2006/main">
+  <p:cSld>
+    <p:spTree>
+      <p:nvGrpSpPr>
+        <p:cNvPr id="1" name=""/>
+        <p:cNvGrpSpPr/>
+        <p:nvPr/>
+      </p:nvGrpSpPr>
+      <p:grpSpPr>
+        <a:xfrm>
+          <a:off x="0" y="0"/>
+          <a:ext cx="0" cy="0"/>
+          <a:chOff x="0" y="0"/>
+          <a:chExt cx="0" cy="0"/>
+        </a:xfrm>
+      </p:grpSpPr>
       <p:sp>
         <p:nvSpPr>
           <p:cNvPr id="2" name="Title 1"/>
@@ -35821,7 +36014,7 @@
 </p:sld>
 </file>
 
-<file path=ppt/slides/slide17.xml><?xml version="1.0" encoding="utf-8"?>
+<file path=ppt/slides/slide18.xml><?xml version="1.0" encoding="utf-8"?>
 <p:sld xmlns:a="http://schemas.openxmlformats.org/drawingml/2006/main" xmlns:r="http://schemas.openxmlformats.org/officeDocument/2006/relationships" xmlns:p="http://schemas.openxmlformats.org/presentationml/2006/main">
   <p:cSld>
     <p:spTree>
@@ -37103,11 +37296,7 @@
           <a:p>
             <a:r>
               <a:rPr lang="sk-SK" dirty="0" smtClean="0"/>
-              <a:t>Prihlasovanie </a:t>
-            </a:r>
-            <a:r>
-              <a:rPr lang="sk-SK" dirty="0" smtClean="0"/>
-              <a:t>užívateľov</a:t>
+              <a:t>Prihlasovanie užívateľov</a:t>
             </a:r>
           </a:p>
           <a:p>
@@ -37127,7 +37316,6 @@
               <a:rPr lang="sk-SK" dirty="0" smtClean="0"/>
               <a:t>Načítanie príslušného CV</a:t>
             </a:r>
-            <a:endParaRPr lang="sk-SK" dirty="0" smtClean="0"/>
           </a:p>
         </p:txBody>
       </p:sp>
@@ -37410,11 +37598,7 @@
             <a:pPr lvl="1"/>
             <a:r>
               <a:rPr lang="sk-SK" dirty="0" smtClean="0"/>
-              <a:t>Odosielanie JSON objektu na </a:t>
-            </a:r>
-            <a:r>
-              <a:rPr lang="sk-SK" dirty="0" smtClean="0"/>
-              <a:t>server</a:t>
+              <a:t>Odosielanie JSON objektu na server</a:t>
             </a:r>
           </a:p>
           <a:p>
@@ -37423,7 +37607,6 @@
               <a:rPr lang="sk-SK" dirty="0" smtClean="0"/>
               <a:t>Oznámenie o výsledku operácie</a:t>
             </a:r>
-            <a:endParaRPr lang="sk-SK" dirty="0" smtClean="0"/>
           </a:p>
           <a:p>
             <a:pPr lvl="1"/>

</xml_diff>